<commit_message>
FIX different errors in calculated data columns
</commit_message>
<xml_diff>
--- a/Docs/documentation/uxon_presets.pptx
+++ b/Docs/documentation/uxon_presets.pptx
@@ -253,7 +253,7 @@
           <a:p>
             <a:fld id="{2DAF1186-F1D7-440D-B156-A260D91A3611}" type="datetimeFigureOut">
               <a:rPr lang="de-DE" smtClean="0"/>
-              <a:t>17.12.2020</a:t>
+              <a:t>23.12.2020</a:t>
             </a:fld>
             <a:endParaRPr lang="de-DE"/>
           </a:p>
@@ -423,7 +423,7 @@
           <a:p>
             <a:fld id="{2DAF1186-F1D7-440D-B156-A260D91A3611}" type="datetimeFigureOut">
               <a:rPr lang="de-DE" smtClean="0"/>
-              <a:t>17.12.2020</a:t>
+              <a:t>23.12.2020</a:t>
             </a:fld>
             <a:endParaRPr lang="de-DE"/>
           </a:p>
@@ -603,7 +603,7 @@
           <a:p>
             <a:fld id="{2DAF1186-F1D7-440D-B156-A260D91A3611}" type="datetimeFigureOut">
               <a:rPr lang="de-DE" smtClean="0"/>
-              <a:t>17.12.2020</a:t>
+              <a:t>23.12.2020</a:t>
             </a:fld>
             <a:endParaRPr lang="de-DE"/>
           </a:p>
@@ -773,7 +773,7 @@
           <a:p>
             <a:fld id="{2DAF1186-F1D7-440D-B156-A260D91A3611}" type="datetimeFigureOut">
               <a:rPr lang="de-DE" smtClean="0"/>
-              <a:t>17.12.2020</a:t>
+              <a:t>23.12.2020</a:t>
             </a:fld>
             <a:endParaRPr lang="de-DE"/>
           </a:p>
@@ -1019,7 +1019,7 @@
           <a:p>
             <a:fld id="{2DAF1186-F1D7-440D-B156-A260D91A3611}" type="datetimeFigureOut">
               <a:rPr lang="de-DE" smtClean="0"/>
-              <a:t>17.12.2020</a:t>
+              <a:t>23.12.2020</a:t>
             </a:fld>
             <a:endParaRPr lang="de-DE"/>
           </a:p>
@@ -1251,7 +1251,7 @@
           <a:p>
             <a:fld id="{2DAF1186-F1D7-440D-B156-A260D91A3611}" type="datetimeFigureOut">
               <a:rPr lang="de-DE" smtClean="0"/>
-              <a:t>17.12.2020</a:t>
+              <a:t>23.12.2020</a:t>
             </a:fld>
             <a:endParaRPr lang="de-DE"/>
           </a:p>
@@ -1618,7 +1618,7 @@
           <a:p>
             <a:fld id="{2DAF1186-F1D7-440D-B156-A260D91A3611}" type="datetimeFigureOut">
               <a:rPr lang="de-DE" smtClean="0"/>
-              <a:t>17.12.2020</a:t>
+              <a:t>23.12.2020</a:t>
             </a:fld>
             <a:endParaRPr lang="de-DE"/>
           </a:p>
@@ -1736,7 +1736,7 @@
           <a:p>
             <a:fld id="{2DAF1186-F1D7-440D-B156-A260D91A3611}" type="datetimeFigureOut">
               <a:rPr lang="de-DE" smtClean="0"/>
-              <a:t>17.12.2020</a:t>
+              <a:t>23.12.2020</a:t>
             </a:fld>
             <a:endParaRPr lang="de-DE"/>
           </a:p>
@@ -1831,7 +1831,7 @@
           <a:p>
             <a:fld id="{2DAF1186-F1D7-440D-B156-A260D91A3611}" type="datetimeFigureOut">
               <a:rPr lang="de-DE" smtClean="0"/>
-              <a:t>17.12.2020</a:t>
+              <a:t>23.12.2020</a:t>
             </a:fld>
             <a:endParaRPr lang="de-DE"/>
           </a:p>
@@ -2108,7 +2108,7 @@
           <a:p>
             <a:fld id="{2DAF1186-F1D7-440D-B156-A260D91A3611}" type="datetimeFigureOut">
               <a:rPr lang="de-DE" smtClean="0"/>
-              <a:t>17.12.2020</a:t>
+              <a:t>23.12.2020</a:t>
             </a:fld>
             <a:endParaRPr lang="de-DE"/>
           </a:p>
@@ -2361,7 +2361,7 @@
           <a:p>
             <a:fld id="{2DAF1186-F1D7-440D-B156-A260D91A3611}" type="datetimeFigureOut">
               <a:rPr lang="de-DE" smtClean="0"/>
-              <a:t>17.12.2020</a:t>
+              <a:t>23.12.2020</a:t>
             </a:fld>
             <a:endParaRPr lang="de-DE"/>
           </a:p>
@@ -2574,7 +2574,7 @@
           <a:p>
             <a:fld id="{2DAF1186-F1D7-440D-B156-A260D91A3611}" type="datetimeFigureOut">
               <a:rPr lang="de-DE" smtClean="0"/>
-              <a:t>17.12.2020</a:t>
+              <a:t>23.12.2020</a:t>
             </a:fld>
             <a:endParaRPr lang="de-DE"/>
           </a:p>
@@ -40362,6 +40362,344 @@
           </a:p>
         </p:txBody>
       </p:sp>
+      <p:sp>
+        <p:nvSpPr>
+          <p:cNvPr id="69" name="Rectangle 68"/>
+          <p:cNvSpPr/>
+          <p:nvPr/>
+        </p:nvSpPr>
+        <p:spPr>
+          <a:xfrm>
+            <a:off x="5275648" y="1924005"/>
+            <a:ext cx="2029770" cy="1215450"/>
+          </a:xfrm>
+          <a:prstGeom prst="rect">
+            <a:avLst/>
+          </a:prstGeom>
+          <a:noFill/>
+          <a:ln>
+            <a:prstDash val="dash"/>
+          </a:ln>
+        </p:spPr>
+        <p:style>
+          <a:lnRef idx="2">
+            <a:schemeClr val="accent1">
+              <a:shade val="50000"/>
+            </a:schemeClr>
+          </a:lnRef>
+          <a:fillRef idx="1">
+            <a:schemeClr val="accent1"/>
+          </a:fillRef>
+          <a:effectRef idx="0">
+            <a:schemeClr val="accent1"/>
+          </a:effectRef>
+          <a:fontRef idx="minor">
+            <a:schemeClr val="lt1"/>
+          </a:fontRef>
+        </p:style>
+        <p:txBody>
+          <a:bodyPr rtlCol="0" anchor="ctr"/>
+          <a:lstStyle/>
+          <a:p>
+            <a:pPr algn="ctr"/>
+            <a:endParaRPr lang="de-DE"/>
+          </a:p>
+        </p:txBody>
+      </p:sp>
+      <p:sp>
+        <p:nvSpPr>
+          <p:cNvPr id="70" name="Rectangle 69"/>
+          <p:cNvSpPr/>
+          <p:nvPr/>
+        </p:nvSpPr>
+        <p:spPr>
+          <a:xfrm>
+            <a:off x="6017213" y="2279562"/>
+            <a:ext cx="406237" cy="122333"/>
+          </a:xfrm>
+          <a:prstGeom prst="rect">
+            <a:avLst/>
+          </a:prstGeom>
+        </p:spPr>
+        <p:style>
+          <a:lnRef idx="2">
+            <a:schemeClr val="dk1"/>
+          </a:lnRef>
+          <a:fillRef idx="1">
+            <a:schemeClr val="lt1"/>
+          </a:fillRef>
+          <a:effectRef idx="0">
+            <a:schemeClr val="dk1"/>
+          </a:effectRef>
+          <a:fontRef idx="minor">
+            <a:schemeClr val="dk1"/>
+          </a:fontRef>
+        </p:style>
+        <p:txBody>
+          <a:bodyPr rtlCol="0" anchor="ctr"/>
+          <a:lstStyle/>
+          <a:p>
+            <a:pPr algn="r"/>
+            <a:r>
+              <a:rPr lang="de-DE" sz="800" dirty="0" smtClean="0"/>
+              <a:t>=f(x)</a:t>
+            </a:r>
+            <a:endParaRPr lang="de-DE" sz="800" dirty="0"/>
+          </a:p>
+        </p:txBody>
+      </p:sp>
+      <p:sp>
+        <p:nvSpPr>
+          <p:cNvPr id="71" name="Rectangle 70"/>
+          <p:cNvSpPr/>
+          <p:nvPr/>
+        </p:nvSpPr>
+        <p:spPr>
+          <a:xfrm>
+            <a:off x="6017212" y="2163275"/>
+            <a:ext cx="406237" cy="116287"/>
+          </a:xfrm>
+          <a:prstGeom prst="rect">
+            <a:avLst/>
+          </a:prstGeom>
+          <a:solidFill>
+            <a:schemeClr val="bg1">
+              <a:lumMod val="85000"/>
+            </a:schemeClr>
+          </a:solidFill>
+        </p:spPr>
+        <p:style>
+          <a:lnRef idx="2">
+            <a:schemeClr val="dk1"/>
+          </a:lnRef>
+          <a:fillRef idx="1">
+            <a:schemeClr val="lt1"/>
+          </a:fillRef>
+          <a:effectRef idx="0">
+            <a:schemeClr val="dk1"/>
+          </a:effectRef>
+          <a:fontRef idx="minor">
+            <a:schemeClr val="dk1"/>
+          </a:fontRef>
+        </p:style>
+        <p:txBody>
+          <a:bodyPr rtlCol="0" anchor="ctr"/>
+          <a:lstStyle/>
+          <a:p>
+            <a:endParaRPr lang="de-DE" dirty="0"/>
+          </a:p>
+        </p:txBody>
+      </p:sp>
+      <p:sp>
+        <p:nvSpPr>
+          <p:cNvPr id="72" name="Rectangle 71"/>
+          <p:cNvSpPr/>
+          <p:nvPr/>
+        </p:nvSpPr>
+        <p:spPr>
+          <a:xfrm>
+            <a:off x="6017213" y="2404712"/>
+            <a:ext cx="406237" cy="122333"/>
+          </a:xfrm>
+          <a:prstGeom prst="rect">
+            <a:avLst/>
+          </a:prstGeom>
+        </p:spPr>
+        <p:style>
+          <a:lnRef idx="2">
+            <a:schemeClr val="dk1"/>
+          </a:lnRef>
+          <a:fillRef idx="1">
+            <a:schemeClr val="lt1"/>
+          </a:fillRef>
+          <a:effectRef idx="0">
+            <a:schemeClr val="dk1"/>
+          </a:effectRef>
+          <a:fontRef idx="minor">
+            <a:schemeClr val="dk1"/>
+          </a:fontRef>
+        </p:style>
+        <p:txBody>
+          <a:bodyPr rtlCol="0" anchor="ctr"/>
+          <a:lstStyle/>
+          <a:p>
+            <a:pPr algn="r"/>
+            <a:r>
+              <a:rPr lang="de-DE" sz="800"/>
+              <a:t>=f(x)</a:t>
+            </a:r>
+            <a:endParaRPr lang="de-DE" sz="800" dirty="0"/>
+          </a:p>
+        </p:txBody>
+      </p:sp>
+      <p:sp>
+        <p:nvSpPr>
+          <p:cNvPr id="73" name="Rectangle 72"/>
+          <p:cNvSpPr/>
+          <p:nvPr/>
+        </p:nvSpPr>
+        <p:spPr>
+          <a:xfrm>
+            <a:off x="6017213" y="2525111"/>
+            <a:ext cx="406237" cy="122333"/>
+          </a:xfrm>
+          <a:prstGeom prst="rect">
+            <a:avLst/>
+          </a:prstGeom>
+        </p:spPr>
+        <p:style>
+          <a:lnRef idx="2">
+            <a:schemeClr val="dk1"/>
+          </a:lnRef>
+          <a:fillRef idx="1">
+            <a:schemeClr val="lt1"/>
+          </a:fillRef>
+          <a:effectRef idx="0">
+            <a:schemeClr val="dk1"/>
+          </a:effectRef>
+          <a:fontRef idx="minor">
+            <a:schemeClr val="dk1"/>
+          </a:fontRef>
+        </p:style>
+        <p:txBody>
+          <a:bodyPr rtlCol="0" anchor="ctr"/>
+          <a:lstStyle/>
+          <a:p>
+            <a:pPr algn="r"/>
+            <a:r>
+              <a:rPr lang="de-DE" sz="800"/>
+              <a:t>=f(x)</a:t>
+            </a:r>
+            <a:endParaRPr lang="de-DE" sz="800" dirty="0"/>
+          </a:p>
+        </p:txBody>
+      </p:sp>
+      <p:sp>
+        <p:nvSpPr>
+          <p:cNvPr id="74" name="Rectangle 73"/>
+          <p:cNvSpPr/>
+          <p:nvPr/>
+        </p:nvSpPr>
+        <p:spPr>
+          <a:xfrm>
+            <a:off x="6017213" y="2644553"/>
+            <a:ext cx="406237" cy="122333"/>
+          </a:xfrm>
+          <a:prstGeom prst="rect">
+            <a:avLst/>
+          </a:prstGeom>
+        </p:spPr>
+        <p:style>
+          <a:lnRef idx="2">
+            <a:schemeClr val="dk1"/>
+          </a:lnRef>
+          <a:fillRef idx="1">
+            <a:schemeClr val="lt1"/>
+          </a:fillRef>
+          <a:effectRef idx="0">
+            <a:schemeClr val="dk1"/>
+          </a:effectRef>
+          <a:fontRef idx="minor">
+            <a:schemeClr val="dk1"/>
+          </a:fontRef>
+        </p:style>
+        <p:txBody>
+          <a:bodyPr rtlCol="0" anchor="ctr"/>
+          <a:lstStyle/>
+          <a:p>
+            <a:pPr algn="r"/>
+            <a:r>
+              <a:rPr lang="de-DE" sz="800"/>
+              <a:t>=f(x)</a:t>
+            </a:r>
+            <a:endParaRPr lang="de-DE" sz="800" dirty="0"/>
+          </a:p>
+        </p:txBody>
+      </p:sp>
+      <p:sp>
+        <p:nvSpPr>
+          <p:cNvPr id="75" name="Rectangle 74"/>
+          <p:cNvSpPr/>
+          <p:nvPr/>
+        </p:nvSpPr>
+        <p:spPr>
+          <a:xfrm>
+            <a:off x="6017213" y="2764684"/>
+            <a:ext cx="406237" cy="122333"/>
+          </a:xfrm>
+          <a:prstGeom prst="rect">
+            <a:avLst/>
+          </a:prstGeom>
+        </p:spPr>
+        <p:style>
+          <a:lnRef idx="2">
+            <a:schemeClr val="dk1"/>
+          </a:lnRef>
+          <a:fillRef idx="1">
+            <a:schemeClr val="lt1"/>
+          </a:fillRef>
+          <a:effectRef idx="0">
+            <a:schemeClr val="dk1"/>
+          </a:effectRef>
+          <a:fontRef idx="minor">
+            <a:schemeClr val="dk1"/>
+          </a:fontRef>
+        </p:style>
+        <p:txBody>
+          <a:bodyPr rtlCol="0" anchor="ctr"/>
+          <a:lstStyle/>
+          <a:p>
+            <a:pPr algn="r"/>
+            <a:r>
+              <a:rPr lang="de-DE" sz="800"/>
+              <a:t>=f(x)</a:t>
+            </a:r>
+            <a:endParaRPr lang="de-DE" sz="800" dirty="0"/>
+          </a:p>
+        </p:txBody>
+      </p:sp>
+      <p:sp>
+        <p:nvSpPr>
+          <p:cNvPr id="84" name="Rectangle 83"/>
+          <p:cNvSpPr/>
+          <p:nvPr/>
+        </p:nvSpPr>
+        <p:spPr>
+          <a:xfrm>
+            <a:off x="6017212" y="2884126"/>
+            <a:ext cx="406237" cy="122333"/>
+          </a:xfrm>
+          <a:prstGeom prst="rect">
+            <a:avLst/>
+          </a:prstGeom>
+        </p:spPr>
+        <p:style>
+          <a:lnRef idx="2">
+            <a:schemeClr val="dk1"/>
+          </a:lnRef>
+          <a:fillRef idx="1">
+            <a:schemeClr val="lt1"/>
+          </a:fillRef>
+          <a:effectRef idx="0">
+            <a:schemeClr val="dk1"/>
+          </a:effectRef>
+          <a:fontRef idx="minor">
+            <a:schemeClr val="dk1"/>
+          </a:fontRef>
+        </p:style>
+        <p:txBody>
+          <a:bodyPr rtlCol="0" anchor="ctr"/>
+          <a:lstStyle/>
+          <a:p>
+            <a:pPr algn="r"/>
+            <a:r>
+              <a:rPr lang="de-DE" sz="800"/>
+              <a:t>=f(x)</a:t>
+            </a:r>
+            <a:endParaRPr lang="de-DE" sz="800" dirty="0"/>
+          </a:p>
+        </p:txBody>
+      </p:sp>
     </p:spTree>
     <p:extLst>
       <p:ext uri="{BB962C8B-B14F-4D97-AF65-F5344CB8AC3E}">

</xml_diff>

<commit_message>
NEW upload feature for widget ImageGallery + many improvements
</commit_message>
<xml_diff>
--- a/Docs/documentation/uxon_presets.pptx
+++ b/Docs/documentation/uxon_presets.pptx
@@ -254,7 +254,7 @@
           <a:p>
             <a:fld id="{2DAF1186-F1D7-440D-B156-A260D91A3611}" type="datetimeFigureOut">
               <a:rPr lang="de-DE" smtClean="0"/>
-              <a:t>05.05.2021</a:t>
+              <a:t>02.07.2021</a:t>
             </a:fld>
             <a:endParaRPr lang="de-DE"/>
           </a:p>
@@ -424,7 +424,7 @@
           <a:p>
             <a:fld id="{2DAF1186-F1D7-440D-B156-A260D91A3611}" type="datetimeFigureOut">
               <a:rPr lang="de-DE" smtClean="0"/>
-              <a:t>05.05.2021</a:t>
+              <a:t>02.07.2021</a:t>
             </a:fld>
             <a:endParaRPr lang="de-DE"/>
           </a:p>
@@ -604,7 +604,7 @@
           <a:p>
             <a:fld id="{2DAF1186-F1D7-440D-B156-A260D91A3611}" type="datetimeFigureOut">
               <a:rPr lang="de-DE" smtClean="0"/>
-              <a:t>05.05.2021</a:t>
+              <a:t>02.07.2021</a:t>
             </a:fld>
             <a:endParaRPr lang="de-DE"/>
           </a:p>
@@ -774,7 +774,7 @@
           <a:p>
             <a:fld id="{2DAF1186-F1D7-440D-B156-A260D91A3611}" type="datetimeFigureOut">
               <a:rPr lang="de-DE" smtClean="0"/>
-              <a:t>05.05.2021</a:t>
+              <a:t>02.07.2021</a:t>
             </a:fld>
             <a:endParaRPr lang="de-DE"/>
           </a:p>
@@ -1020,7 +1020,7 @@
           <a:p>
             <a:fld id="{2DAF1186-F1D7-440D-B156-A260D91A3611}" type="datetimeFigureOut">
               <a:rPr lang="de-DE" smtClean="0"/>
-              <a:t>05.05.2021</a:t>
+              <a:t>02.07.2021</a:t>
             </a:fld>
             <a:endParaRPr lang="de-DE"/>
           </a:p>
@@ -1252,7 +1252,7 @@
           <a:p>
             <a:fld id="{2DAF1186-F1D7-440D-B156-A260D91A3611}" type="datetimeFigureOut">
               <a:rPr lang="de-DE" smtClean="0"/>
-              <a:t>05.05.2021</a:t>
+              <a:t>02.07.2021</a:t>
             </a:fld>
             <a:endParaRPr lang="de-DE"/>
           </a:p>
@@ -1619,7 +1619,7 @@
           <a:p>
             <a:fld id="{2DAF1186-F1D7-440D-B156-A260D91A3611}" type="datetimeFigureOut">
               <a:rPr lang="de-DE" smtClean="0"/>
-              <a:t>05.05.2021</a:t>
+              <a:t>02.07.2021</a:t>
             </a:fld>
             <a:endParaRPr lang="de-DE"/>
           </a:p>
@@ -1737,7 +1737,7 @@
           <a:p>
             <a:fld id="{2DAF1186-F1D7-440D-B156-A260D91A3611}" type="datetimeFigureOut">
               <a:rPr lang="de-DE" smtClean="0"/>
-              <a:t>05.05.2021</a:t>
+              <a:t>02.07.2021</a:t>
             </a:fld>
             <a:endParaRPr lang="de-DE"/>
           </a:p>
@@ -1832,7 +1832,7 @@
           <a:p>
             <a:fld id="{2DAF1186-F1D7-440D-B156-A260D91A3611}" type="datetimeFigureOut">
               <a:rPr lang="de-DE" smtClean="0"/>
-              <a:t>05.05.2021</a:t>
+              <a:t>02.07.2021</a:t>
             </a:fld>
             <a:endParaRPr lang="de-DE"/>
           </a:p>
@@ -2109,7 +2109,7 @@
           <a:p>
             <a:fld id="{2DAF1186-F1D7-440D-B156-A260D91A3611}" type="datetimeFigureOut">
               <a:rPr lang="de-DE" smtClean="0"/>
-              <a:t>05.05.2021</a:t>
+              <a:t>02.07.2021</a:t>
             </a:fld>
             <a:endParaRPr lang="de-DE"/>
           </a:p>
@@ -2362,7 +2362,7 @@
           <a:p>
             <a:fld id="{2DAF1186-F1D7-440D-B156-A260D91A3611}" type="datetimeFigureOut">
               <a:rPr lang="de-DE" smtClean="0"/>
-              <a:t>05.05.2021</a:t>
+              <a:t>02.07.2021</a:t>
             </a:fld>
             <a:endParaRPr lang="de-DE"/>
           </a:p>
@@ -2575,7 +2575,7 @@
           <a:p>
             <a:fld id="{2DAF1186-F1D7-440D-B156-A260D91A3611}" type="datetimeFigureOut">
               <a:rPr lang="de-DE" smtClean="0"/>
-              <a:t>05.05.2021</a:t>
+              <a:t>02.07.2021</a:t>
             </a:fld>
             <a:endParaRPr lang="de-DE"/>
           </a:p>
@@ -45413,6 +45413,3252 @@
           </a:fontRef>
         </p:style>
       </p:cxnSp>
+      <p:grpSp>
+        <p:nvGrpSpPr>
+          <p:cNvPr id="5" name="Group 4">
+            <a:extLst>
+              <a:ext uri="{FF2B5EF4-FFF2-40B4-BE49-F238E27FC236}">
+                <a16:creationId xmlns:a16="http://schemas.microsoft.com/office/drawing/2014/main" id="{EF5AA39B-7D97-40DB-9398-40607AD87AFC}"/>
+              </a:ext>
+            </a:extLst>
+          </p:cNvPr>
+          <p:cNvGrpSpPr/>
+          <p:nvPr/>
+        </p:nvGrpSpPr>
+        <p:grpSpPr>
+          <a:xfrm>
+            <a:off x="979562" y="2219315"/>
+            <a:ext cx="565150" cy="376720"/>
+            <a:chOff x="6010275" y="857250"/>
+            <a:chExt cx="565150" cy="376720"/>
+          </a:xfrm>
+        </p:grpSpPr>
+        <p:sp>
+          <p:nvSpPr>
+            <p:cNvPr id="2" name="Rectangle 1">
+              <a:extLst>
+                <a:ext uri="{FF2B5EF4-FFF2-40B4-BE49-F238E27FC236}">
+                  <a16:creationId xmlns:a16="http://schemas.microsoft.com/office/drawing/2014/main" id="{119580DB-6ECC-498B-98D1-650279B26149}"/>
+                </a:ext>
+              </a:extLst>
+            </p:cNvPr>
+            <p:cNvSpPr/>
+            <p:nvPr/>
+          </p:nvSpPr>
+          <p:spPr>
+            <a:xfrm>
+              <a:off x="6010275" y="857250"/>
+              <a:ext cx="565150" cy="376720"/>
+            </a:xfrm>
+            <a:prstGeom prst="rect">
+              <a:avLst/>
+            </a:prstGeom>
+            <a:solidFill>
+              <a:schemeClr val="bg1">
+                <a:lumMod val="85000"/>
+              </a:schemeClr>
+            </a:solidFill>
+            <a:ln>
+              <a:solidFill>
+                <a:schemeClr val="bg1">
+                  <a:lumMod val="50000"/>
+                </a:schemeClr>
+              </a:solidFill>
+            </a:ln>
+          </p:spPr>
+          <p:style>
+            <a:lnRef idx="2">
+              <a:schemeClr val="accent1">
+                <a:shade val="50000"/>
+              </a:schemeClr>
+            </a:lnRef>
+            <a:fillRef idx="1">
+              <a:schemeClr val="accent1"/>
+            </a:fillRef>
+            <a:effectRef idx="0">
+              <a:schemeClr val="accent1"/>
+            </a:effectRef>
+            <a:fontRef idx="minor">
+              <a:schemeClr val="lt1"/>
+            </a:fontRef>
+          </p:style>
+          <p:txBody>
+            <a:bodyPr rtlCol="0" anchor="ctr"/>
+            <a:lstStyle/>
+            <a:p>
+              <a:pPr algn="ctr"/>
+              <a:endParaRPr lang="de-DE"/>
+            </a:p>
+          </p:txBody>
+        </p:sp>
+        <p:sp>
+          <p:nvSpPr>
+            <p:cNvPr id="3" name="Oval 2">
+              <a:extLst>
+                <a:ext uri="{FF2B5EF4-FFF2-40B4-BE49-F238E27FC236}">
+                  <a16:creationId xmlns:a16="http://schemas.microsoft.com/office/drawing/2014/main" id="{EC7746A4-211F-4916-AD8A-85982BE38FEF}"/>
+                </a:ext>
+              </a:extLst>
+            </p:cNvPr>
+            <p:cNvSpPr/>
+            <p:nvPr/>
+          </p:nvSpPr>
+          <p:spPr>
+            <a:xfrm>
+              <a:off x="6078199" y="898107"/>
+              <a:ext cx="110638" cy="111543"/>
+            </a:xfrm>
+            <a:prstGeom prst="ellipse">
+              <a:avLst/>
+            </a:prstGeom>
+            <a:solidFill>
+              <a:schemeClr val="bg1"/>
+            </a:solidFill>
+            <a:ln>
+              <a:noFill/>
+            </a:ln>
+          </p:spPr>
+          <p:style>
+            <a:lnRef idx="2">
+              <a:schemeClr val="accent1">
+                <a:shade val="50000"/>
+              </a:schemeClr>
+            </a:lnRef>
+            <a:fillRef idx="1">
+              <a:schemeClr val="accent1"/>
+            </a:fillRef>
+            <a:effectRef idx="0">
+              <a:schemeClr val="accent1"/>
+            </a:effectRef>
+            <a:fontRef idx="minor">
+              <a:schemeClr val="lt1"/>
+            </a:fontRef>
+          </p:style>
+          <p:txBody>
+            <a:bodyPr rtlCol="0" anchor="ctr"/>
+            <a:lstStyle/>
+            <a:p>
+              <a:pPr algn="ctr"/>
+              <a:endParaRPr lang="de-DE"/>
+            </a:p>
+          </p:txBody>
+        </p:sp>
+        <p:sp>
+          <p:nvSpPr>
+            <p:cNvPr id="4" name="Isosceles Triangle 3">
+              <a:extLst>
+                <a:ext uri="{FF2B5EF4-FFF2-40B4-BE49-F238E27FC236}">
+                  <a16:creationId xmlns:a16="http://schemas.microsoft.com/office/drawing/2014/main" id="{89074737-DA7F-4D08-A971-34DE22173842}"/>
+                </a:ext>
+              </a:extLst>
+            </p:cNvPr>
+            <p:cNvSpPr/>
+            <p:nvPr/>
+          </p:nvSpPr>
+          <p:spPr>
+            <a:xfrm>
+              <a:off x="6088669" y="1083097"/>
+              <a:ext cx="144618" cy="109342"/>
+            </a:xfrm>
+            <a:prstGeom prst="triangle">
+              <a:avLst/>
+            </a:prstGeom>
+            <a:solidFill>
+              <a:schemeClr val="bg1"/>
+            </a:solidFill>
+            <a:ln>
+              <a:noFill/>
+            </a:ln>
+          </p:spPr>
+          <p:style>
+            <a:lnRef idx="2">
+              <a:schemeClr val="accent1">
+                <a:shade val="50000"/>
+              </a:schemeClr>
+            </a:lnRef>
+            <a:fillRef idx="1">
+              <a:schemeClr val="accent1"/>
+            </a:fillRef>
+            <a:effectRef idx="0">
+              <a:schemeClr val="accent1"/>
+            </a:effectRef>
+            <a:fontRef idx="minor">
+              <a:schemeClr val="lt1"/>
+            </a:fontRef>
+          </p:style>
+          <p:txBody>
+            <a:bodyPr rtlCol="0" anchor="ctr"/>
+            <a:lstStyle/>
+            <a:p>
+              <a:pPr algn="ctr"/>
+              <a:endParaRPr lang="de-DE"/>
+            </a:p>
+          </p:txBody>
+        </p:sp>
+        <p:sp>
+          <p:nvSpPr>
+            <p:cNvPr id="154" name="Isosceles Triangle 153">
+              <a:extLst>
+                <a:ext uri="{FF2B5EF4-FFF2-40B4-BE49-F238E27FC236}">
+                  <a16:creationId xmlns:a16="http://schemas.microsoft.com/office/drawing/2014/main" id="{03768154-75AD-4894-BF93-9B4A4D587182}"/>
+                </a:ext>
+              </a:extLst>
+            </p:cNvPr>
+            <p:cNvSpPr/>
+            <p:nvPr/>
+          </p:nvSpPr>
+          <p:spPr>
+            <a:xfrm>
+              <a:off x="6201383" y="946582"/>
+              <a:ext cx="311303" cy="245857"/>
+            </a:xfrm>
+            <a:prstGeom prst="triangle">
+              <a:avLst/>
+            </a:prstGeom>
+            <a:solidFill>
+              <a:schemeClr val="bg1"/>
+            </a:solidFill>
+            <a:ln>
+              <a:noFill/>
+            </a:ln>
+          </p:spPr>
+          <p:style>
+            <a:lnRef idx="2">
+              <a:schemeClr val="accent1">
+                <a:shade val="50000"/>
+              </a:schemeClr>
+            </a:lnRef>
+            <a:fillRef idx="1">
+              <a:schemeClr val="accent1"/>
+            </a:fillRef>
+            <a:effectRef idx="0">
+              <a:schemeClr val="accent1"/>
+            </a:effectRef>
+            <a:fontRef idx="minor">
+              <a:schemeClr val="lt1"/>
+            </a:fontRef>
+          </p:style>
+          <p:txBody>
+            <a:bodyPr rtlCol="0" anchor="ctr"/>
+            <a:lstStyle/>
+            <a:p>
+              <a:pPr algn="ctr"/>
+              <a:endParaRPr lang="de-DE"/>
+            </a:p>
+          </p:txBody>
+        </p:sp>
+      </p:grpSp>
+      <p:grpSp>
+        <p:nvGrpSpPr>
+          <p:cNvPr id="161" name="Group 160">
+            <a:extLst>
+              <a:ext uri="{FF2B5EF4-FFF2-40B4-BE49-F238E27FC236}">
+                <a16:creationId xmlns:a16="http://schemas.microsoft.com/office/drawing/2014/main" id="{D291068F-1740-42BD-9E5E-9B5D07A74CBC}"/>
+              </a:ext>
+            </a:extLst>
+          </p:cNvPr>
+          <p:cNvGrpSpPr/>
+          <p:nvPr/>
+        </p:nvGrpSpPr>
+        <p:grpSpPr>
+          <a:xfrm>
+            <a:off x="1583978" y="2219315"/>
+            <a:ext cx="565150" cy="376720"/>
+            <a:chOff x="6010275" y="857250"/>
+            <a:chExt cx="565150" cy="376720"/>
+          </a:xfrm>
+        </p:grpSpPr>
+        <p:sp>
+          <p:nvSpPr>
+            <p:cNvPr id="162" name="Rectangle 161">
+              <a:extLst>
+                <a:ext uri="{FF2B5EF4-FFF2-40B4-BE49-F238E27FC236}">
+                  <a16:creationId xmlns:a16="http://schemas.microsoft.com/office/drawing/2014/main" id="{FE03A01B-64EF-44E3-8221-E05D39381147}"/>
+                </a:ext>
+              </a:extLst>
+            </p:cNvPr>
+            <p:cNvSpPr/>
+            <p:nvPr/>
+          </p:nvSpPr>
+          <p:spPr>
+            <a:xfrm>
+              <a:off x="6010275" y="857250"/>
+              <a:ext cx="565150" cy="376720"/>
+            </a:xfrm>
+            <a:prstGeom prst="rect">
+              <a:avLst/>
+            </a:prstGeom>
+            <a:solidFill>
+              <a:schemeClr val="bg1">
+                <a:lumMod val="85000"/>
+              </a:schemeClr>
+            </a:solidFill>
+            <a:ln>
+              <a:solidFill>
+                <a:schemeClr val="bg1">
+                  <a:lumMod val="50000"/>
+                </a:schemeClr>
+              </a:solidFill>
+            </a:ln>
+          </p:spPr>
+          <p:style>
+            <a:lnRef idx="2">
+              <a:schemeClr val="accent1">
+                <a:shade val="50000"/>
+              </a:schemeClr>
+            </a:lnRef>
+            <a:fillRef idx="1">
+              <a:schemeClr val="accent1"/>
+            </a:fillRef>
+            <a:effectRef idx="0">
+              <a:schemeClr val="accent1"/>
+            </a:effectRef>
+            <a:fontRef idx="minor">
+              <a:schemeClr val="lt1"/>
+            </a:fontRef>
+          </p:style>
+          <p:txBody>
+            <a:bodyPr rtlCol="0" anchor="ctr"/>
+            <a:lstStyle/>
+            <a:p>
+              <a:pPr algn="ctr"/>
+              <a:endParaRPr lang="de-DE"/>
+            </a:p>
+          </p:txBody>
+        </p:sp>
+        <p:sp>
+          <p:nvSpPr>
+            <p:cNvPr id="163" name="Oval 162">
+              <a:extLst>
+                <a:ext uri="{FF2B5EF4-FFF2-40B4-BE49-F238E27FC236}">
+                  <a16:creationId xmlns:a16="http://schemas.microsoft.com/office/drawing/2014/main" id="{9FCA5BD9-9D2E-4259-919C-53D2EE8017E2}"/>
+                </a:ext>
+              </a:extLst>
+            </p:cNvPr>
+            <p:cNvSpPr/>
+            <p:nvPr/>
+          </p:nvSpPr>
+          <p:spPr>
+            <a:xfrm>
+              <a:off x="6078199" y="898107"/>
+              <a:ext cx="110638" cy="111543"/>
+            </a:xfrm>
+            <a:prstGeom prst="ellipse">
+              <a:avLst/>
+            </a:prstGeom>
+            <a:solidFill>
+              <a:schemeClr val="bg1"/>
+            </a:solidFill>
+            <a:ln>
+              <a:noFill/>
+            </a:ln>
+          </p:spPr>
+          <p:style>
+            <a:lnRef idx="2">
+              <a:schemeClr val="accent1">
+                <a:shade val="50000"/>
+              </a:schemeClr>
+            </a:lnRef>
+            <a:fillRef idx="1">
+              <a:schemeClr val="accent1"/>
+            </a:fillRef>
+            <a:effectRef idx="0">
+              <a:schemeClr val="accent1"/>
+            </a:effectRef>
+            <a:fontRef idx="minor">
+              <a:schemeClr val="lt1"/>
+            </a:fontRef>
+          </p:style>
+          <p:txBody>
+            <a:bodyPr rtlCol="0" anchor="ctr"/>
+            <a:lstStyle/>
+            <a:p>
+              <a:pPr algn="ctr"/>
+              <a:endParaRPr lang="de-DE"/>
+            </a:p>
+          </p:txBody>
+        </p:sp>
+        <p:sp>
+          <p:nvSpPr>
+            <p:cNvPr id="164" name="Isosceles Triangle 163">
+              <a:extLst>
+                <a:ext uri="{FF2B5EF4-FFF2-40B4-BE49-F238E27FC236}">
+                  <a16:creationId xmlns:a16="http://schemas.microsoft.com/office/drawing/2014/main" id="{FF3D25CC-267C-4391-B6A3-37438FA6613E}"/>
+                </a:ext>
+              </a:extLst>
+            </p:cNvPr>
+            <p:cNvSpPr/>
+            <p:nvPr/>
+          </p:nvSpPr>
+          <p:spPr>
+            <a:xfrm>
+              <a:off x="6088669" y="1083097"/>
+              <a:ext cx="144618" cy="109342"/>
+            </a:xfrm>
+            <a:prstGeom prst="triangle">
+              <a:avLst/>
+            </a:prstGeom>
+            <a:solidFill>
+              <a:schemeClr val="bg1"/>
+            </a:solidFill>
+            <a:ln>
+              <a:noFill/>
+            </a:ln>
+          </p:spPr>
+          <p:style>
+            <a:lnRef idx="2">
+              <a:schemeClr val="accent1">
+                <a:shade val="50000"/>
+              </a:schemeClr>
+            </a:lnRef>
+            <a:fillRef idx="1">
+              <a:schemeClr val="accent1"/>
+            </a:fillRef>
+            <a:effectRef idx="0">
+              <a:schemeClr val="accent1"/>
+            </a:effectRef>
+            <a:fontRef idx="minor">
+              <a:schemeClr val="lt1"/>
+            </a:fontRef>
+          </p:style>
+          <p:txBody>
+            <a:bodyPr rtlCol="0" anchor="ctr"/>
+            <a:lstStyle/>
+            <a:p>
+              <a:pPr algn="ctr"/>
+              <a:endParaRPr lang="de-DE"/>
+            </a:p>
+          </p:txBody>
+        </p:sp>
+        <p:sp>
+          <p:nvSpPr>
+            <p:cNvPr id="165" name="Isosceles Triangle 164">
+              <a:extLst>
+                <a:ext uri="{FF2B5EF4-FFF2-40B4-BE49-F238E27FC236}">
+                  <a16:creationId xmlns:a16="http://schemas.microsoft.com/office/drawing/2014/main" id="{F7609DF9-BAFB-42F8-890E-D2C700B6F085}"/>
+                </a:ext>
+              </a:extLst>
+            </p:cNvPr>
+            <p:cNvSpPr/>
+            <p:nvPr/>
+          </p:nvSpPr>
+          <p:spPr>
+            <a:xfrm>
+              <a:off x="6201383" y="946582"/>
+              <a:ext cx="311303" cy="245857"/>
+            </a:xfrm>
+            <a:prstGeom prst="triangle">
+              <a:avLst/>
+            </a:prstGeom>
+            <a:solidFill>
+              <a:schemeClr val="bg1"/>
+            </a:solidFill>
+            <a:ln>
+              <a:noFill/>
+            </a:ln>
+          </p:spPr>
+          <p:style>
+            <a:lnRef idx="2">
+              <a:schemeClr val="accent1">
+                <a:shade val="50000"/>
+              </a:schemeClr>
+            </a:lnRef>
+            <a:fillRef idx="1">
+              <a:schemeClr val="accent1"/>
+            </a:fillRef>
+            <a:effectRef idx="0">
+              <a:schemeClr val="accent1"/>
+            </a:effectRef>
+            <a:fontRef idx="minor">
+              <a:schemeClr val="lt1"/>
+            </a:fontRef>
+          </p:style>
+          <p:txBody>
+            <a:bodyPr rtlCol="0" anchor="ctr"/>
+            <a:lstStyle/>
+            <a:p>
+              <a:pPr algn="ctr"/>
+              <a:endParaRPr lang="de-DE"/>
+            </a:p>
+          </p:txBody>
+        </p:sp>
+      </p:grpSp>
+      <p:grpSp>
+        <p:nvGrpSpPr>
+          <p:cNvPr id="166" name="Group 165">
+            <a:extLst>
+              <a:ext uri="{FF2B5EF4-FFF2-40B4-BE49-F238E27FC236}">
+                <a16:creationId xmlns:a16="http://schemas.microsoft.com/office/drawing/2014/main" id="{43C80658-6E08-489E-81DF-EA47287E82F1}"/>
+              </a:ext>
+            </a:extLst>
+          </p:cNvPr>
+          <p:cNvGrpSpPr/>
+          <p:nvPr/>
+        </p:nvGrpSpPr>
+        <p:grpSpPr>
+          <a:xfrm>
+            <a:off x="2192696" y="2219315"/>
+            <a:ext cx="565150" cy="376720"/>
+            <a:chOff x="6010275" y="857250"/>
+            <a:chExt cx="565150" cy="376720"/>
+          </a:xfrm>
+        </p:grpSpPr>
+        <p:sp>
+          <p:nvSpPr>
+            <p:cNvPr id="167" name="Rectangle 166">
+              <a:extLst>
+                <a:ext uri="{FF2B5EF4-FFF2-40B4-BE49-F238E27FC236}">
+                  <a16:creationId xmlns:a16="http://schemas.microsoft.com/office/drawing/2014/main" id="{CD7BA184-9E2E-4249-ACDE-D69919EBEA36}"/>
+                </a:ext>
+              </a:extLst>
+            </p:cNvPr>
+            <p:cNvSpPr/>
+            <p:nvPr/>
+          </p:nvSpPr>
+          <p:spPr>
+            <a:xfrm>
+              <a:off x="6010275" y="857250"/>
+              <a:ext cx="565150" cy="376720"/>
+            </a:xfrm>
+            <a:prstGeom prst="rect">
+              <a:avLst/>
+            </a:prstGeom>
+            <a:solidFill>
+              <a:schemeClr val="bg1">
+                <a:lumMod val="85000"/>
+              </a:schemeClr>
+            </a:solidFill>
+            <a:ln>
+              <a:solidFill>
+                <a:schemeClr val="bg1">
+                  <a:lumMod val="50000"/>
+                </a:schemeClr>
+              </a:solidFill>
+            </a:ln>
+          </p:spPr>
+          <p:style>
+            <a:lnRef idx="2">
+              <a:schemeClr val="accent1">
+                <a:shade val="50000"/>
+              </a:schemeClr>
+            </a:lnRef>
+            <a:fillRef idx="1">
+              <a:schemeClr val="accent1"/>
+            </a:fillRef>
+            <a:effectRef idx="0">
+              <a:schemeClr val="accent1"/>
+            </a:effectRef>
+            <a:fontRef idx="minor">
+              <a:schemeClr val="lt1"/>
+            </a:fontRef>
+          </p:style>
+          <p:txBody>
+            <a:bodyPr rtlCol="0" anchor="ctr"/>
+            <a:lstStyle/>
+            <a:p>
+              <a:pPr algn="ctr"/>
+              <a:endParaRPr lang="de-DE"/>
+            </a:p>
+          </p:txBody>
+        </p:sp>
+        <p:sp>
+          <p:nvSpPr>
+            <p:cNvPr id="168" name="Oval 167">
+              <a:extLst>
+                <a:ext uri="{FF2B5EF4-FFF2-40B4-BE49-F238E27FC236}">
+                  <a16:creationId xmlns:a16="http://schemas.microsoft.com/office/drawing/2014/main" id="{E92ADC3B-0FD7-4EA5-A39B-EF078EC3A0F7}"/>
+                </a:ext>
+              </a:extLst>
+            </p:cNvPr>
+            <p:cNvSpPr/>
+            <p:nvPr/>
+          </p:nvSpPr>
+          <p:spPr>
+            <a:xfrm>
+              <a:off x="6078199" y="898107"/>
+              <a:ext cx="110638" cy="111543"/>
+            </a:xfrm>
+            <a:prstGeom prst="ellipse">
+              <a:avLst/>
+            </a:prstGeom>
+            <a:solidFill>
+              <a:schemeClr val="bg1"/>
+            </a:solidFill>
+            <a:ln>
+              <a:noFill/>
+            </a:ln>
+          </p:spPr>
+          <p:style>
+            <a:lnRef idx="2">
+              <a:schemeClr val="accent1">
+                <a:shade val="50000"/>
+              </a:schemeClr>
+            </a:lnRef>
+            <a:fillRef idx="1">
+              <a:schemeClr val="accent1"/>
+            </a:fillRef>
+            <a:effectRef idx="0">
+              <a:schemeClr val="accent1"/>
+            </a:effectRef>
+            <a:fontRef idx="minor">
+              <a:schemeClr val="lt1"/>
+            </a:fontRef>
+          </p:style>
+          <p:txBody>
+            <a:bodyPr rtlCol="0" anchor="ctr"/>
+            <a:lstStyle/>
+            <a:p>
+              <a:pPr algn="ctr"/>
+              <a:endParaRPr lang="de-DE"/>
+            </a:p>
+          </p:txBody>
+        </p:sp>
+        <p:sp>
+          <p:nvSpPr>
+            <p:cNvPr id="169" name="Isosceles Triangle 168">
+              <a:extLst>
+                <a:ext uri="{FF2B5EF4-FFF2-40B4-BE49-F238E27FC236}">
+                  <a16:creationId xmlns:a16="http://schemas.microsoft.com/office/drawing/2014/main" id="{CAC6F083-0E33-40DE-A973-B2B17BFC18F4}"/>
+                </a:ext>
+              </a:extLst>
+            </p:cNvPr>
+            <p:cNvSpPr/>
+            <p:nvPr/>
+          </p:nvSpPr>
+          <p:spPr>
+            <a:xfrm>
+              <a:off x="6088669" y="1083097"/>
+              <a:ext cx="144618" cy="109342"/>
+            </a:xfrm>
+            <a:prstGeom prst="triangle">
+              <a:avLst/>
+            </a:prstGeom>
+            <a:solidFill>
+              <a:schemeClr val="bg1"/>
+            </a:solidFill>
+            <a:ln>
+              <a:noFill/>
+            </a:ln>
+          </p:spPr>
+          <p:style>
+            <a:lnRef idx="2">
+              <a:schemeClr val="accent1">
+                <a:shade val="50000"/>
+              </a:schemeClr>
+            </a:lnRef>
+            <a:fillRef idx="1">
+              <a:schemeClr val="accent1"/>
+            </a:fillRef>
+            <a:effectRef idx="0">
+              <a:schemeClr val="accent1"/>
+            </a:effectRef>
+            <a:fontRef idx="minor">
+              <a:schemeClr val="lt1"/>
+            </a:fontRef>
+          </p:style>
+          <p:txBody>
+            <a:bodyPr rtlCol="0" anchor="ctr"/>
+            <a:lstStyle/>
+            <a:p>
+              <a:pPr algn="ctr"/>
+              <a:endParaRPr lang="de-DE"/>
+            </a:p>
+          </p:txBody>
+        </p:sp>
+        <p:sp>
+          <p:nvSpPr>
+            <p:cNvPr id="170" name="Isosceles Triangle 169">
+              <a:extLst>
+                <a:ext uri="{FF2B5EF4-FFF2-40B4-BE49-F238E27FC236}">
+                  <a16:creationId xmlns:a16="http://schemas.microsoft.com/office/drawing/2014/main" id="{D630EC5D-3B9A-4A4A-AEF2-A57056221F7B}"/>
+                </a:ext>
+              </a:extLst>
+            </p:cNvPr>
+            <p:cNvSpPr/>
+            <p:nvPr/>
+          </p:nvSpPr>
+          <p:spPr>
+            <a:xfrm>
+              <a:off x="6201383" y="946582"/>
+              <a:ext cx="311303" cy="245857"/>
+            </a:xfrm>
+            <a:prstGeom prst="triangle">
+              <a:avLst/>
+            </a:prstGeom>
+            <a:solidFill>
+              <a:schemeClr val="bg1"/>
+            </a:solidFill>
+            <a:ln>
+              <a:noFill/>
+            </a:ln>
+          </p:spPr>
+          <p:style>
+            <a:lnRef idx="2">
+              <a:schemeClr val="accent1">
+                <a:shade val="50000"/>
+              </a:schemeClr>
+            </a:lnRef>
+            <a:fillRef idx="1">
+              <a:schemeClr val="accent1"/>
+            </a:fillRef>
+            <a:effectRef idx="0">
+              <a:schemeClr val="accent1"/>
+            </a:effectRef>
+            <a:fontRef idx="minor">
+              <a:schemeClr val="lt1"/>
+            </a:fontRef>
+          </p:style>
+          <p:txBody>
+            <a:bodyPr rtlCol="0" anchor="ctr"/>
+            <a:lstStyle/>
+            <a:p>
+              <a:pPr algn="ctr"/>
+              <a:endParaRPr lang="de-DE"/>
+            </a:p>
+          </p:txBody>
+        </p:sp>
+      </p:grpSp>
+      <p:sp>
+        <p:nvSpPr>
+          <p:cNvPr id="6" name="Rectangle 5">
+            <a:extLst>
+              <a:ext uri="{FF2B5EF4-FFF2-40B4-BE49-F238E27FC236}">
+                <a16:creationId xmlns:a16="http://schemas.microsoft.com/office/drawing/2014/main" id="{4A1A2CCA-17D1-46EE-ACEE-8C1231C81DBE}"/>
+              </a:ext>
+            </a:extLst>
+          </p:cNvPr>
+          <p:cNvSpPr/>
+          <p:nvPr/>
+        </p:nvSpPr>
+        <p:spPr>
+          <a:xfrm>
+            <a:off x="2454940" y="2143885"/>
+            <a:ext cx="343356" cy="537472"/>
+          </a:xfrm>
+          <a:prstGeom prst="rect">
+            <a:avLst/>
+          </a:prstGeom>
+          <a:solidFill>
+            <a:schemeClr val="bg1"/>
+          </a:solidFill>
+          <a:ln>
+            <a:noFill/>
+          </a:ln>
+        </p:spPr>
+        <p:style>
+          <a:lnRef idx="2">
+            <a:schemeClr val="accent1">
+              <a:shade val="50000"/>
+            </a:schemeClr>
+          </a:lnRef>
+          <a:fillRef idx="1">
+            <a:schemeClr val="accent1"/>
+          </a:fillRef>
+          <a:effectRef idx="0">
+            <a:schemeClr val="accent1"/>
+          </a:effectRef>
+          <a:fontRef idx="minor">
+            <a:schemeClr val="lt1"/>
+          </a:fontRef>
+        </p:style>
+        <p:txBody>
+          <a:bodyPr rtlCol="0" anchor="ctr"/>
+          <a:lstStyle/>
+          <a:p>
+            <a:pPr algn="ctr"/>
+            <a:endParaRPr lang="de-DE"/>
+          </a:p>
+        </p:txBody>
+      </p:sp>
+      <p:sp>
+        <p:nvSpPr>
+          <p:cNvPr id="153" name="Rectangle 152">
+            <a:extLst>
+              <a:ext uri="{FF2B5EF4-FFF2-40B4-BE49-F238E27FC236}">
+                <a16:creationId xmlns:a16="http://schemas.microsoft.com/office/drawing/2014/main" id="{52FFE35E-DC87-4E81-B06E-D7AD5A972C1D}"/>
+              </a:ext>
+            </a:extLst>
+          </p:cNvPr>
+          <p:cNvSpPr/>
+          <p:nvPr/>
+        </p:nvSpPr>
+        <p:spPr>
+          <a:xfrm>
+            <a:off x="798587" y="2105014"/>
+            <a:ext cx="1865902" cy="606879"/>
+          </a:xfrm>
+          <a:prstGeom prst="rect">
+            <a:avLst/>
+          </a:prstGeom>
+          <a:noFill/>
+        </p:spPr>
+        <p:style>
+          <a:lnRef idx="2">
+            <a:schemeClr val="dk1"/>
+          </a:lnRef>
+          <a:fillRef idx="1">
+            <a:schemeClr val="lt1"/>
+          </a:fillRef>
+          <a:effectRef idx="0">
+            <a:schemeClr val="dk1"/>
+          </a:effectRef>
+          <a:fontRef idx="minor">
+            <a:schemeClr val="dk1"/>
+          </a:fontRef>
+        </p:style>
+        <p:txBody>
+          <a:bodyPr rtlCol="0" anchor="ctr"/>
+          <a:lstStyle/>
+          <a:p>
+            <a:endParaRPr lang="de-DE" dirty="0"/>
+          </a:p>
+        </p:txBody>
+      </p:sp>
+      <p:sp>
+        <p:nvSpPr>
+          <p:cNvPr id="116" name="Rectangle 115">
+            <a:extLst>
+              <a:ext uri="{FF2B5EF4-FFF2-40B4-BE49-F238E27FC236}">
+                <a16:creationId xmlns:a16="http://schemas.microsoft.com/office/drawing/2014/main" id="{9C9A67A4-6058-43D0-A6E8-AD86096D1700}"/>
+              </a:ext>
+            </a:extLst>
+          </p:cNvPr>
+          <p:cNvSpPr/>
+          <p:nvPr/>
+        </p:nvSpPr>
+        <p:spPr>
+          <a:xfrm>
+            <a:off x="715530" y="1839376"/>
+            <a:ext cx="2029770" cy="1215450"/>
+          </a:xfrm>
+          <a:prstGeom prst="rect">
+            <a:avLst/>
+          </a:prstGeom>
+          <a:noFill/>
+          <a:ln>
+            <a:prstDash val="dash"/>
+          </a:ln>
+        </p:spPr>
+        <p:style>
+          <a:lnRef idx="2">
+            <a:schemeClr val="accent1">
+              <a:shade val="50000"/>
+            </a:schemeClr>
+          </a:lnRef>
+          <a:fillRef idx="1">
+            <a:schemeClr val="accent1"/>
+          </a:fillRef>
+          <a:effectRef idx="0">
+            <a:schemeClr val="accent1"/>
+          </a:effectRef>
+          <a:fontRef idx="minor">
+            <a:schemeClr val="lt1"/>
+          </a:fontRef>
+        </p:style>
+        <p:txBody>
+          <a:bodyPr rtlCol="0" anchor="ctr"/>
+          <a:lstStyle/>
+          <a:p>
+            <a:pPr algn="ctr"/>
+            <a:endParaRPr lang="de-DE"/>
+          </a:p>
+        </p:txBody>
+      </p:sp>
+      <p:sp>
+        <p:nvSpPr>
+          <p:cNvPr id="7" name="Arrow: Down 6">
+            <a:extLst>
+              <a:ext uri="{FF2B5EF4-FFF2-40B4-BE49-F238E27FC236}">
+                <a16:creationId xmlns:a16="http://schemas.microsoft.com/office/drawing/2014/main" id="{BF050EEE-9E18-4351-8623-DCD732C5C6BD}"/>
+              </a:ext>
+            </a:extLst>
+          </p:cNvPr>
+          <p:cNvSpPr/>
+          <p:nvPr/>
+        </p:nvSpPr>
+        <p:spPr>
+          <a:xfrm rot="5400000">
+            <a:off x="785771" y="2366677"/>
+            <a:ext cx="190123" cy="102624"/>
+          </a:xfrm>
+          <a:prstGeom prst="downArrow">
+            <a:avLst/>
+          </a:prstGeom>
+          <a:solidFill>
+            <a:schemeClr val="bg1">
+              <a:lumMod val="85000"/>
+            </a:schemeClr>
+          </a:solidFill>
+        </p:spPr>
+        <p:style>
+          <a:lnRef idx="2">
+            <a:schemeClr val="dk1"/>
+          </a:lnRef>
+          <a:fillRef idx="1">
+            <a:schemeClr val="lt1"/>
+          </a:fillRef>
+          <a:effectRef idx="0">
+            <a:schemeClr val="dk1"/>
+          </a:effectRef>
+          <a:fontRef idx="minor">
+            <a:schemeClr val="dk1"/>
+          </a:fontRef>
+        </p:style>
+        <p:txBody>
+          <a:bodyPr rtlCol="0" anchor="ctr"/>
+          <a:lstStyle/>
+          <a:p>
+            <a:pPr algn="ctr"/>
+            <a:endParaRPr lang="de-DE">
+              <a:solidFill>
+                <a:schemeClr val="dk1"/>
+              </a:solidFill>
+            </a:endParaRPr>
+          </a:p>
+        </p:txBody>
+      </p:sp>
+      <p:sp>
+        <p:nvSpPr>
+          <p:cNvPr id="171" name="Arrow: Down 170">
+            <a:extLst>
+              <a:ext uri="{FF2B5EF4-FFF2-40B4-BE49-F238E27FC236}">
+                <a16:creationId xmlns:a16="http://schemas.microsoft.com/office/drawing/2014/main" id="{78113E5E-54FA-45A8-B25B-E8B4AE92421E}"/>
+              </a:ext>
+            </a:extLst>
+          </p:cNvPr>
+          <p:cNvSpPr/>
+          <p:nvPr/>
+        </p:nvSpPr>
+        <p:spPr>
+          <a:xfrm rot="16200000">
+            <a:off x="2466423" y="2366678"/>
+            <a:ext cx="190123" cy="102624"/>
+          </a:xfrm>
+          <a:prstGeom prst="downArrow">
+            <a:avLst/>
+          </a:prstGeom>
+          <a:solidFill>
+            <a:schemeClr val="bg1">
+              <a:lumMod val="85000"/>
+            </a:schemeClr>
+          </a:solidFill>
+        </p:spPr>
+        <p:style>
+          <a:lnRef idx="2">
+            <a:schemeClr val="dk1"/>
+          </a:lnRef>
+          <a:fillRef idx="1">
+            <a:schemeClr val="lt1"/>
+          </a:fillRef>
+          <a:effectRef idx="0">
+            <a:schemeClr val="dk1"/>
+          </a:effectRef>
+          <a:fontRef idx="minor">
+            <a:schemeClr val="dk1"/>
+          </a:fontRef>
+        </p:style>
+        <p:txBody>
+          <a:bodyPr rtlCol="0" anchor="ctr"/>
+          <a:lstStyle/>
+          <a:p>
+            <a:pPr algn="ctr"/>
+            <a:endParaRPr lang="de-DE">
+              <a:solidFill>
+                <a:schemeClr val="dk1"/>
+              </a:solidFill>
+            </a:endParaRPr>
+          </a:p>
+        </p:txBody>
+      </p:sp>
+      <p:grpSp>
+        <p:nvGrpSpPr>
+          <p:cNvPr id="172" name="Group 171">
+            <a:extLst>
+              <a:ext uri="{FF2B5EF4-FFF2-40B4-BE49-F238E27FC236}">
+                <a16:creationId xmlns:a16="http://schemas.microsoft.com/office/drawing/2014/main" id="{856E1687-33F6-4E97-A09A-1D149BF1462E}"/>
+              </a:ext>
+            </a:extLst>
+          </p:cNvPr>
+          <p:cNvGrpSpPr/>
+          <p:nvPr/>
+        </p:nvGrpSpPr>
+        <p:grpSpPr>
+          <a:xfrm>
+            <a:off x="3171310" y="2390765"/>
+            <a:ext cx="565150" cy="376720"/>
+            <a:chOff x="6010275" y="857250"/>
+            <a:chExt cx="565150" cy="376720"/>
+          </a:xfrm>
+        </p:grpSpPr>
+        <p:sp>
+          <p:nvSpPr>
+            <p:cNvPr id="173" name="Rectangle 172">
+              <a:extLst>
+                <a:ext uri="{FF2B5EF4-FFF2-40B4-BE49-F238E27FC236}">
+                  <a16:creationId xmlns:a16="http://schemas.microsoft.com/office/drawing/2014/main" id="{7AE73034-7803-4CB1-B7EE-7AEBBA341522}"/>
+                </a:ext>
+              </a:extLst>
+            </p:cNvPr>
+            <p:cNvSpPr/>
+            <p:nvPr/>
+          </p:nvSpPr>
+          <p:spPr>
+            <a:xfrm>
+              <a:off x="6010275" y="857250"/>
+              <a:ext cx="565150" cy="376720"/>
+            </a:xfrm>
+            <a:prstGeom prst="rect">
+              <a:avLst/>
+            </a:prstGeom>
+            <a:solidFill>
+              <a:schemeClr val="bg1">
+                <a:lumMod val="85000"/>
+              </a:schemeClr>
+            </a:solidFill>
+            <a:ln>
+              <a:solidFill>
+                <a:schemeClr val="bg1">
+                  <a:lumMod val="50000"/>
+                </a:schemeClr>
+              </a:solidFill>
+            </a:ln>
+          </p:spPr>
+          <p:style>
+            <a:lnRef idx="2">
+              <a:schemeClr val="accent1">
+                <a:shade val="50000"/>
+              </a:schemeClr>
+            </a:lnRef>
+            <a:fillRef idx="1">
+              <a:schemeClr val="accent1"/>
+            </a:fillRef>
+            <a:effectRef idx="0">
+              <a:schemeClr val="accent1"/>
+            </a:effectRef>
+            <a:fontRef idx="minor">
+              <a:schemeClr val="lt1"/>
+            </a:fontRef>
+          </p:style>
+          <p:txBody>
+            <a:bodyPr rtlCol="0" anchor="ctr"/>
+            <a:lstStyle/>
+            <a:p>
+              <a:pPr algn="ctr"/>
+              <a:endParaRPr lang="de-DE"/>
+            </a:p>
+          </p:txBody>
+        </p:sp>
+        <p:sp>
+          <p:nvSpPr>
+            <p:cNvPr id="174" name="Oval 173">
+              <a:extLst>
+                <a:ext uri="{FF2B5EF4-FFF2-40B4-BE49-F238E27FC236}">
+                  <a16:creationId xmlns:a16="http://schemas.microsoft.com/office/drawing/2014/main" id="{A74BA939-F71B-481F-A2A2-7BA90770B66A}"/>
+                </a:ext>
+              </a:extLst>
+            </p:cNvPr>
+            <p:cNvSpPr/>
+            <p:nvPr/>
+          </p:nvSpPr>
+          <p:spPr>
+            <a:xfrm>
+              <a:off x="6078199" y="898107"/>
+              <a:ext cx="110638" cy="111543"/>
+            </a:xfrm>
+            <a:prstGeom prst="ellipse">
+              <a:avLst/>
+            </a:prstGeom>
+            <a:solidFill>
+              <a:schemeClr val="bg1"/>
+            </a:solidFill>
+            <a:ln>
+              <a:noFill/>
+            </a:ln>
+          </p:spPr>
+          <p:style>
+            <a:lnRef idx="2">
+              <a:schemeClr val="accent1">
+                <a:shade val="50000"/>
+              </a:schemeClr>
+            </a:lnRef>
+            <a:fillRef idx="1">
+              <a:schemeClr val="accent1"/>
+            </a:fillRef>
+            <a:effectRef idx="0">
+              <a:schemeClr val="accent1"/>
+            </a:effectRef>
+            <a:fontRef idx="minor">
+              <a:schemeClr val="lt1"/>
+            </a:fontRef>
+          </p:style>
+          <p:txBody>
+            <a:bodyPr rtlCol="0" anchor="ctr"/>
+            <a:lstStyle/>
+            <a:p>
+              <a:pPr algn="ctr"/>
+              <a:endParaRPr lang="de-DE"/>
+            </a:p>
+          </p:txBody>
+        </p:sp>
+        <p:sp>
+          <p:nvSpPr>
+            <p:cNvPr id="175" name="Isosceles Triangle 174">
+              <a:extLst>
+                <a:ext uri="{FF2B5EF4-FFF2-40B4-BE49-F238E27FC236}">
+                  <a16:creationId xmlns:a16="http://schemas.microsoft.com/office/drawing/2014/main" id="{E3270FA1-6130-4FAF-A123-0233561D6946}"/>
+                </a:ext>
+              </a:extLst>
+            </p:cNvPr>
+            <p:cNvSpPr/>
+            <p:nvPr/>
+          </p:nvSpPr>
+          <p:spPr>
+            <a:xfrm>
+              <a:off x="6088669" y="1083097"/>
+              <a:ext cx="144618" cy="109342"/>
+            </a:xfrm>
+            <a:prstGeom prst="triangle">
+              <a:avLst/>
+            </a:prstGeom>
+            <a:solidFill>
+              <a:schemeClr val="bg1"/>
+            </a:solidFill>
+            <a:ln>
+              <a:noFill/>
+            </a:ln>
+          </p:spPr>
+          <p:style>
+            <a:lnRef idx="2">
+              <a:schemeClr val="accent1">
+                <a:shade val="50000"/>
+              </a:schemeClr>
+            </a:lnRef>
+            <a:fillRef idx="1">
+              <a:schemeClr val="accent1"/>
+            </a:fillRef>
+            <a:effectRef idx="0">
+              <a:schemeClr val="accent1"/>
+            </a:effectRef>
+            <a:fontRef idx="minor">
+              <a:schemeClr val="lt1"/>
+            </a:fontRef>
+          </p:style>
+          <p:txBody>
+            <a:bodyPr rtlCol="0" anchor="ctr"/>
+            <a:lstStyle/>
+            <a:p>
+              <a:pPr algn="ctr"/>
+              <a:endParaRPr lang="de-DE"/>
+            </a:p>
+          </p:txBody>
+        </p:sp>
+        <p:sp>
+          <p:nvSpPr>
+            <p:cNvPr id="176" name="Isosceles Triangle 175">
+              <a:extLst>
+                <a:ext uri="{FF2B5EF4-FFF2-40B4-BE49-F238E27FC236}">
+                  <a16:creationId xmlns:a16="http://schemas.microsoft.com/office/drawing/2014/main" id="{66C54960-EB6A-4582-BEB3-88BBB811BC64}"/>
+                </a:ext>
+              </a:extLst>
+            </p:cNvPr>
+            <p:cNvSpPr/>
+            <p:nvPr/>
+          </p:nvSpPr>
+          <p:spPr>
+            <a:xfrm>
+              <a:off x="6201383" y="946582"/>
+              <a:ext cx="311303" cy="245857"/>
+            </a:xfrm>
+            <a:prstGeom prst="triangle">
+              <a:avLst/>
+            </a:prstGeom>
+            <a:solidFill>
+              <a:schemeClr val="bg1"/>
+            </a:solidFill>
+            <a:ln>
+              <a:noFill/>
+            </a:ln>
+          </p:spPr>
+          <p:style>
+            <a:lnRef idx="2">
+              <a:schemeClr val="accent1">
+                <a:shade val="50000"/>
+              </a:schemeClr>
+            </a:lnRef>
+            <a:fillRef idx="1">
+              <a:schemeClr val="accent1"/>
+            </a:fillRef>
+            <a:effectRef idx="0">
+              <a:schemeClr val="accent1"/>
+            </a:effectRef>
+            <a:fontRef idx="minor">
+              <a:schemeClr val="lt1"/>
+            </a:fontRef>
+          </p:style>
+          <p:txBody>
+            <a:bodyPr rtlCol="0" anchor="ctr"/>
+            <a:lstStyle/>
+            <a:p>
+              <a:pPr algn="ctr"/>
+              <a:endParaRPr lang="de-DE"/>
+            </a:p>
+          </p:txBody>
+        </p:sp>
+      </p:grpSp>
+      <p:grpSp>
+        <p:nvGrpSpPr>
+          <p:cNvPr id="177" name="Group 176">
+            <a:extLst>
+              <a:ext uri="{FF2B5EF4-FFF2-40B4-BE49-F238E27FC236}">
+                <a16:creationId xmlns:a16="http://schemas.microsoft.com/office/drawing/2014/main" id="{FF405A51-9A58-40D3-8065-1CC43DB8E91E}"/>
+              </a:ext>
+            </a:extLst>
+          </p:cNvPr>
+          <p:cNvGrpSpPr/>
+          <p:nvPr/>
+        </p:nvGrpSpPr>
+        <p:grpSpPr>
+          <a:xfrm>
+            <a:off x="3775726" y="2390765"/>
+            <a:ext cx="565150" cy="376720"/>
+            <a:chOff x="6010275" y="857250"/>
+            <a:chExt cx="565150" cy="376720"/>
+          </a:xfrm>
+        </p:grpSpPr>
+        <p:sp>
+          <p:nvSpPr>
+            <p:cNvPr id="178" name="Rectangle 177">
+              <a:extLst>
+                <a:ext uri="{FF2B5EF4-FFF2-40B4-BE49-F238E27FC236}">
+                  <a16:creationId xmlns:a16="http://schemas.microsoft.com/office/drawing/2014/main" id="{1245519C-3C72-4933-B82F-4D286163177B}"/>
+                </a:ext>
+              </a:extLst>
+            </p:cNvPr>
+            <p:cNvSpPr/>
+            <p:nvPr/>
+          </p:nvSpPr>
+          <p:spPr>
+            <a:xfrm>
+              <a:off x="6010275" y="857250"/>
+              <a:ext cx="565150" cy="376720"/>
+            </a:xfrm>
+            <a:prstGeom prst="rect">
+              <a:avLst/>
+            </a:prstGeom>
+            <a:solidFill>
+              <a:schemeClr val="bg1">
+                <a:lumMod val="85000"/>
+              </a:schemeClr>
+            </a:solidFill>
+            <a:ln>
+              <a:solidFill>
+                <a:schemeClr val="bg1">
+                  <a:lumMod val="50000"/>
+                </a:schemeClr>
+              </a:solidFill>
+            </a:ln>
+          </p:spPr>
+          <p:style>
+            <a:lnRef idx="2">
+              <a:schemeClr val="accent1">
+                <a:shade val="50000"/>
+              </a:schemeClr>
+            </a:lnRef>
+            <a:fillRef idx="1">
+              <a:schemeClr val="accent1"/>
+            </a:fillRef>
+            <a:effectRef idx="0">
+              <a:schemeClr val="accent1"/>
+            </a:effectRef>
+            <a:fontRef idx="minor">
+              <a:schemeClr val="lt1"/>
+            </a:fontRef>
+          </p:style>
+          <p:txBody>
+            <a:bodyPr rtlCol="0" anchor="ctr"/>
+            <a:lstStyle/>
+            <a:p>
+              <a:pPr algn="ctr"/>
+              <a:endParaRPr lang="de-DE"/>
+            </a:p>
+          </p:txBody>
+        </p:sp>
+        <p:sp>
+          <p:nvSpPr>
+            <p:cNvPr id="179" name="Oval 178">
+              <a:extLst>
+                <a:ext uri="{FF2B5EF4-FFF2-40B4-BE49-F238E27FC236}">
+                  <a16:creationId xmlns:a16="http://schemas.microsoft.com/office/drawing/2014/main" id="{87270B8B-A7CB-41C9-8B9E-A7E9BB8BCFE7}"/>
+                </a:ext>
+              </a:extLst>
+            </p:cNvPr>
+            <p:cNvSpPr/>
+            <p:nvPr/>
+          </p:nvSpPr>
+          <p:spPr>
+            <a:xfrm>
+              <a:off x="6078199" y="898107"/>
+              <a:ext cx="110638" cy="111543"/>
+            </a:xfrm>
+            <a:prstGeom prst="ellipse">
+              <a:avLst/>
+            </a:prstGeom>
+            <a:solidFill>
+              <a:schemeClr val="bg1"/>
+            </a:solidFill>
+            <a:ln>
+              <a:noFill/>
+            </a:ln>
+          </p:spPr>
+          <p:style>
+            <a:lnRef idx="2">
+              <a:schemeClr val="accent1">
+                <a:shade val="50000"/>
+              </a:schemeClr>
+            </a:lnRef>
+            <a:fillRef idx="1">
+              <a:schemeClr val="accent1"/>
+            </a:fillRef>
+            <a:effectRef idx="0">
+              <a:schemeClr val="accent1"/>
+            </a:effectRef>
+            <a:fontRef idx="minor">
+              <a:schemeClr val="lt1"/>
+            </a:fontRef>
+          </p:style>
+          <p:txBody>
+            <a:bodyPr rtlCol="0" anchor="ctr"/>
+            <a:lstStyle/>
+            <a:p>
+              <a:pPr algn="ctr"/>
+              <a:endParaRPr lang="de-DE"/>
+            </a:p>
+          </p:txBody>
+        </p:sp>
+        <p:sp>
+          <p:nvSpPr>
+            <p:cNvPr id="180" name="Isosceles Triangle 179">
+              <a:extLst>
+                <a:ext uri="{FF2B5EF4-FFF2-40B4-BE49-F238E27FC236}">
+                  <a16:creationId xmlns:a16="http://schemas.microsoft.com/office/drawing/2014/main" id="{7AD2636F-B050-4CDB-AF18-3F388E1EF08B}"/>
+                </a:ext>
+              </a:extLst>
+            </p:cNvPr>
+            <p:cNvSpPr/>
+            <p:nvPr/>
+          </p:nvSpPr>
+          <p:spPr>
+            <a:xfrm>
+              <a:off x="6088669" y="1083097"/>
+              <a:ext cx="144618" cy="109342"/>
+            </a:xfrm>
+            <a:prstGeom prst="triangle">
+              <a:avLst/>
+            </a:prstGeom>
+            <a:solidFill>
+              <a:schemeClr val="bg1"/>
+            </a:solidFill>
+            <a:ln>
+              <a:noFill/>
+            </a:ln>
+          </p:spPr>
+          <p:style>
+            <a:lnRef idx="2">
+              <a:schemeClr val="accent1">
+                <a:shade val="50000"/>
+              </a:schemeClr>
+            </a:lnRef>
+            <a:fillRef idx="1">
+              <a:schemeClr val="accent1"/>
+            </a:fillRef>
+            <a:effectRef idx="0">
+              <a:schemeClr val="accent1"/>
+            </a:effectRef>
+            <a:fontRef idx="minor">
+              <a:schemeClr val="lt1"/>
+            </a:fontRef>
+          </p:style>
+          <p:txBody>
+            <a:bodyPr rtlCol="0" anchor="ctr"/>
+            <a:lstStyle/>
+            <a:p>
+              <a:pPr algn="ctr"/>
+              <a:endParaRPr lang="de-DE"/>
+            </a:p>
+          </p:txBody>
+        </p:sp>
+        <p:sp>
+          <p:nvSpPr>
+            <p:cNvPr id="181" name="Isosceles Triangle 180">
+              <a:extLst>
+                <a:ext uri="{FF2B5EF4-FFF2-40B4-BE49-F238E27FC236}">
+                  <a16:creationId xmlns:a16="http://schemas.microsoft.com/office/drawing/2014/main" id="{5ABA1289-C8DE-4A50-9803-FAD8FB5B74C7}"/>
+                </a:ext>
+              </a:extLst>
+            </p:cNvPr>
+            <p:cNvSpPr/>
+            <p:nvPr/>
+          </p:nvSpPr>
+          <p:spPr>
+            <a:xfrm>
+              <a:off x="6201383" y="946582"/>
+              <a:ext cx="311303" cy="245857"/>
+            </a:xfrm>
+            <a:prstGeom prst="triangle">
+              <a:avLst/>
+            </a:prstGeom>
+            <a:solidFill>
+              <a:schemeClr val="bg1"/>
+            </a:solidFill>
+            <a:ln>
+              <a:noFill/>
+            </a:ln>
+          </p:spPr>
+          <p:style>
+            <a:lnRef idx="2">
+              <a:schemeClr val="accent1">
+                <a:shade val="50000"/>
+              </a:schemeClr>
+            </a:lnRef>
+            <a:fillRef idx="1">
+              <a:schemeClr val="accent1"/>
+            </a:fillRef>
+            <a:effectRef idx="0">
+              <a:schemeClr val="accent1"/>
+            </a:effectRef>
+            <a:fontRef idx="minor">
+              <a:schemeClr val="lt1"/>
+            </a:fontRef>
+          </p:style>
+          <p:txBody>
+            <a:bodyPr rtlCol="0" anchor="ctr"/>
+            <a:lstStyle/>
+            <a:p>
+              <a:pPr algn="ctr"/>
+              <a:endParaRPr lang="de-DE"/>
+            </a:p>
+          </p:txBody>
+        </p:sp>
+      </p:grpSp>
+      <p:grpSp>
+        <p:nvGrpSpPr>
+          <p:cNvPr id="182" name="Group 181">
+            <a:extLst>
+              <a:ext uri="{FF2B5EF4-FFF2-40B4-BE49-F238E27FC236}">
+                <a16:creationId xmlns:a16="http://schemas.microsoft.com/office/drawing/2014/main" id="{A738EA0F-92C6-4C88-B155-9743DF1EE2F5}"/>
+              </a:ext>
+            </a:extLst>
+          </p:cNvPr>
+          <p:cNvGrpSpPr/>
+          <p:nvPr/>
+        </p:nvGrpSpPr>
+        <p:grpSpPr>
+          <a:xfrm>
+            <a:off x="4384444" y="2390765"/>
+            <a:ext cx="565150" cy="376720"/>
+            <a:chOff x="6010275" y="857250"/>
+            <a:chExt cx="565150" cy="376720"/>
+          </a:xfrm>
+        </p:grpSpPr>
+        <p:sp>
+          <p:nvSpPr>
+            <p:cNvPr id="183" name="Rectangle 182">
+              <a:extLst>
+                <a:ext uri="{FF2B5EF4-FFF2-40B4-BE49-F238E27FC236}">
+                  <a16:creationId xmlns:a16="http://schemas.microsoft.com/office/drawing/2014/main" id="{8ABA203E-657F-4F83-B2CA-F385D03A285B}"/>
+                </a:ext>
+              </a:extLst>
+            </p:cNvPr>
+            <p:cNvSpPr/>
+            <p:nvPr/>
+          </p:nvSpPr>
+          <p:spPr>
+            <a:xfrm>
+              <a:off x="6010275" y="857250"/>
+              <a:ext cx="565150" cy="376720"/>
+            </a:xfrm>
+            <a:prstGeom prst="rect">
+              <a:avLst/>
+            </a:prstGeom>
+            <a:solidFill>
+              <a:schemeClr val="bg1">
+                <a:lumMod val="85000"/>
+              </a:schemeClr>
+            </a:solidFill>
+            <a:ln>
+              <a:solidFill>
+                <a:schemeClr val="bg1">
+                  <a:lumMod val="50000"/>
+                </a:schemeClr>
+              </a:solidFill>
+            </a:ln>
+          </p:spPr>
+          <p:style>
+            <a:lnRef idx="2">
+              <a:schemeClr val="accent1">
+                <a:shade val="50000"/>
+              </a:schemeClr>
+            </a:lnRef>
+            <a:fillRef idx="1">
+              <a:schemeClr val="accent1"/>
+            </a:fillRef>
+            <a:effectRef idx="0">
+              <a:schemeClr val="accent1"/>
+            </a:effectRef>
+            <a:fontRef idx="minor">
+              <a:schemeClr val="lt1"/>
+            </a:fontRef>
+          </p:style>
+          <p:txBody>
+            <a:bodyPr rtlCol="0" anchor="ctr"/>
+            <a:lstStyle/>
+            <a:p>
+              <a:pPr algn="ctr"/>
+              <a:endParaRPr lang="de-DE"/>
+            </a:p>
+          </p:txBody>
+        </p:sp>
+        <p:sp>
+          <p:nvSpPr>
+            <p:cNvPr id="184" name="Oval 183">
+              <a:extLst>
+                <a:ext uri="{FF2B5EF4-FFF2-40B4-BE49-F238E27FC236}">
+                  <a16:creationId xmlns:a16="http://schemas.microsoft.com/office/drawing/2014/main" id="{4E15B944-D558-434C-A208-F4E4C9510EA4}"/>
+                </a:ext>
+              </a:extLst>
+            </p:cNvPr>
+            <p:cNvSpPr/>
+            <p:nvPr/>
+          </p:nvSpPr>
+          <p:spPr>
+            <a:xfrm>
+              <a:off x="6078199" y="898107"/>
+              <a:ext cx="110638" cy="111543"/>
+            </a:xfrm>
+            <a:prstGeom prst="ellipse">
+              <a:avLst/>
+            </a:prstGeom>
+            <a:solidFill>
+              <a:schemeClr val="bg1"/>
+            </a:solidFill>
+            <a:ln>
+              <a:noFill/>
+            </a:ln>
+          </p:spPr>
+          <p:style>
+            <a:lnRef idx="2">
+              <a:schemeClr val="accent1">
+                <a:shade val="50000"/>
+              </a:schemeClr>
+            </a:lnRef>
+            <a:fillRef idx="1">
+              <a:schemeClr val="accent1"/>
+            </a:fillRef>
+            <a:effectRef idx="0">
+              <a:schemeClr val="accent1"/>
+            </a:effectRef>
+            <a:fontRef idx="minor">
+              <a:schemeClr val="lt1"/>
+            </a:fontRef>
+          </p:style>
+          <p:txBody>
+            <a:bodyPr rtlCol="0" anchor="ctr"/>
+            <a:lstStyle/>
+            <a:p>
+              <a:pPr algn="ctr"/>
+              <a:endParaRPr lang="de-DE"/>
+            </a:p>
+          </p:txBody>
+        </p:sp>
+        <p:sp>
+          <p:nvSpPr>
+            <p:cNvPr id="185" name="Isosceles Triangle 184">
+              <a:extLst>
+                <a:ext uri="{FF2B5EF4-FFF2-40B4-BE49-F238E27FC236}">
+                  <a16:creationId xmlns:a16="http://schemas.microsoft.com/office/drawing/2014/main" id="{A85C5562-085D-44EA-B37B-0B5CACF4AEF2}"/>
+                </a:ext>
+              </a:extLst>
+            </p:cNvPr>
+            <p:cNvSpPr/>
+            <p:nvPr/>
+          </p:nvSpPr>
+          <p:spPr>
+            <a:xfrm>
+              <a:off x="6088669" y="1083097"/>
+              <a:ext cx="144618" cy="109342"/>
+            </a:xfrm>
+            <a:prstGeom prst="triangle">
+              <a:avLst/>
+            </a:prstGeom>
+            <a:solidFill>
+              <a:schemeClr val="bg1"/>
+            </a:solidFill>
+            <a:ln>
+              <a:noFill/>
+            </a:ln>
+          </p:spPr>
+          <p:style>
+            <a:lnRef idx="2">
+              <a:schemeClr val="accent1">
+                <a:shade val="50000"/>
+              </a:schemeClr>
+            </a:lnRef>
+            <a:fillRef idx="1">
+              <a:schemeClr val="accent1"/>
+            </a:fillRef>
+            <a:effectRef idx="0">
+              <a:schemeClr val="accent1"/>
+            </a:effectRef>
+            <a:fontRef idx="minor">
+              <a:schemeClr val="lt1"/>
+            </a:fontRef>
+          </p:style>
+          <p:txBody>
+            <a:bodyPr rtlCol="0" anchor="ctr"/>
+            <a:lstStyle/>
+            <a:p>
+              <a:pPr algn="ctr"/>
+              <a:endParaRPr lang="de-DE"/>
+            </a:p>
+          </p:txBody>
+        </p:sp>
+        <p:sp>
+          <p:nvSpPr>
+            <p:cNvPr id="186" name="Isosceles Triangle 185">
+              <a:extLst>
+                <a:ext uri="{FF2B5EF4-FFF2-40B4-BE49-F238E27FC236}">
+                  <a16:creationId xmlns:a16="http://schemas.microsoft.com/office/drawing/2014/main" id="{91949546-1F5B-4AFC-8767-C7CCFC449CA5}"/>
+                </a:ext>
+              </a:extLst>
+            </p:cNvPr>
+            <p:cNvSpPr/>
+            <p:nvPr/>
+          </p:nvSpPr>
+          <p:spPr>
+            <a:xfrm>
+              <a:off x="6201383" y="946582"/>
+              <a:ext cx="311303" cy="245857"/>
+            </a:xfrm>
+            <a:prstGeom prst="triangle">
+              <a:avLst/>
+            </a:prstGeom>
+            <a:solidFill>
+              <a:schemeClr val="bg1"/>
+            </a:solidFill>
+            <a:ln>
+              <a:noFill/>
+            </a:ln>
+          </p:spPr>
+          <p:style>
+            <a:lnRef idx="2">
+              <a:schemeClr val="accent1">
+                <a:shade val="50000"/>
+              </a:schemeClr>
+            </a:lnRef>
+            <a:fillRef idx="1">
+              <a:schemeClr val="accent1"/>
+            </a:fillRef>
+            <a:effectRef idx="0">
+              <a:schemeClr val="accent1"/>
+            </a:effectRef>
+            <a:fontRef idx="minor">
+              <a:schemeClr val="lt1"/>
+            </a:fontRef>
+          </p:style>
+          <p:txBody>
+            <a:bodyPr rtlCol="0" anchor="ctr"/>
+            <a:lstStyle/>
+            <a:p>
+              <a:pPr algn="ctr"/>
+              <a:endParaRPr lang="de-DE"/>
+            </a:p>
+          </p:txBody>
+        </p:sp>
+      </p:grpSp>
+      <p:sp>
+        <p:nvSpPr>
+          <p:cNvPr id="187" name="Rectangle 186">
+            <a:extLst>
+              <a:ext uri="{FF2B5EF4-FFF2-40B4-BE49-F238E27FC236}">
+                <a16:creationId xmlns:a16="http://schemas.microsoft.com/office/drawing/2014/main" id="{7E291AF0-BE19-4B4F-B7F0-CF75F825F076}"/>
+              </a:ext>
+            </a:extLst>
+          </p:cNvPr>
+          <p:cNvSpPr/>
+          <p:nvPr/>
+        </p:nvSpPr>
+        <p:spPr>
+          <a:xfrm>
+            <a:off x="4646688" y="2315335"/>
+            <a:ext cx="343356" cy="537472"/>
+          </a:xfrm>
+          <a:prstGeom prst="rect">
+            <a:avLst/>
+          </a:prstGeom>
+          <a:solidFill>
+            <a:schemeClr val="bg1"/>
+          </a:solidFill>
+          <a:ln>
+            <a:noFill/>
+          </a:ln>
+        </p:spPr>
+        <p:style>
+          <a:lnRef idx="2">
+            <a:schemeClr val="accent1">
+              <a:shade val="50000"/>
+            </a:schemeClr>
+          </a:lnRef>
+          <a:fillRef idx="1">
+            <a:schemeClr val="accent1"/>
+          </a:fillRef>
+          <a:effectRef idx="0">
+            <a:schemeClr val="accent1"/>
+          </a:effectRef>
+          <a:fontRef idx="minor">
+            <a:schemeClr val="lt1"/>
+          </a:fontRef>
+        </p:style>
+        <p:txBody>
+          <a:bodyPr rtlCol="0" anchor="ctr"/>
+          <a:lstStyle/>
+          <a:p>
+            <a:pPr algn="ctr"/>
+            <a:endParaRPr lang="de-DE"/>
+          </a:p>
+        </p:txBody>
+      </p:sp>
+      <p:sp>
+        <p:nvSpPr>
+          <p:cNvPr id="188" name="Rectangle 187">
+            <a:extLst>
+              <a:ext uri="{FF2B5EF4-FFF2-40B4-BE49-F238E27FC236}">
+                <a16:creationId xmlns:a16="http://schemas.microsoft.com/office/drawing/2014/main" id="{D1AA488A-E147-407B-9877-3F05E220C845}"/>
+              </a:ext>
+            </a:extLst>
+          </p:cNvPr>
+          <p:cNvSpPr/>
+          <p:nvPr/>
+        </p:nvSpPr>
+        <p:spPr>
+          <a:xfrm>
+            <a:off x="2990335" y="2276464"/>
+            <a:ext cx="1865902" cy="606879"/>
+          </a:xfrm>
+          <a:prstGeom prst="rect">
+            <a:avLst/>
+          </a:prstGeom>
+          <a:noFill/>
+        </p:spPr>
+        <p:style>
+          <a:lnRef idx="2">
+            <a:schemeClr val="dk1"/>
+          </a:lnRef>
+          <a:fillRef idx="1">
+            <a:schemeClr val="lt1"/>
+          </a:fillRef>
+          <a:effectRef idx="0">
+            <a:schemeClr val="dk1"/>
+          </a:effectRef>
+          <a:fontRef idx="minor">
+            <a:schemeClr val="dk1"/>
+          </a:fontRef>
+        </p:style>
+        <p:txBody>
+          <a:bodyPr rtlCol="0" anchor="ctr"/>
+          <a:lstStyle/>
+          <a:p>
+            <a:endParaRPr lang="de-DE" dirty="0"/>
+          </a:p>
+        </p:txBody>
+      </p:sp>
+      <p:sp>
+        <p:nvSpPr>
+          <p:cNvPr id="189" name="Rectangle 188">
+            <a:extLst>
+              <a:ext uri="{FF2B5EF4-FFF2-40B4-BE49-F238E27FC236}">
+                <a16:creationId xmlns:a16="http://schemas.microsoft.com/office/drawing/2014/main" id="{069C1A88-13EE-47DC-A4DE-C568B14022A6}"/>
+              </a:ext>
+            </a:extLst>
+          </p:cNvPr>
+          <p:cNvSpPr/>
+          <p:nvPr/>
+        </p:nvSpPr>
+        <p:spPr>
+          <a:xfrm>
+            <a:off x="2907278" y="1839376"/>
+            <a:ext cx="2029770" cy="1215450"/>
+          </a:xfrm>
+          <a:prstGeom prst="rect">
+            <a:avLst/>
+          </a:prstGeom>
+          <a:noFill/>
+          <a:ln>
+            <a:prstDash val="dash"/>
+          </a:ln>
+        </p:spPr>
+        <p:style>
+          <a:lnRef idx="2">
+            <a:schemeClr val="accent1">
+              <a:shade val="50000"/>
+            </a:schemeClr>
+          </a:lnRef>
+          <a:fillRef idx="1">
+            <a:schemeClr val="accent1"/>
+          </a:fillRef>
+          <a:effectRef idx="0">
+            <a:schemeClr val="accent1"/>
+          </a:effectRef>
+          <a:fontRef idx="minor">
+            <a:schemeClr val="lt1"/>
+          </a:fontRef>
+        </p:style>
+        <p:txBody>
+          <a:bodyPr rtlCol="0" anchor="ctr"/>
+          <a:lstStyle/>
+          <a:p>
+            <a:pPr algn="ctr"/>
+            <a:endParaRPr lang="de-DE"/>
+          </a:p>
+        </p:txBody>
+      </p:sp>
+      <p:sp>
+        <p:nvSpPr>
+          <p:cNvPr id="190" name="Arrow: Down 189">
+            <a:extLst>
+              <a:ext uri="{FF2B5EF4-FFF2-40B4-BE49-F238E27FC236}">
+                <a16:creationId xmlns:a16="http://schemas.microsoft.com/office/drawing/2014/main" id="{2249C6C5-09AC-422A-B9E1-097EA9BEBBD0}"/>
+              </a:ext>
+            </a:extLst>
+          </p:cNvPr>
+          <p:cNvSpPr/>
+          <p:nvPr/>
+        </p:nvSpPr>
+        <p:spPr>
+          <a:xfrm rot="5400000">
+            <a:off x="2977519" y="2538127"/>
+            <a:ext cx="190123" cy="102624"/>
+          </a:xfrm>
+          <a:prstGeom prst="downArrow">
+            <a:avLst/>
+          </a:prstGeom>
+          <a:solidFill>
+            <a:schemeClr val="bg1">
+              <a:lumMod val="85000"/>
+            </a:schemeClr>
+          </a:solidFill>
+        </p:spPr>
+        <p:style>
+          <a:lnRef idx="2">
+            <a:schemeClr val="dk1"/>
+          </a:lnRef>
+          <a:fillRef idx="1">
+            <a:schemeClr val="lt1"/>
+          </a:fillRef>
+          <a:effectRef idx="0">
+            <a:schemeClr val="dk1"/>
+          </a:effectRef>
+          <a:fontRef idx="minor">
+            <a:schemeClr val="dk1"/>
+          </a:fontRef>
+        </p:style>
+        <p:txBody>
+          <a:bodyPr rtlCol="0" anchor="ctr"/>
+          <a:lstStyle/>
+          <a:p>
+            <a:pPr algn="ctr"/>
+            <a:endParaRPr lang="de-DE">
+              <a:solidFill>
+                <a:schemeClr val="dk1"/>
+              </a:solidFill>
+            </a:endParaRPr>
+          </a:p>
+        </p:txBody>
+      </p:sp>
+      <p:sp>
+        <p:nvSpPr>
+          <p:cNvPr id="191" name="Arrow: Down 190">
+            <a:extLst>
+              <a:ext uri="{FF2B5EF4-FFF2-40B4-BE49-F238E27FC236}">
+                <a16:creationId xmlns:a16="http://schemas.microsoft.com/office/drawing/2014/main" id="{3B15C297-DC08-4146-95A2-E0CB3CCFBFCB}"/>
+              </a:ext>
+            </a:extLst>
+          </p:cNvPr>
+          <p:cNvSpPr/>
+          <p:nvPr/>
+        </p:nvSpPr>
+        <p:spPr>
+          <a:xfrm rot="16200000">
+            <a:off x="4658171" y="2538128"/>
+            <a:ext cx="190123" cy="102624"/>
+          </a:xfrm>
+          <a:prstGeom prst="downArrow">
+            <a:avLst/>
+          </a:prstGeom>
+          <a:solidFill>
+            <a:schemeClr val="bg1">
+              <a:lumMod val="85000"/>
+            </a:schemeClr>
+          </a:solidFill>
+        </p:spPr>
+        <p:style>
+          <a:lnRef idx="2">
+            <a:schemeClr val="dk1"/>
+          </a:lnRef>
+          <a:fillRef idx="1">
+            <a:schemeClr val="lt1"/>
+          </a:fillRef>
+          <a:effectRef idx="0">
+            <a:schemeClr val="dk1"/>
+          </a:effectRef>
+          <a:fontRef idx="minor">
+            <a:schemeClr val="dk1"/>
+          </a:fontRef>
+        </p:style>
+        <p:txBody>
+          <a:bodyPr rtlCol="0" anchor="ctr"/>
+          <a:lstStyle/>
+          <a:p>
+            <a:pPr algn="ctr"/>
+            <a:endParaRPr lang="de-DE">
+              <a:solidFill>
+                <a:schemeClr val="dk1"/>
+              </a:solidFill>
+            </a:endParaRPr>
+          </a:p>
+        </p:txBody>
+      </p:sp>
+      <p:sp>
+        <p:nvSpPr>
+          <p:cNvPr id="192" name="Rectangle 191">
+            <a:extLst>
+              <a:ext uri="{FF2B5EF4-FFF2-40B4-BE49-F238E27FC236}">
+                <a16:creationId xmlns:a16="http://schemas.microsoft.com/office/drawing/2014/main" id="{C052AD53-EF59-409A-B368-0F441A24D8A6}"/>
+              </a:ext>
+            </a:extLst>
+          </p:cNvPr>
+          <p:cNvSpPr/>
+          <p:nvPr/>
+        </p:nvSpPr>
+        <p:spPr>
+          <a:xfrm>
+            <a:off x="2990335" y="2025854"/>
+            <a:ext cx="1865902" cy="216034"/>
+          </a:xfrm>
+          <a:prstGeom prst="rect">
+            <a:avLst/>
+          </a:prstGeom>
+        </p:spPr>
+        <p:style>
+          <a:lnRef idx="2">
+            <a:schemeClr val="dk1"/>
+          </a:lnRef>
+          <a:fillRef idx="1">
+            <a:schemeClr val="lt1"/>
+          </a:fillRef>
+          <a:effectRef idx="0">
+            <a:schemeClr val="dk1"/>
+          </a:effectRef>
+          <a:fontRef idx="minor">
+            <a:schemeClr val="dk1"/>
+          </a:fontRef>
+        </p:style>
+        <p:txBody>
+          <a:bodyPr rtlCol="0" anchor="ctr"/>
+          <a:lstStyle/>
+          <a:p>
+            <a:endParaRPr lang="de-DE" dirty="0"/>
+          </a:p>
+        </p:txBody>
+      </p:sp>
+      <p:sp>
+        <p:nvSpPr>
+          <p:cNvPr id="193" name="Rectangle 192">
+            <a:extLst>
+              <a:ext uri="{FF2B5EF4-FFF2-40B4-BE49-F238E27FC236}">
+                <a16:creationId xmlns:a16="http://schemas.microsoft.com/office/drawing/2014/main" id="{15CC2B6C-E5BB-47B1-9E46-8E99104460AE}"/>
+              </a:ext>
+            </a:extLst>
+          </p:cNvPr>
+          <p:cNvSpPr/>
+          <p:nvPr/>
+        </p:nvSpPr>
+        <p:spPr>
+          <a:xfrm>
+            <a:off x="4529193" y="2077836"/>
+            <a:ext cx="246961" cy="102100"/>
+          </a:xfrm>
+          <a:prstGeom prst="rect">
+            <a:avLst/>
+          </a:prstGeom>
+          <a:solidFill>
+            <a:schemeClr val="bg1">
+              <a:lumMod val="85000"/>
+            </a:schemeClr>
+          </a:solidFill>
+        </p:spPr>
+        <p:style>
+          <a:lnRef idx="2">
+            <a:schemeClr val="dk1"/>
+          </a:lnRef>
+          <a:fillRef idx="1">
+            <a:schemeClr val="lt1"/>
+          </a:fillRef>
+          <a:effectRef idx="0">
+            <a:schemeClr val="dk1"/>
+          </a:effectRef>
+          <a:fontRef idx="minor">
+            <a:schemeClr val="dk1"/>
+          </a:fontRef>
+        </p:style>
+        <p:txBody>
+          <a:bodyPr rtlCol="0" anchor="ctr"/>
+          <a:lstStyle/>
+          <a:p>
+            <a:pPr algn="ctr"/>
+            <a:endParaRPr lang="de-DE"/>
+          </a:p>
+        </p:txBody>
+      </p:sp>
+      <p:sp>
+        <p:nvSpPr>
+          <p:cNvPr id="194" name="Rectangle 193">
+            <a:extLst>
+              <a:ext uri="{FF2B5EF4-FFF2-40B4-BE49-F238E27FC236}">
+                <a16:creationId xmlns:a16="http://schemas.microsoft.com/office/drawing/2014/main" id="{849A5279-49C2-41B1-90C7-A70088D0A9AB}"/>
+              </a:ext>
+            </a:extLst>
+          </p:cNvPr>
+          <p:cNvSpPr/>
+          <p:nvPr/>
+        </p:nvSpPr>
+        <p:spPr>
+          <a:xfrm>
+            <a:off x="3067090" y="2072885"/>
+            <a:ext cx="460025" cy="109342"/>
+          </a:xfrm>
+          <a:prstGeom prst="rect">
+            <a:avLst/>
+          </a:prstGeom>
+        </p:spPr>
+        <p:style>
+          <a:lnRef idx="2">
+            <a:schemeClr val="dk1"/>
+          </a:lnRef>
+          <a:fillRef idx="1">
+            <a:schemeClr val="lt1"/>
+          </a:fillRef>
+          <a:effectRef idx="0">
+            <a:schemeClr val="dk1"/>
+          </a:effectRef>
+          <a:fontRef idx="minor">
+            <a:schemeClr val="dk1"/>
+          </a:fontRef>
+        </p:style>
+        <p:txBody>
+          <a:bodyPr rtlCol="0" anchor="ctr"/>
+          <a:lstStyle/>
+          <a:p>
+            <a:pPr algn="ctr"/>
+            <a:endParaRPr lang="de-DE"/>
+          </a:p>
+        </p:txBody>
+      </p:sp>
+      <p:sp>
+        <p:nvSpPr>
+          <p:cNvPr id="195" name="Rectangle 194">
+            <a:extLst>
+              <a:ext uri="{FF2B5EF4-FFF2-40B4-BE49-F238E27FC236}">
+                <a16:creationId xmlns:a16="http://schemas.microsoft.com/office/drawing/2014/main" id="{308ED85C-F935-4541-B993-163108DDC3D9}"/>
+              </a:ext>
+            </a:extLst>
+          </p:cNvPr>
+          <p:cNvSpPr/>
+          <p:nvPr/>
+        </p:nvSpPr>
+        <p:spPr>
+          <a:xfrm>
+            <a:off x="3595042" y="2072885"/>
+            <a:ext cx="460025" cy="109342"/>
+          </a:xfrm>
+          <a:prstGeom prst="rect">
+            <a:avLst/>
+          </a:prstGeom>
+        </p:spPr>
+        <p:style>
+          <a:lnRef idx="2">
+            <a:schemeClr val="dk1"/>
+          </a:lnRef>
+          <a:fillRef idx="1">
+            <a:schemeClr val="lt1"/>
+          </a:fillRef>
+          <a:effectRef idx="0">
+            <a:schemeClr val="dk1"/>
+          </a:effectRef>
+          <a:fontRef idx="minor">
+            <a:schemeClr val="dk1"/>
+          </a:fontRef>
+        </p:style>
+        <p:txBody>
+          <a:bodyPr rtlCol="0" anchor="ctr"/>
+          <a:lstStyle/>
+          <a:p>
+            <a:pPr algn="ctr"/>
+            <a:endParaRPr lang="de-DE"/>
+          </a:p>
+        </p:txBody>
+      </p:sp>
+      <p:grpSp>
+        <p:nvGrpSpPr>
+          <p:cNvPr id="197" name="Group 196">
+            <a:extLst>
+              <a:ext uri="{FF2B5EF4-FFF2-40B4-BE49-F238E27FC236}">
+                <a16:creationId xmlns:a16="http://schemas.microsoft.com/office/drawing/2014/main" id="{1C5AD183-D02E-4721-936B-78A2C2FC6D80}"/>
+              </a:ext>
+            </a:extLst>
+          </p:cNvPr>
+          <p:cNvGrpSpPr/>
+          <p:nvPr/>
+        </p:nvGrpSpPr>
+        <p:grpSpPr>
+          <a:xfrm>
+            <a:off x="5363058" y="2390765"/>
+            <a:ext cx="565150" cy="376720"/>
+            <a:chOff x="6010275" y="857250"/>
+            <a:chExt cx="565150" cy="376720"/>
+          </a:xfrm>
+        </p:grpSpPr>
+        <p:sp>
+          <p:nvSpPr>
+            <p:cNvPr id="198" name="Rectangle 197">
+              <a:extLst>
+                <a:ext uri="{FF2B5EF4-FFF2-40B4-BE49-F238E27FC236}">
+                  <a16:creationId xmlns:a16="http://schemas.microsoft.com/office/drawing/2014/main" id="{0497D746-B291-4AA0-AF5F-95F3AF4CCC80}"/>
+                </a:ext>
+              </a:extLst>
+            </p:cNvPr>
+            <p:cNvSpPr/>
+            <p:nvPr/>
+          </p:nvSpPr>
+          <p:spPr>
+            <a:xfrm>
+              <a:off x="6010275" y="857250"/>
+              <a:ext cx="565150" cy="376720"/>
+            </a:xfrm>
+            <a:prstGeom prst="rect">
+              <a:avLst/>
+            </a:prstGeom>
+            <a:solidFill>
+              <a:schemeClr val="bg1">
+                <a:lumMod val="85000"/>
+              </a:schemeClr>
+            </a:solidFill>
+            <a:ln>
+              <a:solidFill>
+                <a:schemeClr val="bg1">
+                  <a:lumMod val="50000"/>
+                </a:schemeClr>
+              </a:solidFill>
+            </a:ln>
+          </p:spPr>
+          <p:style>
+            <a:lnRef idx="2">
+              <a:schemeClr val="accent1">
+                <a:shade val="50000"/>
+              </a:schemeClr>
+            </a:lnRef>
+            <a:fillRef idx="1">
+              <a:schemeClr val="accent1"/>
+            </a:fillRef>
+            <a:effectRef idx="0">
+              <a:schemeClr val="accent1"/>
+            </a:effectRef>
+            <a:fontRef idx="minor">
+              <a:schemeClr val="lt1"/>
+            </a:fontRef>
+          </p:style>
+          <p:txBody>
+            <a:bodyPr rtlCol="0" anchor="ctr"/>
+            <a:lstStyle/>
+            <a:p>
+              <a:pPr algn="ctr"/>
+              <a:endParaRPr lang="de-DE"/>
+            </a:p>
+          </p:txBody>
+        </p:sp>
+        <p:sp>
+          <p:nvSpPr>
+            <p:cNvPr id="199" name="Oval 198">
+              <a:extLst>
+                <a:ext uri="{FF2B5EF4-FFF2-40B4-BE49-F238E27FC236}">
+                  <a16:creationId xmlns:a16="http://schemas.microsoft.com/office/drawing/2014/main" id="{887E6130-0FEC-4A5E-A961-BF28ADC5AF67}"/>
+                </a:ext>
+              </a:extLst>
+            </p:cNvPr>
+            <p:cNvSpPr/>
+            <p:nvPr/>
+          </p:nvSpPr>
+          <p:spPr>
+            <a:xfrm>
+              <a:off x="6078199" y="898107"/>
+              <a:ext cx="110638" cy="111543"/>
+            </a:xfrm>
+            <a:prstGeom prst="ellipse">
+              <a:avLst/>
+            </a:prstGeom>
+            <a:solidFill>
+              <a:schemeClr val="bg1"/>
+            </a:solidFill>
+            <a:ln>
+              <a:noFill/>
+            </a:ln>
+          </p:spPr>
+          <p:style>
+            <a:lnRef idx="2">
+              <a:schemeClr val="accent1">
+                <a:shade val="50000"/>
+              </a:schemeClr>
+            </a:lnRef>
+            <a:fillRef idx="1">
+              <a:schemeClr val="accent1"/>
+            </a:fillRef>
+            <a:effectRef idx="0">
+              <a:schemeClr val="accent1"/>
+            </a:effectRef>
+            <a:fontRef idx="minor">
+              <a:schemeClr val="lt1"/>
+            </a:fontRef>
+          </p:style>
+          <p:txBody>
+            <a:bodyPr rtlCol="0" anchor="ctr"/>
+            <a:lstStyle/>
+            <a:p>
+              <a:pPr algn="ctr"/>
+              <a:endParaRPr lang="de-DE"/>
+            </a:p>
+          </p:txBody>
+        </p:sp>
+        <p:sp>
+          <p:nvSpPr>
+            <p:cNvPr id="200" name="Isosceles Triangle 199">
+              <a:extLst>
+                <a:ext uri="{FF2B5EF4-FFF2-40B4-BE49-F238E27FC236}">
+                  <a16:creationId xmlns:a16="http://schemas.microsoft.com/office/drawing/2014/main" id="{9EC07C66-9676-4342-BD07-460EFF7FF997}"/>
+                </a:ext>
+              </a:extLst>
+            </p:cNvPr>
+            <p:cNvSpPr/>
+            <p:nvPr/>
+          </p:nvSpPr>
+          <p:spPr>
+            <a:xfrm>
+              <a:off x="6088669" y="1083097"/>
+              <a:ext cx="144618" cy="109342"/>
+            </a:xfrm>
+            <a:prstGeom prst="triangle">
+              <a:avLst/>
+            </a:prstGeom>
+            <a:solidFill>
+              <a:schemeClr val="bg1"/>
+            </a:solidFill>
+            <a:ln>
+              <a:noFill/>
+            </a:ln>
+          </p:spPr>
+          <p:style>
+            <a:lnRef idx="2">
+              <a:schemeClr val="accent1">
+                <a:shade val="50000"/>
+              </a:schemeClr>
+            </a:lnRef>
+            <a:fillRef idx="1">
+              <a:schemeClr val="accent1"/>
+            </a:fillRef>
+            <a:effectRef idx="0">
+              <a:schemeClr val="accent1"/>
+            </a:effectRef>
+            <a:fontRef idx="minor">
+              <a:schemeClr val="lt1"/>
+            </a:fontRef>
+          </p:style>
+          <p:txBody>
+            <a:bodyPr rtlCol="0" anchor="ctr"/>
+            <a:lstStyle/>
+            <a:p>
+              <a:pPr algn="ctr"/>
+              <a:endParaRPr lang="de-DE"/>
+            </a:p>
+          </p:txBody>
+        </p:sp>
+        <p:sp>
+          <p:nvSpPr>
+            <p:cNvPr id="201" name="Isosceles Triangle 200">
+              <a:extLst>
+                <a:ext uri="{FF2B5EF4-FFF2-40B4-BE49-F238E27FC236}">
+                  <a16:creationId xmlns:a16="http://schemas.microsoft.com/office/drawing/2014/main" id="{73F66448-AD39-4A01-B646-8C41F38AC0F0}"/>
+                </a:ext>
+              </a:extLst>
+            </p:cNvPr>
+            <p:cNvSpPr/>
+            <p:nvPr/>
+          </p:nvSpPr>
+          <p:spPr>
+            <a:xfrm>
+              <a:off x="6201383" y="946582"/>
+              <a:ext cx="311303" cy="245857"/>
+            </a:xfrm>
+            <a:prstGeom prst="triangle">
+              <a:avLst/>
+            </a:prstGeom>
+            <a:solidFill>
+              <a:schemeClr val="bg1"/>
+            </a:solidFill>
+            <a:ln>
+              <a:noFill/>
+            </a:ln>
+          </p:spPr>
+          <p:style>
+            <a:lnRef idx="2">
+              <a:schemeClr val="accent1">
+                <a:shade val="50000"/>
+              </a:schemeClr>
+            </a:lnRef>
+            <a:fillRef idx="1">
+              <a:schemeClr val="accent1"/>
+            </a:fillRef>
+            <a:effectRef idx="0">
+              <a:schemeClr val="accent1"/>
+            </a:effectRef>
+            <a:fontRef idx="minor">
+              <a:schemeClr val="lt1"/>
+            </a:fontRef>
+          </p:style>
+          <p:txBody>
+            <a:bodyPr rtlCol="0" anchor="ctr"/>
+            <a:lstStyle/>
+            <a:p>
+              <a:pPr algn="ctr"/>
+              <a:endParaRPr lang="de-DE"/>
+            </a:p>
+          </p:txBody>
+        </p:sp>
+      </p:grpSp>
+      <p:grpSp>
+        <p:nvGrpSpPr>
+          <p:cNvPr id="202" name="Group 201">
+            <a:extLst>
+              <a:ext uri="{FF2B5EF4-FFF2-40B4-BE49-F238E27FC236}">
+                <a16:creationId xmlns:a16="http://schemas.microsoft.com/office/drawing/2014/main" id="{1A0FED26-BB0C-4F71-BD3C-978461B301AF}"/>
+              </a:ext>
+            </a:extLst>
+          </p:cNvPr>
+          <p:cNvGrpSpPr/>
+          <p:nvPr/>
+        </p:nvGrpSpPr>
+        <p:grpSpPr>
+          <a:xfrm>
+            <a:off x="5967474" y="2390765"/>
+            <a:ext cx="565150" cy="376720"/>
+            <a:chOff x="6010275" y="857250"/>
+            <a:chExt cx="565150" cy="376720"/>
+          </a:xfrm>
+        </p:grpSpPr>
+        <p:sp>
+          <p:nvSpPr>
+            <p:cNvPr id="203" name="Rectangle 202">
+              <a:extLst>
+                <a:ext uri="{FF2B5EF4-FFF2-40B4-BE49-F238E27FC236}">
+                  <a16:creationId xmlns:a16="http://schemas.microsoft.com/office/drawing/2014/main" id="{73E331F1-F6EA-425A-88F9-630DE12BF3DF}"/>
+                </a:ext>
+              </a:extLst>
+            </p:cNvPr>
+            <p:cNvSpPr/>
+            <p:nvPr/>
+          </p:nvSpPr>
+          <p:spPr>
+            <a:xfrm>
+              <a:off x="6010275" y="857250"/>
+              <a:ext cx="565150" cy="376720"/>
+            </a:xfrm>
+            <a:prstGeom prst="rect">
+              <a:avLst/>
+            </a:prstGeom>
+            <a:solidFill>
+              <a:schemeClr val="bg1">
+                <a:lumMod val="85000"/>
+              </a:schemeClr>
+            </a:solidFill>
+            <a:ln>
+              <a:solidFill>
+                <a:schemeClr val="bg1">
+                  <a:lumMod val="50000"/>
+                </a:schemeClr>
+              </a:solidFill>
+            </a:ln>
+          </p:spPr>
+          <p:style>
+            <a:lnRef idx="2">
+              <a:schemeClr val="accent1">
+                <a:shade val="50000"/>
+              </a:schemeClr>
+            </a:lnRef>
+            <a:fillRef idx="1">
+              <a:schemeClr val="accent1"/>
+            </a:fillRef>
+            <a:effectRef idx="0">
+              <a:schemeClr val="accent1"/>
+            </a:effectRef>
+            <a:fontRef idx="minor">
+              <a:schemeClr val="lt1"/>
+            </a:fontRef>
+          </p:style>
+          <p:txBody>
+            <a:bodyPr rtlCol="0" anchor="ctr"/>
+            <a:lstStyle/>
+            <a:p>
+              <a:pPr algn="ctr"/>
+              <a:endParaRPr lang="de-DE"/>
+            </a:p>
+          </p:txBody>
+        </p:sp>
+        <p:sp>
+          <p:nvSpPr>
+            <p:cNvPr id="204" name="Oval 203">
+              <a:extLst>
+                <a:ext uri="{FF2B5EF4-FFF2-40B4-BE49-F238E27FC236}">
+                  <a16:creationId xmlns:a16="http://schemas.microsoft.com/office/drawing/2014/main" id="{E6C7A0B7-2333-4B0B-A3E8-98CC0D8830C0}"/>
+                </a:ext>
+              </a:extLst>
+            </p:cNvPr>
+            <p:cNvSpPr/>
+            <p:nvPr/>
+          </p:nvSpPr>
+          <p:spPr>
+            <a:xfrm>
+              <a:off x="6078199" y="898107"/>
+              <a:ext cx="110638" cy="111543"/>
+            </a:xfrm>
+            <a:prstGeom prst="ellipse">
+              <a:avLst/>
+            </a:prstGeom>
+            <a:solidFill>
+              <a:schemeClr val="bg1"/>
+            </a:solidFill>
+            <a:ln>
+              <a:noFill/>
+            </a:ln>
+          </p:spPr>
+          <p:style>
+            <a:lnRef idx="2">
+              <a:schemeClr val="accent1">
+                <a:shade val="50000"/>
+              </a:schemeClr>
+            </a:lnRef>
+            <a:fillRef idx="1">
+              <a:schemeClr val="accent1"/>
+            </a:fillRef>
+            <a:effectRef idx="0">
+              <a:schemeClr val="accent1"/>
+            </a:effectRef>
+            <a:fontRef idx="minor">
+              <a:schemeClr val="lt1"/>
+            </a:fontRef>
+          </p:style>
+          <p:txBody>
+            <a:bodyPr rtlCol="0" anchor="ctr"/>
+            <a:lstStyle/>
+            <a:p>
+              <a:pPr algn="ctr"/>
+              <a:endParaRPr lang="de-DE"/>
+            </a:p>
+          </p:txBody>
+        </p:sp>
+        <p:sp>
+          <p:nvSpPr>
+            <p:cNvPr id="205" name="Isosceles Triangle 204">
+              <a:extLst>
+                <a:ext uri="{FF2B5EF4-FFF2-40B4-BE49-F238E27FC236}">
+                  <a16:creationId xmlns:a16="http://schemas.microsoft.com/office/drawing/2014/main" id="{F05D9227-4352-40FD-9DF4-B6552FDBF1A8}"/>
+                </a:ext>
+              </a:extLst>
+            </p:cNvPr>
+            <p:cNvSpPr/>
+            <p:nvPr/>
+          </p:nvSpPr>
+          <p:spPr>
+            <a:xfrm>
+              <a:off x="6088669" y="1083097"/>
+              <a:ext cx="144618" cy="109342"/>
+            </a:xfrm>
+            <a:prstGeom prst="triangle">
+              <a:avLst/>
+            </a:prstGeom>
+            <a:solidFill>
+              <a:schemeClr val="bg1"/>
+            </a:solidFill>
+            <a:ln>
+              <a:noFill/>
+            </a:ln>
+          </p:spPr>
+          <p:style>
+            <a:lnRef idx="2">
+              <a:schemeClr val="accent1">
+                <a:shade val="50000"/>
+              </a:schemeClr>
+            </a:lnRef>
+            <a:fillRef idx="1">
+              <a:schemeClr val="accent1"/>
+            </a:fillRef>
+            <a:effectRef idx="0">
+              <a:schemeClr val="accent1"/>
+            </a:effectRef>
+            <a:fontRef idx="minor">
+              <a:schemeClr val="lt1"/>
+            </a:fontRef>
+          </p:style>
+          <p:txBody>
+            <a:bodyPr rtlCol="0" anchor="ctr"/>
+            <a:lstStyle/>
+            <a:p>
+              <a:pPr algn="ctr"/>
+              <a:endParaRPr lang="de-DE"/>
+            </a:p>
+          </p:txBody>
+        </p:sp>
+        <p:sp>
+          <p:nvSpPr>
+            <p:cNvPr id="206" name="Isosceles Triangle 205">
+              <a:extLst>
+                <a:ext uri="{FF2B5EF4-FFF2-40B4-BE49-F238E27FC236}">
+                  <a16:creationId xmlns:a16="http://schemas.microsoft.com/office/drawing/2014/main" id="{7704978C-2007-457E-BA75-A676EF1B1BE0}"/>
+                </a:ext>
+              </a:extLst>
+            </p:cNvPr>
+            <p:cNvSpPr/>
+            <p:nvPr/>
+          </p:nvSpPr>
+          <p:spPr>
+            <a:xfrm>
+              <a:off x="6201383" y="946582"/>
+              <a:ext cx="311303" cy="245857"/>
+            </a:xfrm>
+            <a:prstGeom prst="triangle">
+              <a:avLst/>
+            </a:prstGeom>
+            <a:solidFill>
+              <a:schemeClr val="bg1"/>
+            </a:solidFill>
+            <a:ln>
+              <a:noFill/>
+            </a:ln>
+          </p:spPr>
+          <p:style>
+            <a:lnRef idx="2">
+              <a:schemeClr val="accent1">
+                <a:shade val="50000"/>
+              </a:schemeClr>
+            </a:lnRef>
+            <a:fillRef idx="1">
+              <a:schemeClr val="accent1"/>
+            </a:fillRef>
+            <a:effectRef idx="0">
+              <a:schemeClr val="accent1"/>
+            </a:effectRef>
+            <a:fontRef idx="minor">
+              <a:schemeClr val="lt1"/>
+            </a:fontRef>
+          </p:style>
+          <p:txBody>
+            <a:bodyPr rtlCol="0" anchor="ctr"/>
+            <a:lstStyle/>
+            <a:p>
+              <a:pPr algn="ctr"/>
+              <a:endParaRPr lang="de-DE"/>
+            </a:p>
+          </p:txBody>
+        </p:sp>
+      </p:grpSp>
+      <p:grpSp>
+        <p:nvGrpSpPr>
+          <p:cNvPr id="207" name="Group 206">
+            <a:extLst>
+              <a:ext uri="{FF2B5EF4-FFF2-40B4-BE49-F238E27FC236}">
+                <a16:creationId xmlns:a16="http://schemas.microsoft.com/office/drawing/2014/main" id="{0429BED4-7302-46C4-981A-59B09F43755D}"/>
+              </a:ext>
+            </a:extLst>
+          </p:cNvPr>
+          <p:cNvGrpSpPr/>
+          <p:nvPr/>
+        </p:nvGrpSpPr>
+        <p:grpSpPr>
+          <a:xfrm>
+            <a:off x="6576192" y="2390765"/>
+            <a:ext cx="565150" cy="376720"/>
+            <a:chOff x="6010275" y="857250"/>
+            <a:chExt cx="565150" cy="376720"/>
+          </a:xfrm>
+        </p:grpSpPr>
+        <p:sp>
+          <p:nvSpPr>
+            <p:cNvPr id="208" name="Rectangle 207">
+              <a:extLst>
+                <a:ext uri="{FF2B5EF4-FFF2-40B4-BE49-F238E27FC236}">
+                  <a16:creationId xmlns:a16="http://schemas.microsoft.com/office/drawing/2014/main" id="{30B076BE-6D17-43BD-B132-27A091DA545F}"/>
+                </a:ext>
+              </a:extLst>
+            </p:cNvPr>
+            <p:cNvSpPr/>
+            <p:nvPr/>
+          </p:nvSpPr>
+          <p:spPr>
+            <a:xfrm>
+              <a:off x="6010275" y="857250"/>
+              <a:ext cx="565150" cy="376720"/>
+            </a:xfrm>
+            <a:prstGeom prst="rect">
+              <a:avLst/>
+            </a:prstGeom>
+            <a:solidFill>
+              <a:schemeClr val="bg1">
+                <a:lumMod val="85000"/>
+              </a:schemeClr>
+            </a:solidFill>
+            <a:ln>
+              <a:solidFill>
+                <a:schemeClr val="bg1">
+                  <a:lumMod val="50000"/>
+                </a:schemeClr>
+              </a:solidFill>
+            </a:ln>
+          </p:spPr>
+          <p:style>
+            <a:lnRef idx="2">
+              <a:schemeClr val="accent1">
+                <a:shade val="50000"/>
+              </a:schemeClr>
+            </a:lnRef>
+            <a:fillRef idx="1">
+              <a:schemeClr val="accent1"/>
+            </a:fillRef>
+            <a:effectRef idx="0">
+              <a:schemeClr val="accent1"/>
+            </a:effectRef>
+            <a:fontRef idx="minor">
+              <a:schemeClr val="lt1"/>
+            </a:fontRef>
+          </p:style>
+          <p:txBody>
+            <a:bodyPr rtlCol="0" anchor="ctr"/>
+            <a:lstStyle/>
+            <a:p>
+              <a:pPr algn="ctr"/>
+              <a:endParaRPr lang="de-DE"/>
+            </a:p>
+          </p:txBody>
+        </p:sp>
+        <p:sp>
+          <p:nvSpPr>
+            <p:cNvPr id="209" name="Oval 208">
+              <a:extLst>
+                <a:ext uri="{FF2B5EF4-FFF2-40B4-BE49-F238E27FC236}">
+                  <a16:creationId xmlns:a16="http://schemas.microsoft.com/office/drawing/2014/main" id="{C9B91D60-D5F3-40E1-92C7-5CD3C4CC50FB}"/>
+                </a:ext>
+              </a:extLst>
+            </p:cNvPr>
+            <p:cNvSpPr/>
+            <p:nvPr/>
+          </p:nvSpPr>
+          <p:spPr>
+            <a:xfrm>
+              <a:off x="6078199" y="898107"/>
+              <a:ext cx="110638" cy="111543"/>
+            </a:xfrm>
+            <a:prstGeom prst="ellipse">
+              <a:avLst/>
+            </a:prstGeom>
+            <a:solidFill>
+              <a:schemeClr val="bg1"/>
+            </a:solidFill>
+            <a:ln>
+              <a:noFill/>
+            </a:ln>
+          </p:spPr>
+          <p:style>
+            <a:lnRef idx="2">
+              <a:schemeClr val="accent1">
+                <a:shade val="50000"/>
+              </a:schemeClr>
+            </a:lnRef>
+            <a:fillRef idx="1">
+              <a:schemeClr val="accent1"/>
+            </a:fillRef>
+            <a:effectRef idx="0">
+              <a:schemeClr val="accent1"/>
+            </a:effectRef>
+            <a:fontRef idx="minor">
+              <a:schemeClr val="lt1"/>
+            </a:fontRef>
+          </p:style>
+          <p:txBody>
+            <a:bodyPr rtlCol="0" anchor="ctr"/>
+            <a:lstStyle/>
+            <a:p>
+              <a:pPr algn="ctr"/>
+              <a:endParaRPr lang="de-DE"/>
+            </a:p>
+          </p:txBody>
+        </p:sp>
+        <p:sp>
+          <p:nvSpPr>
+            <p:cNvPr id="210" name="Isosceles Triangle 209">
+              <a:extLst>
+                <a:ext uri="{FF2B5EF4-FFF2-40B4-BE49-F238E27FC236}">
+                  <a16:creationId xmlns:a16="http://schemas.microsoft.com/office/drawing/2014/main" id="{47B1ACCD-C279-4C6F-B30B-4B87D1FAE65E}"/>
+                </a:ext>
+              </a:extLst>
+            </p:cNvPr>
+            <p:cNvSpPr/>
+            <p:nvPr/>
+          </p:nvSpPr>
+          <p:spPr>
+            <a:xfrm>
+              <a:off x="6088669" y="1083097"/>
+              <a:ext cx="144618" cy="109342"/>
+            </a:xfrm>
+            <a:prstGeom prst="triangle">
+              <a:avLst/>
+            </a:prstGeom>
+            <a:solidFill>
+              <a:schemeClr val="bg1"/>
+            </a:solidFill>
+            <a:ln>
+              <a:noFill/>
+            </a:ln>
+          </p:spPr>
+          <p:style>
+            <a:lnRef idx="2">
+              <a:schemeClr val="accent1">
+                <a:shade val="50000"/>
+              </a:schemeClr>
+            </a:lnRef>
+            <a:fillRef idx="1">
+              <a:schemeClr val="accent1"/>
+            </a:fillRef>
+            <a:effectRef idx="0">
+              <a:schemeClr val="accent1"/>
+            </a:effectRef>
+            <a:fontRef idx="minor">
+              <a:schemeClr val="lt1"/>
+            </a:fontRef>
+          </p:style>
+          <p:txBody>
+            <a:bodyPr rtlCol="0" anchor="ctr"/>
+            <a:lstStyle/>
+            <a:p>
+              <a:pPr algn="ctr"/>
+              <a:endParaRPr lang="de-DE"/>
+            </a:p>
+          </p:txBody>
+        </p:sp>
+        <p:sp>
+          <p:nvSpPr>
+            <p:cNvPr id="211" name="Isosceles Triangle 210">
+              <a:extLst>
+                <a:ext uri="{FF2B5EF4-FFF2-40B4-BE49-F238E27FC236}">
+                  <a16:creationId xmlns:a16="http://schemas.microsoft.com/office/drawing/2014/main" id="{E43BE0A8-C74B-4E45-88FC-4261D66130AF}"/>
+                </a:ext>
+              </a:extLst>
+            </p:cNvPr>
+            <p:cNvSpPr/>
+            <p:nvPr/>
+          </p:nvSpPr>
+          <p:spPr>
+            <a:xfrm>
+              <a:off x="6201383" y="946582"/>
+              <a:ext cx="311303" cy="245857"/>
+            </a:xfrm>
+            <a:prstGeom prst="triangle">
+              <a:avLst/>
+            </a:prstGeom>
+            <a:solidFill>
+              <a:schemeClr val="bg1"/>
+            </a:solidFill>
+            <a:ln>
+              <a:noFill/>
+            </a:ln>
+          </p:spPr>
+          <p:style>
+            <a:lnRef idx="2">
+              <a:schemeClr val="accent1">
+                <a:shade val="50000"/>
+              </a:schemeClr>
+            </a:lnRef>
+            <a:fillRef idx="1">
+              <a:schemeClr val="accent1"/>
+            </a:fillRef>
+            <a:effectRef idx="0">
+              <a:schemeClr val="accent1"/>
+            </a:effectRef>
+            <a:fontRef idx="minor">
+              <a:schemeClr val="lt1"/>
+            </a:fontRef>
+          </p:style>
+          <p:txBody>
+            <a:bodyPr rtlCol="0" anchor="ctr"/>
+            <a:lstStyle/>
+            <a:p>
+              <a:pPr algn="ctr"/>
+              <a:endParaRPr lang="de-DE"/>
+            </a:p>
+          </p:txBody>
+        </p:sp>
+      </p:grpSp>
+      <p:sp>
+        <p:nvSpPr>
+          <p:cNvPr id="212" name="Rectangle 211">
+            <a:extLst>
+              <a:ext uri="{FF2B5EF4-FFF2-40B4-BE49-F238E27FC236}">
+                <a16:creationId xmlns:a16="http://schemas.microsoft.com/office/drawing/2014/main" id="{4F13A57C-2100-4BBE-992A-EBA8F6776E37}"/>
+              </a:ext>
+            </a:extLst>
+          </p:cNvPr>
+          <p:cNvSpPr/>
+          <p:nvPr/>
+        </p:nvSpPr>
+        <p:spPr>
+          <a:xfrm>
+            <a:off x="6838436" y="2315335"/>
+            <a:ext cx="343356" cy="537472"/>
+          </a:xfrm>
+          <a:prstGeom prst="rect">
+            <a:avLst/>
+          </a:prstGeom>
+          <a:solidFill>
+            <a:schemeClr val="bg1"/>
+          </a:solidFill>
+          <a:ln>
+            <a:noFill/>
+          </a:ln>
+        </p:spPr>
+        <p:style>
+          <a:lnRef idx="2">
+            <a:schemeClr val="accent1">
+              <a:shade val="50000"/>
+            </a:schemeClr>
+          </a:lnRef>
+          <a:fillRef idx="1">
+            <a:schemeClr val="accent1"/>
+          </a:fillRef>
+          <a:effectRef idx="0">
+            <a:schemeClr val="accent1"/>
+          </a:effectRef>
+          <a:fontRef idx="minor">
+            <a:schemeClr val="lt1"/>
+          </a:fontRef>
+        </p:style>
+        <p:txBody>
+          <a:bodyPr rtlCol="0" anchor="ctr"/>
+          <a:lstStyle/>
+          <a:p>
+            <a:pPr algn="ctr"/>
+            <a:endParaRPr lang="de-DE"/>
+          </a:p>
+        </p:txBody>
+      </p:sp>
+      <p:sp>
+        <p:nvSpPr>
+          <p:cNvPr id="213" name="Rectangle 212">
+            <a:extLst>
+              <a:ext uri="{FF2B5EF4-FFF2-40B4-BE49-F238E27FC236}">
+                <a16:creationId xmlns:a16="http://schemas.microsoft.com/office/drawing/2014/main" id="{7271E998-F8BB-4A1B-9B99-BE2A2793B9E4}"/>
+              </a:ext>
+            </a:extLst>
+          </p:cNvPr>
+          <p:cNvSpPr/>
+          <p:nvPr/>
+        </p:nvSpPr>
+        <p:spPr>
+          <a:xfrm>
+            <a:off x="5182083" y="2276464"/>
+            <a:ext cx="1865902" cy="606879"/>
+          </a:xfrm>
+          <a:prstGeom prst="rect">
+            <a:avLst/>
+          </a:prstGeom>
+          <a:noFill/>
+        </p:spPr>
+        <p:style>
+          <a:lnRef idx="2">
+            <a:schemeClr val="dk1"/>
+          </a:lnRef>
+          <a:fillRef idx="1">
+            <a:schemeClr val="lt1"/>
+          </a:fillRef>
+          <a:effectRef idx="0">
+            <a:schemeClr val="dk1"/>
+          </a:effectRef>
+          <a:fontRef idx="minor">
+            <a:schemeClr val="dk1"/>
+          </a:fontRef>
+        </p:style>
+        <p:txBody>
+          <a:bodyPr rtlCol="0" anchor="ctr"/>
+          <a:lstStyle/>
+          <a:p>
+            <a:endParaRPr lang="de-DE" dirty="0"/>
+          </a:p>
+        </p:txBody>
+      </p:sp>
+      <p:sp>
+        <p:nvSpPr>
+          <p:cNvPr id="214" name="Rectangle 213">
+            <a:extLst>
+              <a:ext uri="{FF2B5EF4-FFF2-40B4-BE49-F238E27FC236}">
+                <a16:creationId xmlns:a16="http://schemas.microsoft.com/office/drawing/2014/main" id="{AE3C1906-5A7C-474A-AF2E-B053E8CA9E32}"/>
+              </a:ext>
+            </a:extLst>
+          </p:cNvPr>
+          <p:cNvSpPr/>
+          <p:nvPr/>
+        </p:nvSpPr>
+        <p:spPr>
+          <a:xfrm>
+            <a:off x="5099026" y="1839376"/>
+            <a:ext cx="2029770" cy="1215450"/>
+          </a:xfrm>
+          <a:prstGeom prst="rect">
+            <a:avLst/>
+          </a:prstGeom>
+          <a:noFill/>
+          <a:ln>
+            <a:prstDash val="dash"/>
+          </a:ln>
+        </p:spPr>
+        <p:style>
+          <a:lnRef idx="2">
+            <a:schemeClr val="accent1">
+              <a:shade val="50000"/>
+            </a:schemeClr>
+          </a:lnRef>
+          <a:fillRef idx="1">
+            <a:schemeClr val="accent1"/>
+          </a:fillRef>
+          <a:effectRef idx="0">
+            <a:schemeClr val="accent1"/>
+          </a:effectRef>
+          <a:fontRef idx="minor">
+            <a:schemeClr val="lt1"/>
+          </a:fontRef>
+        </p:style>
+        <p:txBody>
+          <a:bodyPr rtlCol="0" anchor="ctr"/>
+          <a:lstStyle/>
+          <a:p>
+            <a:pPr algn="ctr"/>
+            <a:endParaRPr lang="de-DE"/>
+          </a:p>
+        </p:txBody>
+      </p:sp>
+      <p:sp>
+        <p:nvSpPr>
+          <p:cNvPr id="215" name="Arrow: Down 214">
+            <a:extLst>
+              <a:ext uri="{FF2B5EF4-FFF2-40B4-BE49-F238E27FC236}">
+                <a16:creationId xmlns:a16="http://schemas.microsoft.com/office/drawing/2014/main" id="{286DADA3-4592-4F3F-8950-222998C26F51}"/>
+              </a:ext>
+            </a:extLst>
+          </p:cNvPr>
+          <p:cNvSpPr/>
+          <p:nvPr/>
+        </p:nvSpPr>
+        <p:spPr>
+          <a:xfrm rot="5400000">
+            <a:off x="5169267" y="2538127"/>
+            <a:ext cx="190123" cy="102624"/>
+          </a:xfrm>
+          <a:prstGeom prst="downArrow">
+            <a:avLst/>
+          </a:prstGeom>
+          <a:solidFill>
+            <a:schemeClr val="bg1">
+              <a:lumMod val="85000"/>
+            </a:schemeClr>
+          </a:solidFill>
+        </p:spPr>
+        <p:style>
+          <a:lnRef idx="2">
+            <a:schemeClr val="dk1"/>
+          </a:lnRef>
+          <a:fillRef idx="1">
+            <a:schemeClr val="lt1"/>
+          </a:fillRef>
+          <a:effectRef idx="0">
+            <a:schemeClr val="dk1"/>
+          </a:effectRef>
+          <a:fontRef idx="minor">
+            <a:schemeClr val="dk1"/>
+          </a:fontRef>
+        </p:style>
+        <p:txBody>
+          <a:bodyPr rtlCol="0" anchor="ctr"/>
+          <a:lstStyle/>
+          <a:p>
+            <a:pPr algn="ctr"/>
+            <a:endParaRPr lang="de-DE">
+              <a:solidFill>
+                <a:schemeClr val="dk1"/>
+              </a:solidFill>
+            </a:endParaRPr>
+          </a:p>
+        </p:txBody>
+      </p:sp>
+      <p:sp>
+        <p:nvSpPr>
+          <p:cNvPr id="216" name="Arrow: Down 215">
+            <a:extLst>
+              <a:ext uri="{FF2B5EF4-FFF2-40B4-BE49-F238E27FC236}">
+                <a16:creationId xmlns:a16="http://schemas.microsoft.com/office/drawing/2014/main" id="{5326C519-4B08-478B-9CF3-8332501E1247}"/>
+              </a:ext>
+            </a:extLst>
+          </p:cNvPr>
+          <p:cNvSpPr/>
+          <p:nvPr/>
+        </p:nvSpPr>
+        <p:spPr>
+          <a:xfrm rot="16200000">
+            <a:off x="6849919" y="2538128"/>
+            <a:ext cx="190123" cy="102624"/>
+          </a:xfrm>
+          <a:prstGeom prst="downArrow">
+            <a:avLst/>
+          </a:prstGeom>
+          <a:solidFill>
+            <a:schemeClr val="bg1">
+              <a:lumMod val="85000"/>
+            </a:schemeClr>
+          </a:solidFill>
+        </p:spPr>
+        <p:style>
+          <a:lnRef idx="2">
+            <a:schemeClr val="dk1"/>
+          </a:lnRef>
+          <a:fillRef idx="1">
+            <a:schemeClr val="lt1"/>
+          </a:fillRef>
+          <a:effectRef idx="0">
+            <a:schemeClr val="dk1"/>
+          </a:effectRef>
+          <a:fontRef idx="minor">
+            <a:schemeClr val="dk1"/>
+          </a:fontRef>
+        </p:style>
+        <p:txBody>
+          <a:bodyPr rtlCol="0" anchor="ctr"/>
+          <a:lstStyle/>
+          <a:p>
+            <a:pPr algn="ctr"/>
+            <a:endParaRPr lang="de-DE">
+              <a:solidFill>
+                <a:schemeClr val="dk1"/>
+              </a:solidFill>
+            </a:endParaRPr>
+          </a:p>
+        </p:txBody>
+      </p:sp>
+      <p:sp>
+        <p:nvSpPr>
+          <p:cNvPr id="217" name="Rectangle 216">
+            <a:extLst>
+              <a:ext uri="{FF2B5EF4-FFF2-40B4-BE49-F238E27FC236}">
+                <a16:creationId xmlns:a16="http://schemas.microsoft.com/office/drawing/2014/main" id="{0A50592E-F72F-44AE-B0F8-F7EDDF8D1A3C}"/>
+              </a:ext>
+            </a:extLst>
+          </p:cNvPr>
+          <p:cNvSpPr/>
+          <p:nvPr/>
+        </p:nvSpPr>
+        <p:spPr>
+          <a:xfrm>
+            <a:off x="5182083" y="2025854"/>
+            <a:ext cx="1865902" cy="216034"/>
+          </a:xfrm>
+          <a:prstGeom prst="rect">
+            <a:avLst/>
+          </a:prstGeom>
+        </p:spPr>
+        <p:style>
+          <a:lnRef idx="2">
+            <a:schemeClr val="dk1"/>
+          </a:lnRef>
+          <a:fillRef idx="1">
+            <a:schemeClr val="lt1"/>
+          </a:fillRef>
+          <a:effectRef idx="0">
+            <a:schemeClr val="dk1"/>
+          </a:effectRef>
+          <a:fontRef idx="minor">
+            <a:schemeClr val="dk1"/>
+          </a:fontRef>
+        </p:style>
+        <p:txBody>
+          <a:bodyPr rtlCol="0" anchor="ctr"/>
+          <a:lstStyle/>
+          <a:p>
+            <a:endParaRPr lang="de-DE" dirty="0"/>
+          </a:p>
+        </p:txBody>
+      </p:sp>
+      <p:sp>
+        <p:nvSpPr>
+          <p:cNvPr id="218" name="Rectangle 217">
+            <a:extLst>
+              <a:ext uri="{FF2B5EF4-FFF2-40B4-BE49-F238E27FC236}">
+                <a16:creationId xmlns:a16="http://schemas.microsoft.com/office/drawing/2014/main" id="{A00A4942-EE8B-414A-8D35-3AB3E13C9B15}"/>
+              </a:ext>
+            </a:extLst>
+          </p:cNvPr>
+          <p:cNvSpPr/>
+          <p:nvPr/>
+        </p:nvSpPr>
+        <p:spPr>
+          <a:xfrm>
+            <a:off x="6720941" y="2077836"/>
+            <a:ext cx="246961" cy="102100"/>
+          </a:xfrm>
+          <a:prstGeom prst="rect">
+            <a:avLst/>
+          </a:prstGeom>
+          <a:solidFill>
+            <a:schemeClr val="bg1">
+              <a:lumMod val="85000"/>
+            </a:schemeClr>
+          </a:solidFill>
+        </p:spPr>
+        <p:style>
+          <a:lnRef idx="2">
+            <a:schemeClr val="dk1"/>
+          </a:lnRef>
+          <a:fillRef idx="1">
+            <a:schemeClr val="lt1"/>
+          </a:fillRef>
+          <a:effectRef idx="0">
+            <a:schemeClr val="dk1"/>
+          </a:effectRef>
+          <a:fontRef idx="minor">
+            <a:schemeClr val="dk1"/>
+          </a:fontRef>
+        </p:style>
+        <p:txBody>
+          <a:bodyPr rtlCol="0" anchor="ctr"/>
+          <a:lstStyle/>
+          <a:p>
+            <a:pPr algn="ctr"/>
+            <a:endParaRPr lang="de-DE"/>
+          </a:p>
+        </p:txBody>
+      </p:sp>
+      <p:sp>
+        <p:nvSpPr>
+          <p:cNvPr id="221" name="Rectangle 220">
+            <a:extLst>
+              <a:ext uri="{FF2B5EF4-FFF2-40B4-BE49-F238E27FC236}">
+                <a16:creationId xmlns:a16="http://schemas.microsoft.com/office/drawing/2014/main" id="{C8F4F3E3-F5F7-445B-AA0E-A6E6AC3E436B}"/>
+              </a:ext>
+            </a:extLst>
+          </p:cNvPr>
+          <p:cNvSpPr/>
+          <p:nvPr/>
+        </p:nvSpPr>
+        <p:spPr>
+          <a:xfrm>
+            <a:off x="6420984" y="2077836"/>
+            <a:ext cx="246961" cy="102100"/>
+          </a:xfrm>
+          <a:prstGeom prst="rect">
+            <a:avLst/>
+          </a:prstGeom>
+          <a:solidFill>
+            <a:schemeClr val="bg1">
+              <a:lumMod val="85000"/>
+            </a:schemeClr>
+          </a:solidFill>
+        </p:spPr>
+        <p:style>
+          <a:lnRef idx="2">
+            <a:schemeClr val="dk1"/>
+          </a:lnRef>
+          <a:fillRef idx="1">
+            <a:schemeClr val="lt1"/>
+          </a:fillRef>
+          <a:effectRef idx="0">
+            <a:schemeClr val="dk1"/>
+          </a:effectRef>
+          <a:fontRef idx="minor">
+            <a:schemeClr val="dk1"/>
+          </a:fontRef>
+        </p:style>
+        <p:txBody>
+          <a:bodyPr rtlCol="0" anchor="ctr"/>
+          <a:lstStyle/>
+          <a:p>
+            <a:pPr algn="ctr"/>
+            <a:endParaRPr lang="de-DE"/>
+          </a:p>
+        </p:txBody>
+      </p:sp>
+      <p:sp>
+        <p:nvSpPr>
+          <p:cNvPr id="8" name="Arrow: Up 7">
+            <a:extLst>
+              <a:ext uri="{FF2B5EF4-FFF2-40B4-BE49-F238E27FC236}">
+                <a16:creationId xmlns:a16="http://schemas.microsoft.com/office/drawing/2014/main" id="{5ED15388-1D22-48D5-8F01-18E8EDE6DD57}"/>
+              </a:ext>
+            </a:extLst>
+          </p:cNvPr>
+          <p:cNvSpPr/>
+          <p:nvPr/>
+        </p:nvSpPr>
+        <p:spPr>
+          <a:xfrm>
+            <a:off x="6444552" y="2095500"/>
+            <a:ext cx="82489" cy="65106"/>
+          </a:xfrm>
+          <a:prstGeom prst="upArrow">
+            <a:avLst/>
+          </a:prstGeom>
+          <a:solidFill>
+            <a:schemeClr val="bg1">
+              <a:lumMod val="50000"/>
+            </a:schemeClr>
+          </a:solidFill>
+          <a:ln>
+            <a:noFill/>
+          </a:ln>
+        </p:spPr>
+        <p:style>
+          <a:lnRef idx="2">
+            <a:schemeClr val="accent1">
+              <a:shade val="50000"/>
+            </a:schemeClr>
+          </a:lnRef>
+          <a:fillRef idx="1">
+            <a:schemeClr val="accent1"/>
+          </a:fillRef>
+          <a:effectRef idx="0">
+            <a:schemeClr val="accent1"/>
+          </a:effectRef>
+          <a:fontRef idx="minor">
+            <a:schemeClr val="lt1"/>
+          </a:fontRef>
+        </p:style>
+        <p:txBody>
+          <a:bodyPr rtlCol="0" anchor="ctr"/>
+          <a:lstStyle/>
+          <a:p>
+            <a:pPr algn="ctr"/>
+            <a:endParaRPr lang="de-DE"/>
+          </a:p>
+        </p:txBody>
+      </p:sp>
     </p:spTree>
     <p:extLst>
       <p:ext uri="{BB962C8B-B14F-4D97-AF65-F5344CB8AC3E}">

</xml_diff>

<commit_message>
DOCS added presets for DataMatrix and Browser widgets
</commit_message>
<xml_diff>
--- a/Docs/documentation/uxon_presets.pptx
+++ b/Docs/documentation/uxon_presets.pptx
@@ -254,7 +254,7 @@
           <a:p>
             <a:fld id="{2DAF1186-F1D7-440D-B156-A260D91A3611}" type="datetimeFigureOut">
               <a:rPr lang="de-DE" smtClean="0"/>
-              <a:t>02.07.2021</a:t>
+              <a:t>14.07.2021</a:t>
             </a:fld>
             <a:endParaRPr lang="de-DE"/>
           </a:p>
@@ -424,7 +424,7 @@
           <a:p>
             <a:fld id="{2DAF1186-F1D7-440D-B156-A260D91A3611}" type="datetimeFigureOut">
               <a:rPr lang="de-DE" smtClean="0"/>
-              <a:t>02.07.2021</a:t>
+              <a:t>14.07.2021</a:t>
             </a:fld>
             <a:endParaRPr lang="de-DE"/>
           </a:p>
@@ -604,7 +604,7 @@
           <a:p>
             <a:fld id="{2DAF1186-F1D7-440D-B156-A260D91A3611}" type="datetimeFigureOut">
               <a:rPr lang="de-DE" smtClean="0"/>
-              <a:t>02.07.2021</a:t>
+              <a:t>14.07.2021</a:t>
             </a:fld>
             <a:endParaRPr lang="de-DE"/>
           </a:p>
@@ -774,7 +774,7 @@
           <a:p>
             <a:fld id="{2DAF1186-F1D7-440D-B156-A260D91A3611}" type="datetimeFigureOut">
               <a:rPr lang="de-DE" smtClean="0"/>
-              <a:t>02.07.2021</a:t>
+              <a:t>14.07.2021</a:t>
             </a:fld>
             <a:endParaRPr lang="de-DE"/>
           </a:p>
@@ -1020,7 +1020,7 @@
           <a:p>
             <a:fld id="{2DAF1186-F1D7-440D-B156-A260D91A3611}" type="datetimeFigureOut">
               <a:rPr lang="de-DE" smtClean="0"/>
-              <a:t>02.07.2021</a:t>
+              <a:t>14.07.2021</a:t>
             </a:fld>
             <a:endParaRPr lang="de-DE"/>
           </a:p>
@@ -1252,7 +1252,7 @@
           <a:p>
             <a:fld id="{2DAF1186-F1D7-440D-B156-A260D91A3611}" type="datetimeFigureOut">
               <a:rPr lang="de-DE" smtClean="0"/>
-              <a:t>02.07.2021</a:t>
+              <a:t>14.07.2021</a:t>
             </a:fld>
             <a:endParaRPr lang="de-DE"/>
           </a:p>
@@ -1619,7 +1619,7 @@
           <a:p>
             <a:fld id="{2DAF1186-F1D7-440D-B156-A260D91A3611}" type="datetimeFigureOut">
               <a:rPr lang="de-DE" smtClean="0"/>
-              <a:t>02.07.2021</a:t>
+              <a:t>14.07.2021</a:t>
             </a:fld>
             <a:endParaRPr lang="de-DE"/>
           </a:p>
@@ -1737,7 +1737,7 @@
           <a:p>
             <a:fld id="{2DAF1186-F1D7-440D-B156-A260D91A3611}" type="datetimeFigureOut">
               <a:rPr lang="de-DE" smtClean="0"/>
-              <a:t>02.07.2021</a:t>
+              <a:t>14.07.2021</a:t>
             </a:fld>
             <a:endParaRPr lang="de-DE"/>
           </a:p>
@@ -1832,7 +1832,7 @@
           <a:p>
             <a:fld id="{2DAF1186-F1D7-440D-B156-A260D91A3611}" type="datetimeFigureOut">
               <a:rPr lang="de-DE" smtClean="0"/>
-              <a:t>02.07.2021</a:t>
+              <a:t>14.07.2021</a:t>
             </a:fld>
             <a:endParaRPr lang="de-DE"/>
           </a:p>
@@ -2109,7 +2109,7 @@
           <a:p>
             <a:fld id="{2DAF1186-F1D7-440D-B156-A260D91A3611}" type="datetimeFigureOut">
               <a:rPr lang="de-DE" smtClean="0"/>
-              <a:t>02.07.2021</a:t>
+              <a:t>14.07.2021</a:t>
             </a:fld>
             <a:endParaRPr lang="de-DE"/>
           </a:p>
@@ -2362,7 +2362,7 @@
           <a:p>
             <a:fld id="{2DAF1186-F1D7-440D-B156-A260D91A3611}" type="datetimeFigureOut">
               <a:rPr lang="de-DE" smtClean="0"/>
-              <a:t>02.07.2021</a:t>
+              <a:t>14.07.2021</a:t>
             </a:fld>
             <a:endParaRPr lang="de-DE"/>
           </a:p>
@@ -2575,7 +2575,7 @@
           <a:p>
             <a:fld id="{2DAF1186-F1D7-440D-B156-A260D91A3611}" type="datetimeFigureOut">
               <a:rPr lang="de-DE" smtClean="0"/>
-              <a:t>02.07.2021</a:t>
+              <a:t>14.07.2021</a:t>
             </a:fld>
             <a:endParaRPr lang="de-DE"/>
           </a:p>
@@ -37315,7 +37315,7 @@
         </p:nvSpPr>
         <p:spPr>
           <a:xfrm>
-            <a:off x="7131897" y="5082810"/>
+            <a:off x="9354569" y="5082810"/>
             <a:ext cx="740885" cy="216034"/>
           </a:xfrm>
           <a:prstGeom prst="rect">
@@ -37352,7 +37352,7 @@
         </p:nvSpPr>
         <p:spPr>
           <a:xfrm>
-            <a:off x="7057949" y="5022902"/>
+            <a:off x="9280621" y="5022902"/>
             <a:ext cx="2029770" cy="1215450"/>
           </a:xfrm>
           <a:prstGeom prst="rect">
@@ -37396,7 +37396,7 @@
         </p:nvSpPr>
         <p:spPr>
           <a:xfrm>
-            <a:off x="7590887" y="5137173"/>
+            <a:off x="9813559" y="5137173"/>
             <a:ext cx="246961" cy="102100"/>
           </a:xfrm>
           <a:prstGeom prst="rect">
@@ -37439,7 +37439,7 @@
         </p:nvSpPr>
         <p:spPr>
           <a:xfrm>
-            <a:off x="7625824" y="5442517"/>
+            <a:off x="9848496" y="5442517"/>
             <a:ext cx="246959" cy="128041"/>
           </a:xfrm>
           <a:prstGeom prst="rect">
@@ -37476,7 +37476,7 @@
         </p:nvSpPr>
         <p:spPr>
           <a:xfrm>
-            <a:off x="7625822" y="5326231"/>
+            <a:off x="9848494" y="5326231"/>
             <a:ext cx="246962" cy="116286"/>
           </a:xfrm>
           <a:prstGeom prst="rect">
@@ -37518,7 +37518,7 @@
         </p:nvSpPr>
         <p:spPr>
           <a:xfrm>
-            <a:off x="7625824" y="5567667"/>
+            <a:off x="9848496" y="5567667"/>
             <a:ext cx="246959" cy="122333"/>
           </a:xfrm>
           <a:prstGeom prst="rect">
@@ -37555,7 +37555,7 @@
         </p:nvSpPr>
         <p:spPr>
           <a:xfrm>
-            <a:off x="7625824" y="5688066"/>
+            <a:off x="9848496" y="5688066"/>
             <a:ext cx="246959" cy="122333"/>
           </a:xfrm>
           <a:prstGeom prst="rect">
@@ -37592,7 +37592,7 @@
         </p:nvSpPr>
         <p:spPr>
           <a:xfrm>
-            <a:off x="7625824" y="5807508"/>
+            <a:off x="9848496" y="5807508"/>
             <a:ext cx="246959" cy="122333"/>
           </a:xfrm>
           <a:prstGeom prst="rect">
@@ -37629,7 +37629,7 @@
         </p:nvSpPr>
         <p:spPr>
           <a:xfrm>
-            <a:off x="7625824" y="5927639"/>
+            <a:off x="9848496" y="5927639"/>
             <a:ext cx="246959" cy="122333"/>
           </a:xfrm>
           <a:prstGeom prst="rect">
@@ -37666,7 +37666,7 @@
         </p:nvSpPr>
         <p:spPr>
           <a:xfrm>
-            <a:off x="7625824" y="6052233"/>
+            <a:off x="9848496" y="6052233"/>
             <a:ext cx="246959" cy="122333"/>
           </a:xfrm>
           <a:prstGeom prst="rect">
@@ -37703,7 +37703,7 @@
         </p:nvSpPr>
         <p:spPr>
           <a:xfrm>
-            <a:off x="7378861" y="5442517"/>
+            <a:off x="9601533" y="5442517"/>
             <a:ext cx="246959" cy="128041"/>
           </a:xfrm>
           <a:prstGeom prst="rect">
@@ -37740,7 +37740,7 @@
         </p:nvSpPr>
         <p:spPr>
           <a:xfrm>
-            <a:off x="7378859" y="5326231"/>
+            <a:off x="9601531" y="5326231"/>
             <a:ext cx="246962" cy="116286"/>
           </a:xfrm>
           <a:prstGeom prst="rect">
@@ -37782,7 +37782,7 @@
         </p:nvSpPr>
         <p:spPr>
           <a:xfrm>
-            <a:off x="7378861" y="5567667"/>
+            <a:off x="9601533" y="5567667"/>
             <a:ext cx="246959" cy="122333"/>
           </a:xfrm>
           <a:prstGeom prst="rect">
@@ -37819,7 +37819,7 @@
         </p:nvSpPr>
         <p:spPr>
           <a:xfrm>
-            <a:off x="7378861" y="5688066"/>
+            <a:off x="9601533" y="5688066"/>
             <a:ext cx="246959" cy="122333"/>
           </a:xfrm>
           <a:prstGeom prst="rect">
@@ -37856,7 +37856,7 @@
         </p:nvSpPr>
         <p:spPr>
           <a:xfrm>
-            <a:off x="7378861" y="5807508"/>
+            <a:off x="9601533" y="5807508"/>
             <a:ext cx="246959" cy="122333"/>
           </a:xfrm>
           <a:prstGeom prst="rect">
@@ -37893,7 +37893,7 @@
         </p:nvSpPr>
         <p:spPr>
           <a:xfrm>
-            <a:off x="7378861" y="5927639"/>
+            <a:off x="9601533" y="5927639"/>
             <a:ext cx="246959" cy="122333"/>
           </a:xfrm>
           <a:prstGeom prst="rect">
@@ -37930,7 +37930,7 @@
         </p:nvSpPr>
         <p:spPr>
           <a:xfrm>
-            <a:off x="7378861" y="6052233"/>
+            <a:off x="9601533" y="6052233"/>
             <a:ext cx="246959" cy="122333"/>
           </a:xfrm>
           <a:prstGeom prst="rect">
@@ -37967,7 +37967,7 @@
         </p:nvSpPr>
         <p:spPr>
           <a:xfrm>
-            <a:off x="7131897" y="5442517"/>
+            <a:off x="9354569" y="5442517"/>
             <a:ext cx="246959" cy="128041"/>
           </a:xfrm>
           <a:prstGeom prst="rect">
@@ -38004,7 +38004,7 @@
         </p:nvSpPr>
         <p:spPr>
           <a:xfrm>
-            <a:off x="7131895" y="5326231"/>
+            <a:off x="9354567" y="5326231"/>
             <a:ext cx="246962" cy="116286"/>
           </a:xfrm>
           <a:prstGeom prst="rect">
@@ -38046,7 +38046,7 @@
         </p:nvSpPr>
         <p:spPr>
           <a:xfrm>
-            <a:off x="7131897" y="5567667"/>
+            <a:off x="9354569" y="5567667"/>
             <a:ext cx="246959" cy="122333"/>
           </a:xfrm>
           <a:prstGeom prst="rect">
@@ -38083,7 +38083,7 @@
         </p:nvSpPr>
         <p:spPr>
           <a:xfrm>
-            <a:off x="7131897" y="5688066"/>
+            <a:off x="9354569" y="5688066"/>
             <a:ext cx="246959" cy="122333"/>
           </a:xfrm>
           <a:prstGeom prst="rect">
@@ -38120,7 +38120,7 @@
         </p:nvSpPr>
         <p:spPr>
           <a:xfrm>
-            <a:off x="7131897" y="5807508"/>
+            <a:off x="9354569" y="5807508"/>
             <a:ext cx="246959" cy="122333"/>
           </a:xfrm>
           <a:prstGeom prst="rect">
@@ -38157,7 +38157,7 @@
         </p:nvSpPr>
         <p:spPr>
           <a:xfrm>
-            <a:off x="7131897" y="5927639"/>
+            <a:off x="9354569" y="5927639"/>
             <a:ext cx="246959" cy="122333"/>
           </a:xfrm>
           <a:prstGeom prst="rect">
@@ -38194,7 +38194,7 @@
         </p:nvSpPr>
         <p:spPr>
           <a:xfrm>
-            <a:off x="7131897" y="6052233"/>
+            <a:off x="9354569" y="6052233"/>
             <a:ext cx="246959" cy="122333"/>
           </a:xfrm>
           <a:prstGeom prst="rect">
@@ -38231,7 +38231,7 @@
         </p:nvSpPr>
         <p:spPr>
           <a:xfrm>
-            <a:off x="7166042" y="5134626"/>
+            <a:off x="9388714" y="5134626"/>
             <a:ext cx="340927" cy="109342"/>
           </a:xfrm>
           <a:prstGeom prst="rect">
@@ -38269,7 +38269,7 @@
         </p:nvSpPr>
         <p:spPr>
           <a:xfrm>
-            <a:off x="8262916" y="5082810"/>
+            <a:off x="10485588" y="5082810"/>
             <a:ext cx="740885" cy="216034"/>
           </a:xfrm>
           <a:prstGeom prst="rect">
@@ -38306,7 +38306,7 @@
         </p:nvSpPr>
         <p:spPr>
           <a:xfrm>
-            <a:off x="8721906" y="5137173"/>
+            <a:off x="10944578" y="5137173"/>
             <a:ext cx="246961" cy="102100"/>
           </a:xfrm>
           <a:prstGeom prst="rect">
@@ -38349,7 +38349,7 @@
         </p:nvSpPr>
         <p:spPr>
           <a:xfrm>
-            <a:off x="8262916" y="5442517"/>
+            <a:off x="10485588" y="5442517"/>
             <a:ext cx="740884" cy="247483"/>
           </a:xfrm>
           <a:prstGeom prst="rect">
@@ -38386,7 +38386,7 @@
         </p:nvSpPr>
         <p:spPr>
           <a:xfrm>
-            <a:off x="8262913" y="5326231"/>
+            <a:off x="10485585" y="5326231"/>
             <a:ext cx="740887" cy="116286"/>
           </a:xfrm>
           <a:prstGeom prst="rect">
@@ -38428,7 +38428,7 @@
         </p:nvSpPr>
         <p:spPr>
           <a:xfrm>
-            <a:off x="8262916" y="5688066"/>
+            <a:off x="10485588" y="5688066"/>
             <a:ext cx="740884" cy="239573"/>
           </a:xfrm>
           <a:prstGeom prst="rect">
@@ -38465,7 +38465,7 @@
         </p:nvSpPr>
         <p:spPr>
           <a:xfrm>
-            <a:off x="8262916" y="5927639"/>
+            <a:off x="10485588" y="5927639"/>
             <a:ext cx="740884" cy="246927"/>
           </a:xfrm>
           <a:prstGeom prst="rect">
@@ -38502,7 +38502,7 @@
         </p:nvSpPr>
         <p:spPr>
           <a:xfrm>
-            <a:off x="8297061" y="5134626"/>
+            <a:off x="10519733" y="5134626"/>
             <a:ext cx="340927" cy="109342"/>
           </a:xfrm>
           <a:prstGeom prst="rect">
@@ -38540,7 +38540,7 @@
         </p:nvSpPr>
         <p:spPr>
           <a:xfrm>
-            <a:off x="7986713" y="5456336"/>
+            <a:off x="10209385" y="5456336"/>
             <a:ext cx="171450" cy="471303"/>
           </a:xfrm>
           <a:prstGeom prst="rightArrow">
@@ -40816,6 +40816,3860 @@
           </a:fontRef>
         </p:style>
       </p:cxnSp>
+      <p:sp>
+        <p:nvSpPr>
+          <p:cNvPr id="523" name="Rectangle 522">
+            <a:extLst>
+              <a:ext uri="{FF2B5EF4-FFF2-40B4-BE49-F238E27FC236}">
+                <a16:creationId xmlns:a16="http://schemas.microsoft.com/office/drawing/2014/main" id="{ACD05C72-BFB6-48C0-A866-964F63A64EA0}"/>
+              </a:ext>
+            </a:extLst>
+          </p:cNvPr>
+          <p:cNvSpPr/>
+          <p:nvPr/>
+        </p:nvSpPr>
+        <p:spPr>
+          <a:xfrm>
+            <a:off x="4904004" y="5081076"/>
+            <a:ext cx="1871906" cy="216034"/>
+          </a:xfrm>
+          <a:prstGeom prst="rect">
+            <a:avLst/>
+          </a:prstGeom>
+        </p:spPr>
+        <p:style>
+          <a:lnRef idx="2">
+            <a:schemeClr val="dk1"/>
+          </a:lnRef>
+          <a:fillRef idx="1">
+            <a:schemeClr val="lt1"/>
+          </a:fillRef>
+          <a:effectRef idx="0">
+            <a:schemeClr val="dk1"/>
+          </a:effectRef>
+          <a:fontRef idx="minor">
+            <a:schemeClr val="dk1"/>
+          </a:fontRef>
+        </p:style>
+        <p:txBody>
+          <a:bodyPr rtlCol="0" anchor="ctr"/>
+          <a:lstStyle/>
+          <a:p>
+            <a:endParaRPr lang="de-DE" dirty="0"/>
+          </a:p>
+        </p:txBody>
+      </p:sp>
+      <p:sp>
+        <p:nvSpPr>
+          <p:cNvPr id="524" name="Rectangle 523">
+            <a:extLst>
+              <a:ext uri="{FF2B5EF4-FFF2-40B4-BE49-F238E27FC236}">
+                <a16:creationId xmlns:a16="http://schemas.microsoft.com/office/drawing/2014/main" id="{51D5E725-B4D6-4AC7-8C57-EEA85F3B05D8}"/>
+              </a:ext>
+            </a:extLst>
+          </p:cNvPr>
+          <p:cNvSpPr/>
+          <p:nvPr/>
+        </p:nvSpPr>
+        <p:spPr>
+          <a:xfrm>
+            <a:off x="4830056" y="5021168"/>
+            <a:ext cx="2029770" cy="1215450"/>
+          </a:xfrm>
+          <a:prstGeom prst="rect">
+            <a:avLst/>
+          </a:prstGeom>
+          <a:noFill/>
+          <a:ln>
+            <a:prstDash val="dash"/>
+          </a:ln>
+        </p:spPr>
+        <p:style>
+          <a:lnRef idx="2">
+            <a:schemeClr val="accent1">
+              <a:shade val="50000"/>
+            </a:schemeClr>
+          </a:lnRef>
+          <a:fillRef idx="1">
+            <a:schemeClr val="accent1"/>
+          </a:fillRef>
+          <a:effectRef idx="0">
+            <a:schemeClr val="accent1"/>
+          </a:effectRef>
+          <a:fontRef idx="minor">
+            <a:schemeClr val="lt1"/>
+          </a:fontRef>
+        </p:style>
+        <p:txBody>
+          <a:bodyPr rtlCol="0" anchor="ctr"/>
+          <a:lstStyle/>
+          <a:p>
+            <a:pPr algn="ctr"/>
+            <a:endParaRPr lang="de-DE"/>
+          </a:p>
+        </p:txBody>
+      </p:sp>
+      <p:sp>
+        <p:nvSpPr>
+          <p:cNvPr id="525" name="Rectangle 524">
+            <a:extLst>
+              <a:ext uri="{FF2B5EF4-FFF2-40B4-BE49-F238E27FC236}">
+                <a16:creationId xmlns:a16="http://schemas.microsoft.com/office/drawing/2014/main" id="{055F3E9E-2BD6-4C18-82DA-F0D2B87C969E}"/>
+              </a:ext>
+            </a:extLst>
+          </p:cNvPr>
+          <p:cNvSpPr/>
+          <p:nvPr/>
+        </p:nvSpPr>
+        <p:spPr>
+          <a:xfrm>
+            <a:off x="6442862" y="5133058"/>
+            <a:ext cx="246961" cy="102100"/>
+          </a:xfrm>
+          <a:prstGeom prst="rect">
+            <a:avLst/>
+          </a:prstGeom>
+          <a:solidFill>
+            <a:schemeClr val="bg1">
+              <a:lumMod val="85000"/>
+            </a:schemeClr>
+          </a:solidFill>
+        </p:spPr>
+        <p:style>
+          <a:lnRef idx="2">
+            <a:schemeClr val="dk1"/>
+          </a:lnRef>
+          <a:fillRef idx="1">
+            <a:schemeClr val="lt1"/>
+          </a:fillRef>
+          <a:effectRef idx="0">
+            <a:schemeClr val="dk1"/>
+          </a:effectRef>
+          <a:fontRef idx="minor">
+            <a:schemeClr val="dk1"/>
+          </a:fontRef>
+        </p:style>
+        <p:txBody>
+          <a:bodyPr rtlCol="0" anchor="ctr"/>
+          <a:lstStyle/>
+          <a:p>
+            <a:pPr algn="ctr"/>
+            <a:endParaRPr lang="de-DE"/>
+          </a:p>
+        </p:txBody>
+      </p:sp>
+      <p:sp>
+        <p:nvSpPr>
+          <p:cNvPr id="526" name="Rectangle 525">
+            <a:extLst>
+              <a:ext uri="{FF2B5EF4-FFF2-40B4-BE49-F238E27FC236}">
+                <a16:creationId xmlns:a16="http://schemas.microsoft.com/office/drawing/2014/main" id="{EF8B9425-06F0-4598-81B7-54C589F00DB7}"/>
+              </a:ext>
+            </a:extLst>
+          </p:cNvPr>
+          <p:cNvSpPr/>
+          <p:nvPr/>
+        </p:nvSpPr>
+        <p:spPr>
+          <a:xfrm>
+            <a:off x="4904003" y="5440783"/>
+            <a:ext cx="406237" cy="249217"/>
+          </a:xfrm>
+          <a:prstGeom prst="rect">
+            <a:avLst/>
+          </a:prstGeom>
+        </p:spPr>
+        <p:style>
+          <a:lnRef idx="2">
+            <a:schemeClr val="dk1"/>
+          </a:lnRef>
+          <a:fillRef idx="1">
+            <a:schemeClr val="lt1"/>
+          </a:fillRef>
+          <a:effectRef idx="0">
+            <a:schemeClr val="dk1"/>
+          </a:effectRef>
+          <a:fontRef idx="minor">
+            <a:schemeClr val="dk1"/>
+          </a:fontRef>
+        </p:style>
+        <p:txBody>
+          <a:bodyPr rtlCol="0" anchor="ctr"/>
+          <a:lstStyle/>
+          <a:p>
+            <a:endParaRPr lang="de-DE" dirty="0"/>
+          </a:p>
+        </p:txBody>
+      </p:sp>
+      <p:sp>
+        <p:nvSpPr>
+          <p:cNvPr id="527" name="Rectangle 526">
+            <a:extLst>
+              <a:ext uri="{FF2B5EF4-FFF2-40B4-BE49-F238E27FC236}">
+                <a16:creationId xmlns:a16="http://schemas.microsoft.com/office/drawing/2014/main" id="{AE5A7A9A-3BA5-409D-8D1C-A768553E4898}"/>
+              </a:ext>
+            </a:extLst>
+          </p:cNvPr>
+          <p:cNvSpPr/>
+          <p:nvPr/>
+        </p:nvSpPr>
+        <p:spPr>
+          <a:xfrm>
+            <a:off x="5310240" y="5440783"/>
+            <a:ext cx="406237" cy="122333"/>
+          </a:xfrm>
+          <a:prstGeom prst="rect">
+            <a:avLst/>
+          </a:prstGeom>
+          <a:solidFill>
+            <a:schemeClr val="bg1">
+              <a:lumMod val="85000"/>
+            </a:schemeClr>
+          </a:solidFill>
+        </p:spPr>
+        <p:style>
+          <a:lnRef idx="2">
+            <a:schemeClr val="dk1"/>
+          </a:lnRef>
+          <a:fillRef idx="1">
+            <a:schemeClr val="lt1"/>
+          </a:fillRef>
+          <a:effectRef idx="0">
+            <a:schemeClr val="dk1"/>
+          </a:effectRef>
+          <a:fontRef idx="minor">
+            <a:schemeClr val="dk1"/>
+          </a:fontRef>
+        </p:style>
+        <p:txBody>
+          <a:bodyPr rtlCol="0" anchor="ctr"/>
+          <a:lstStyle/>
+          <a:p>
+            <a:endParaRPr lang="de-DE" dirty="0"/>
+          </a:p>
+        </p:txBody>
+      </p:sp>
+      <p:sp>
+        <p:nvSpPr>
+          <p:cNvPr id="528" name="Rectangle 527">
+            <a:extLst>
+              <a:ext uri="{FF2B5EF4-FFF2-40B4-BE49-F238E27FC236}">
+                <a16:creationId xmlns:a16="http://schemas.microsoft.com/office/drawing/2014/main" id="{30B7AC24-F92C-48EB-88B0-7428FB2990A6}"/>
+              </a:ext>
+            </a:extLst>
+          </p:cNvPr>
+          <p:cNvSpPr/>
+          <p:nvPr/>
+        </p:nvSpPr>
+        <p:spPr>
+          <a:xfrm>
+            <a:off x="5716477" y="5440783"/>
+            <a:ext cx="302186" cy="122333"/>
+          </a:xfrm>
+          <a:prstGeom prst="rect">
+            <a:avLst/>
+          </a:prstGeom>
+        </p:spPr>
+        <p:style>
+          <a:lnRef idx="2">
+            <a:schemeClr val="dk1"/>
+          </a:lnRef>
+          <a:fillRef idx="1">
+            <a:schemeClr val="lt1"/>
+          </a:fillRef>
+          <a:effectRef idx="0">
+            <a:schemeClr val="dk1"/>
+          </a:effectRef>
+          <a:fontRef idx="minor">
+            <a:schemeClr val="dk1"/>
+          </a:fontRef>
+        </p:style>
+        <p:txBody>
+          <a:bodyPr rtlCol="0" anchor="ctr"/>
+          <a:lstStyle/>
+          <a:p>
+            <a:pPr algn="r"/>
+            <a:endParaRPr lang="de-DE" sz="900" dirty="0"/>
+          </a:p>
+        </p:txBody>
+      </p:sp>
+      <p:sp>
+        <p:nvSpPr>
+          <p:cNvPr id="529" name="Rectangle 528">
+            <a:extLst>
+              <a:ext uri="{FF2B5EF4-FFF2-40B4-BE49-F238E27FC236}">
+                <a16:creationId xmlns:a16="http://schemas.microsoft.com/office/drawing/2014/main" id="{4279D668-0646-44FD-AE7B-D68E24C14B93}"/>
+              </a:ext>
+            </a:extLst>
+          </p:cNvPr>
+          <p:cNvSpPr/>
+          <p:nvPr/>
+        </p:nvSpPr>
+        <p:spPr>
+          <a:xfrm>
+            <a:off x="6528950" y="5440783"/>
+            <a:ext cx="246959" cy="122333"/>
+          </a:xfrm>
+          <a:prstGeom prst="rect">
+            <a:avLst/>
+          </a:prstGeom>
+        </p:spPr>
+        <p:style>
+          <a:lnRef idx="2">
+            <a:schemeClr val="dk1"/>
+          </a:lnRef>
+          <a:fillRef idx="1">
+            <a:schemeClr val="lt1"/>
+          </a:fillRef>
+          <a:effectRef idx="0">
+            <a:schemeClr val="dk1"/>
+          </a:effectRef>
+          <a:fontRef idx="minor">
+            <a:schemeClr val="dk1"/>
+          </a:fontRef>
+        </p:style>
+        <p:txBody>
+          <a:bodyPr rtlCol="0" anchor="ctr"/>
+          <a:lstStyle/>
+          <a:p>
+            <a:endParaRPr lang="de-DE" dirty="0"/>
+          </a:p>
+        </p:txBody>
+      </p:sp>
+      <p:sp>
+        <p:nvSpPr>
+          <p:cNvPr id="530" name="Rectangle 529">
+            <a:extLst>
+              <a:ext uri="{FF2B5EF4-FFF2-40B4-BE49-F238E27FC236}">
+                <a16:creationId xmlns:a16="http://schemas.microsoft.com/office/drawing/2014/main" id="{35227B91-AC4C-4F6C-9E05-F077797C588E}"/>
+              </a:ext>
+            </a:extLst>
+          </p:cNvPr>
+          <p:cNvSpPr/>
+          <p:nvPr/>
+        </p:nvSpPr>
+        <p:spPr>
+          <a:xfrm>
+            <a:off x="4904003" y="5324496"/>
+            <a:ext cx="406237" cy="116287"/>
+          </a:xfrm>
+          <a:prstGeom prst="rect">
+            <a:avLst/>
+          </a:prstGeom>
+          <a:solidFill>
+            <a:schemeClr val="bg1">
+              <a:lumMod val="85000"/>
+            </a:schemeClr>
+          </a:solidFill>
+        </p:spPr>
+        <p:style>
+          <a:lnRef idx="2">
+            <a:schemeClr val="dk1"/>
+          </a:lnRef>
+          <a:fillRef idx="1">
+            <a:schemeClr val="lt1"/>
+          </a:fillRef>
+          <a:effectRef idx="0">
+            <a:schemeClr val="dk1"/>
+          </a:effectRef>
+          <a:fontRef idx="minor">
+            <a:schemeClr val="dk1"/>
+          </a:fontRef>
+        </p:style>
+        <p:txBody>
+          <a:bodyPr rtlCol="0" anchor="ctr"/>
+          <a:lstStyle/>
+          <a:p>
+            <a:endParaRPr lang="de-DE" dirty="0"/>
+          </a:p>
+        </p:txBody>
+      </p:sp>
+      <p:sp>
+        <p:nvSpPr>
+          <p:cNvPr id="531" name="Rectangle 530">
+            <a:extLst>
+              <a:ext uri="{FF2B5EF4-FFF2-40B4-BE49-F238E27FC236}">
+                <a16:creationId xmlns:a16="http://schemas.microsoft.com/office/drawing/2014/main" id="{9B2FFC22-F77F-409E-B352-7278CA1D510E}"/>
+              </a:ext>
+            </a:extLst>
+          </p:cNvPr>
+          <p:cNvSpPr/>
+          <p:nvPr/>
+        </p:nvSpPr>
+        <p:spPr>
+          <a:xfrm>
+            <a:off x="5310239" y="5324496"/>
+            <a:ext cx="406237" cy="116287"/>
+          </a:xfrm>
+          <a:prstGeom prst="rect">
+            <a:avLst/>
+          </a:prstGeom>
+          <a:solidFill>
+            <a:schemeClr val="bg1">
+              <a:lumMod val="85000"/>
+            </a:schemeClr>
+          </a:solidFill>
+        </p:spPr>
+        <p:style>
+          <a:lnRef idx="2">
+            <a:schemeClr val="dk1"/>
+          </a:lnRef>
+          <a:fillRef idx="1">
+            <a:schemeClr val="lt1"/>
+          </a:fillRef>
+          <a:effectRef idx="0">
+            <a:schemeClr val="dk1"/>
+          </a:effectRef>
+          <a:fontRef idx="minor">
+            <a:schemeClr val="dk1"/>
+          </a:fontRef>
+        </p:style>
+        <p:txBody>
+          <a:bodyPr rtlCol="0" anchor="ctr"/>
+          <a:lstStyle/>
+          <a:p>
+            <a:endParaRPr lang="de-DE" dirty="0"/>
+          </a:p>
+        </p:txBody>
+      </p:sp>
+      <p:sp>
+        <p:nvSpPr>
+          <p:cNvPr id="532" name="Rectangle 531">
+            <a:extLst>
+              <a:ext uri="{FF2B5EF4-FFF2-40B4-BE49-F238E27FC236}">
+                <a16:creationId xmlns:a16="http://schemas.microsoft.com/office/drawing/2014/main" id="{770190F2-798E-4E0E-A274-BF3A481EE1FE}"/>
+              </a:ext>
+            </a:extLst>
+          </p:cNvPr>
+          <p:cNvSpPr/>
+          <p:nvPr/>
+        </p:nvSpPr>
+        <p:spPr>
+          <a:xfrm>
+            <a:off x="5716476" y="5324496"/>
+            <a:ext cx="302186" cy="116287"/>
+          </a:xfrm>
+          <a:prstGeom prst="rect">
+            <a:avLst/>
+          </a:prstGeom>
+          <a:solidFill>
+            <a:schemeClr val="bg1">
+              <a:lumMod val="85000"/>
+            </a:schemeClr>
+          </a:solidFill>
+        </p:spPr>
+        <p:style>
+          <a:lnRef idx="2">
+            <a:schemeClr val="dk1"/>
+          </a:lnRef>
+          <a:fillRef idx="1">
+            <a:schemeClr val="lt1"/>
+          </a:fillRef>
+          <a:effectRef idx="0">
+            <a:schemeClr val="dk1"/>
+          </a:effectRef>
+          <a:fontRef idx="minor">
+            <a:schemeClr val="dk1"/>
+          </a:fontRef>
+        </p:style>
+        <p:txBody>
+          <a:bodyPr rtlCol="0" anchor="ctr"/>
+          <a:lstStyle/>
+          <a:p>
+            <a:endParaRPr lang="de-DE" dirty="0"/>
+          </a:p>
+        </p:txBody>
+      </p:sp>
+      <p:sp>
+        <p:nvSpPr>
+          <p:cNvPr id="533" name="Rectangle 532">
+            <a:extLst>
+              <a:ext uri="{FF2B5EF4-FFF2-40B4-BE49-F238E27FC236}">
+                <a16:creationId xmlns:a16="http://schemas.microsoft.com/office/drawing/2014/main" id="{8647DF83-9248-42B9-8BAD-D0AE271CEDB7}"/>
+              </a:ext>
+            </a:extLst>
+          </p:cNvPr>
+          <p:cNvSpPr/>
+          <p:nvPr/>
+        </p:nvSpPr>
+        <p:spPr>
+          <a:xfrm>
+            <a:off x="6528948" y="5324497"/>
+            <a:ext cx="246962" cy="116286"/>
+          </a:xfrm>
+          <a:prstGeom prst="rect">
+            <a:avLst/>
+          </a:prstGeom>
+          <a:solidFill>
+            <a:schemeClr val="bg1">
+              <a:lumMod val="85000"/>
+            </a:schemeClr>
+          </a:solidFill>
+        </p:spPr>
+        <p:style>
+          <a:lnRef idx="2">
+            <a:schemeClr val="dk1"/>
+          </a:lnRef>
+          <a:fillRef idx="1">
+            <a:schemeClr val="lt1"/>
+          </a:fillRef>
+          <a:effectRef idx="0">
+            <a:schemeClr val="dk1"/>
+          </a:effectRef>
+          <a:fontRef idx="minor">
+            <a:schemeClr val="dk1"/>
+          </a:fontRef>
+        </p:style>
+        <p:txBody>
+          <a:bodyPr rtlCol="0" anchor="ctr"/>
+          <a:lstStyle/>
+          <a:p>
+            <a:endParaRPr lang="de-DE" dirty="0"/>
+          </a:p>
+        </p:txBody>
+      </p:sp>
+      <p:sp>
+        <p:nvSpPr>
+          <p:cNvPr id="538" name="Rectangle 537">
+            <a:extLst>
+              <a:ext uri="{FF2B5EF4-FFF2-40B4-BE49-F238E27FC236}">
+                <a16:creationId xmlns:a16="http://schemas.microsoft.com/office/drawing/2014/main" id="{B7B789FA-A19F-4D3F-A0A2-AED10E9AF4DE}"/>
+              </a:ext>
+            </a:extLst>
+          </p:cNvPr>
+          <p:cNvSpPr/>
+          <p:nvPr/>
+        </p:nvSpPr>
+        <p:spPr>
+          <a:xfrm>
+            <a:off x="5310240" y="5565933"/>
+            <a:ext cx="406237" cy="122333"/>
+          </a:xfrm>
+          <a:prstGeom prst="rect">
+            <a:avLst/>
+          </a:prstGeom>
+          <a:solidFill>
+            <a:schemeClr val="bg1">
+              <a:lumMod val="85000"/>
+            </a:schemeClr>
+          </a:solidFill>
+        </p:spPr>
+        <p:style>
+          <a:lnRef idx="2">
+            <a:schemeClr val="dk1"/>
+          </a:lnRef>
+          <a:fillRef idx="1">
+            <a:schemeClr val="lt1"/>
+          </a:fillRef>
+          <a:effectRef idx="0">
+            <a:schemeClr val="dk1"/>
+          </a:effectRef>
+          <a:fontRef idx="minor">
+            <a:schemeClr val="dk1"/>
+          </a:fontRef>
+        </p:style>
+        <p:txBody>
+          <a:bodyPr rtlCol="0" anchor="ctr"/>
+          <a:lstStyle/>
+          <a:p>
+            <a:endParaRPr lang="de-DE" dirty="0"/>
+          </a:p>
+        </p:txBody>
+      </p:sp>
+      <p:sp>
+        <p:nvSpPr>
+          <p:cNvPr id="539" name="Rectangle 538">
+            <a:extLst>
+              <a:ext uri="{FF2B5EF4-FFF2-40B4-BE49-F238E27FC236}">
+                <a16:creationId xmlns:a16="http://schemas.microsoft.com/office/drawing/2014/main" id="{05DD38AE-6CA9-4782-BA44-0E0A457877EA}"/>
+              </a:ext>
+            </a:extLst>
+          </p:cNvPr>
+          <p:cNvSpPr/>
+          <p:nvPr/>
+        </p:nvSpPr>
+        <p:spPr>
+          <a:xfrm>
+            <a:off x="5716477" y="5565933"/>
+            <a:ext cx="302186" cy="122333"/>
+          </a:xfrm>
+          <a:prstGeom prst="rect">
+            <a:avLst/>
+          </a:prstGeom>
+        </p:spPr>
+        <p:style>
+          <a:lnRef idx="2">
+            <a:schemeClr val="dk1"/>
+          </a:lnRef>
+          <a:fillRef idx="1">
+            <a:schemeClr val="lt1"/>
+          </a:fillRef>
+          <a:effectRef idx="0">
+            <a:schemeClr val="dk1"/>
+          </a:effectRef>
+          <a:fontRef idx="minor">
+            <a:schemeClr val="dk1"/>
+          </a:fontRef>
+        </p:style>
+        <p:txBody>
+          <a:bodyPr rtlCol="0" anchor="ctr"/>
+          <a:lstStyle/>
+          <a:p>
+            <a:pPr algn="r"/>
+            <a:endParaRPr lang="de-DE" sz="900" dirty="0"/>
+          </a:p>
+        </p:txBody>
+      </p:sp>
+      <p:sp>
+        <p:nvSpPr>
+          <p:cNvPr id="540" name="Rectangle 539">
+            <a:extLst>
+              <a:ext uri="{FF2B5EF4-FFF2-40B4-BE49-F238E27FC236}">
+                <a16:creationId xmlns:a16="http://schemas.microsoft.com/office/drawing/2014/main" id="{60826B7C-F2D6-44B1-ABCB-6239D5BF4BDA}"/>
+              </a:ext>
+            </a:extLst>
+          </p:cNvPr>
+          <p:cNvSpPr/>
+          <p:nvPr/>
+        </p:nvSpPr>
+        <p:spPr>
+          <a:xfrm>
+            <a:off x="6528950" y="5565933"/>
+            <a:ext cx="246959" cy="122333"/>
+          </a:xfrm>
+          <a:prstGeom prst="rect">
+            <a:avLst/>
+          </a:prstGeom>
+        </p:spPr>
+        <p:style>
+          <a:lnRef idx="2">
+            <a:schemeClr val="dk1"/>
+          </a:lnRef>
+          <a:fillRef idx="1">
+            <a:schemeClr val="lt1"/>
+          </a:fillRef>
+          <a:effectRef idx="0">
+            <a:schemeClr val="dk1"/>
+          </a:effectRef>
+          <a:fontRef idx="minor">
+            <a:schemeClr val="dk1"/>
+          </a:fontRef>
+        </p:style>
+        <p:txBody>
+          <a:bodyPr rtlCol="0" anchor="ctr"/>
+          <a:lstStyle/>
+          <a:p>
+            <a:endParaRPr lang="de-DE" dirty="0"/>
+          </a:p>
+        </p:txBody>
+      </p:sp>
+      <p:sp>
+        <p:nvSpPr>
+          <p:cNvPr id="542" name="Rectangle 541">
+            <a:extLst>
+              <a:ext uri="{FF2B5EF4-FFF2-40B4-BE49-F238E27FC236}">
+                <a16:creationId xmlns:a16="http://schemas.microsoft.com/office/drawing/2014/main" id="{DCD15816-D55F-414A-8006-483793E294AA}"/>
+              </a:ext>
+            </a:extLst>
+          </p:cNvPr>
+          <p:cNvSpPr/>
+          <p:nvPr/>
+        </p:nvSpPr>
+        <p:spPr>
+          <a:xfrm>
+            <a:off x="4904003" y="5686332"/>
+            <a:ext cx="406237" cy="250392"/>
+          </a:xfrm>
+          <a:prstGeom prst="rect">
+            <a:avLst/>
+          </a:prstGeom>
+        </p:spPr>
+        <p:style>
+          <a:lnRef idx="2">
+            <a:schemeClr val="dk1"/>
+          </a:lnRef>
+          <a:fillRef idx="1">
+            <a:schemeClr val="lt1"/>
+          </a:fillRef>
+          <a:effectRef idx="0">
+            <a:schemeClr val="dk1"/>
+          </a:effectRef>
+          <a:fontRef idx="minor">
+            <a:schemeClr val="dk1"/>
+          </a:fontRef>
+        </p:style>
+        <p:txBody>
+          <a:bodyPr rtlCol="0" anchor="ctr"/>
+          <a:lstStyle/>
+          <a:p>
+            <a:endParaRPr lang="de-DE" dirty="0"/>
+          </a:p>
+        </p:txBody>
+      </p:sp>
+      <p:sp>
+        <p:nvSpPr>
+          <p:cNvPr id="543" name="Rectangle 542">
+            <a:extLst>
+              <a:ext uri="{FF2B5EF4-FFF2-40B4-BE49-F238E27FC236}">
+                <a16:creationId xmlns:a16="http://schemas.microsoft.com/office/drawing/2014/main" id="{6D799457-5C8C-4234-BE61-A100BDC82BA6}"/>
+              </a:ext>
+            </a:extLst>
+          </p:cNvPr>
+          <p:cNvSpPr/>
+          <p:nvPr/>
+        </p:nvSpPr>
+        <p:spPr>
+          <a:xfrm>
+            <a:off x="5310240" y="5686332"/>
+            <a:ext cx="406237" cy="122333"/>
+          </a:xfrm>
+          <a:prstGeom prst="rect">
+            <a:avLst/>
+          </a:prstGeom>
+          <a:solidFill>
+            <a:schemeClr val="bg1">
+              <a:lumMod val="85000"/>
+            </a:schemeClr>
+          </a:solidFill>
+        </p:spPr>
+        <p:style>
+          <a:lnRef idx="2">
+            <a:schemeClr val="dk1"/>
+          </a:lnRef>
+          <a:fillRef idx="1">
+            <a:schemeClr val="lt1"/>
+          </a:fillRef>
+          <a:effectRef idx="0">
+            <a:schemeClr val="dk1"/>
+          </a:effectRef>
+          <a:fontRef idx="minor">
+            <a:schemeClr val="dk1"/>
+          </a:fontRef>
+        </p:style>
+        <p:txBody>
+          <a:bodyPr rtlCol="0" anchor="ctr"/>
+          <a:lstStyle/>
+          <a:p>
+            <a:endParaRPr lang="de-DE" dirty="0"/>
+          </a:p>
+        </p:txBody>
+      </p:sp>
+      <p:sp>
+        <p:nvSpPr>
+          <p:cNvPr id="544" name="Rectangle 543">
+            <a:extLst>
+              <a:ext uri="{FF2B5EF4-FFF2-40B4-BE49-F238E27FC236}">
+                <a16:creationId xmlns:a16="http://schemas.microsoft.com/office/drawing/2014/main" id="{FD5FF161-894B-40CC-AAB5-CE37C9AB5885}"/>
+              </a:ext>
+            </a:extLst>
+          </p:cNvPr>
+          <p:cNvSpPr/>
+          <p:nvPr/>
+        </p:nvSpPr>
+        <p:spPr>
+          <a:xfrm>
+            <a:off x="5716477" y="5686332"/>
+            <a:ext cx="302186" cy="122333"/>
+          </a:xfrm>
+          <a:prstGeom prst="rect">
+            <a:avLst/>
+          </a:prstGeom>
+        </p:spPr>
+        <p:style>
+          <a:lnRef idx="2">
+            <a:schemeClr val="dk1"/>
+          </a:lnRef>
+          <a:fillRef idx="1">
+            <a:schemeClr val="lt1"/>
+          </a:fillRef>
+          <a:effectRef idx="0">
+            <a:schemeClr val="dk1"/>
+          </a:effectRef>
+          <a:fontRef idx="minor">
+            <a:schemeClr val="dk1"/>
+          </a:fontRef>
+        </p:style>
+        <p:txBody>
+          <a:bodyPr rtlCol="0" anchor="ctr"/>
+          <a:lstStyle/>
+          <a:p>
+            <a:pPr algn="r"/>
+            <a:endParaRPr lang="de-DE" sz="900" dirty="0"/>
+          </a:p>
+        </p:txBody>
+      </p:sp>
+      <p:sp>
+        <p:nvSpPr>
+          <p:cNvPr id="545" name="Rectangle 544">
+            <a:extLst>
+              <a:ext uri="{FF2B5EF4-FFF2-40B4-BE49-F238E27FC236}">
+                <a16:creationId xmlns:a16="http://schemas.microsoft.com/office/drawing/2014/main" id="{C561F82E-D34E-4673-8F95-160EDD11533A}"/>
+              </a:ext>
+            </a:extLst>
+          </p:cNvPr>
+          <p:cNvSpPr/>
+          <p:nvPr/>
+        </p:nvSpPr>
+        <p:spPr>
+          <a:xfrm>
+            <a:off x="6528950" y="5686332"/>
+            <a:ext cx="246959" cy="122333"/>
+          </a:xfrm>
+          <a:prstGeom prst="rect">
+            <a:avLst/>
+          </a:prstGeom>
+        </p:spPr>
+        <p:style>
+          <a:lnRef idx="2">
+            <a:schemeClr val="dk1"/>
+          </a:lnRef>
+          <a:fillRef idx="1">
+            <a:schemeClr val="lt1"/>
+          </a:fillRef>
+          <a:effectRef idx="0">
+            <a:schemeClr val="dk1"/>
+          </a:effectRef>
+          <a:fontRef idx="minor">
+            <a:schemeClr val="dk1"/>
+          </a:fontRef>
+        </p:style>
+        <p:txBody>
+          <a:bodyPr rtlCol="0" anchor="ctr"/>
+          <a:lstStyle/>
+          <a:p>
+            <a:endParaRPr lang="de-DE" dirty="0"/>
+          </a:p>
+        </p:txBody>
+      </p:sp>
+      <p:sp>
+        <p:nvSpPr>
+          <p:cNvPr id="548" name="Rectangle 547">
+            <a:extLst>
+              <a:ext uri="{FF2B5EF4-FFF2-40B4-BE49-F238E27FC236}">
+                <a16:creationId xmlns:a16="http://schemas.microsoft.com/office/drawing/2014/main" id="{87E0B4CA-B68B-401E-8A34-EA0222EF4805}"/>
+              </a:ext>
+            </a:extLst>
+          </p:cNvPr>
+          <p:cNvSpPr/>
+          <p:nvPr/>
+        </p:nvSpPr>
+        <p:spPr>
+          <a:xfrm>
+            <a:off x="5310240" y="5805774"/>
+            <a:ext cx="406237" cy="122333"/>
+          </a:xfrm>
+          <a:prstGeom prst="rect">
+            <a:avLst/>
+          </a:prstGeom>
+          <a:solidFill>
+            <a:schemeClr val="bg1">
+              <a:lumMod val="85000"/>
+            </a:schemeClr>
+          </a:solidFill>
+        </p:spPr>
+        <p:style>
+          <a:lnRef idx="2">
+            <a:schemeClr val="dk1"/>
+          </a:lnRef>
+          <a:fillRef idx="1">
+            <a:schemeClr val="lt1"/>
+          </a:fillRef>
+          <a:effectRef idx="0">
+            <a:schemeClr val="dk1"/>
+          </a:effectRef>
+          <a:fontRef idx="minor">
+            <a:schemeClr val="dk1"/>
+          </a:fontRef>
+        </p:style>
+        <p:txBody>
+          <a:bodyPr rtlCol="0" anchor="ctr"/>
+          <a:lstStyle/>
+          <a:p>
+            <a:endParaRPr lang="de-DE" dirty="0"/>
+          </a:p>
+        </p:txBody>
+      </p:sp>
+      <p:sp>
+        <p:nvSpPr>
+          <p:cNvPr id="549" name="Rectangle 548">
+            <a:extLst>
+              <a:ext uri="{FF2B5EF4-FFF2-40B4-BE49-F238E27FC236}">
+                <a16:creationId xmlns:a16="http://schemas.microsoft.com/office/drawing/2014/main" id="{F737AACD-8E15-4E8C-90DC-65441187463F}"/>
+              </a:ext>
+            </a:extLst>
+          </p:cNvPr>
+          <p:cNvSpPr/>
+          <p:nvPr/>
+        </p:nvSpPr>
+        <p:spPr>
+          <a:xfrm>
+            <a:off x="5716477" y="5805774"/>
+            <a:ext cx="302186" cy="122333"/>
+          </a:xfrm>
+          <a:prstGeom prst="rect">
+            <a:avLst/>
+          </a:prstGeom>
+        </p:spPr>
+        <p:style>
+          <a:lnRef idx="2">
+            <a:schemeClr val="dk1"/>
+          </a:lnRef>
+          <a:fillRef idx="1">
+            <a:schemeClr val="lt1"/>
+          </a:fillRef>
+          <a:effectRef idx="0">
+            <a:schemeClr val="dk1"/>
+          </a:effectRef>
+          <a:fontRef idx="minor">
+            <a:schemeClr val="dk1"/>
+          </a:fontRef>
+        </p:style>
+        <p:txBody>
+          <a:bodyPr rtlCol="0" anchor="ctr"/>
+          <a:lstStyle/>
+          <a:p>
+            <a:pPr algn="r"/>
+            <a:endParaRPr lang="de-DE" sz="900" dirty="0"/>
+          </a:p>
+        </p:txBody>
+      </p:sp>
+      <p:sp>
+        <p:nvSpPr>
+          <p:cNvPr id="550" name="Rectangle 549">
+            <a:extLst>
+              <a:ext uri="{FF2B5EF4-FFF2-40B4-BE49-F238E27FC236}">
+                <a16:creationId xmlns:a16="http://schemas.microsoft.com/office/drawing/2014/main" id="{A032F166-0A6F-4EA0-8E5B-959B074D674F}"/>
+              </a:ext>
+            </a:extLst>
+          </p:cNvPr>
+          <p:cNvSpPr/>
+          <p:nvPr/>
+        </p:nvSpPr>
+        <p:spPr>
+          <a:xfrm>
+            <a:off x="6528950" y="5805774"/>
+            <a:ext cx="246959" cy="122333"/>
+          </a:xfrm>
+          <a:prstGeom prst="rect">
+            <a:avLst/>
+          </a:prstGeom>
+        </p:spPr>
+        <p:style>
+          <a:lnRef idx="2">
+            <a:schemeClr val="dk1"/>
+          </a:lnRef>
+          <a:fillRef idx="1">
+            <a:schemeClr val="lt1"/>
+          </a:fillRef>
+          <a:effectRef idx="0">
+            <a:schemeClr val="dk1"/>
+          </a:effectRef>
+          <a:fontRef idx="minor">
+            <a:schemeClr val="dk1"/>
+          </a:fontRef>
+        </p:style>
+        <p:txBody>
+          <a:bodyPr rtlCol="0" anchor="ctr"/>
+          <a:lstStyle/>
+          <a:p>
+            <a:endParaRPr lang="de-DE" dirty="0"/>
+          </a:p>
+        </p:txBody>
+      </p:sp>
+      <p:sp>
+        <p:nvSpPr>
+          <p:cNvPr id="661" name="Rectangle 660">
+            <a:extLst>
+              <a:ext uri="{FF2B5EF4-FFF2-40B4-BE49-F238E27FC236}">
+                <a16:creationId xmlns:a16="http://schemas.microsoft.com/office/drawing/2014/main" id="{CCD7BB6D-A3B2-487E-A75E-34B8B0A248BB}"/>
+              </a:ext>
+            </a:extLst>
+          </p:cNvPr>
+          <p:cNvSpPr/>
+          <p:nvPr/>
+        </p:nvSpPr>
+        <p:spPr>
+          <a:xfrm>
+            <a:off x="4904002" y="5924438"/>
+            <a:ext cx="406237" cy="241775"/>
+          </a:xfrm>
+          <a:prstGeom prst="rect">
+            <a:avLst/>
+          </a:prstGeom>
+        </p:spPr>
+        <p:style>
+          <a:lnRef idx="2">
+            <a:schemeClr val="dk1"/>
+          </a:lnRef>
+          <a:fillRef idx="1">
+            <a:schemeClr val="lt1"/>
+          </a:fillRef>
+          <a:effectRef idx="0">
+            <a:schemeClr val="dk1"/>
+          </a:effectRef>
+          <a:fontRef idx="minor">
+            <a:schemeClr val="dk1"/>
+          </a:fontRef>
+        </p:style>
+        <p:txBody>
+          <a:bodyPr rtlCol="0" anchor="ctr"/>
+          <a:lstStyle/>
+          <a:p>
+            <a:endParaRPr lang="de-DE" dirty="0"/>
+          </a:p>
+        </p:txBody>
+      </p:sp>
+      <p:sp>
+        <p:nvSpPr>
+          <p:cNvPr id="665" name="Rectangle 664">
+            <a:extLst>
+              <a:ext uri="{FF2B5EF4-FFF2-40B4-BE49-F238E27FC236}">
+                <a16:creationId xmlns:a16="http://schemas.microsoft.com/office/drawing/2014/main" id="{290E092D-0797-4B1F-B3B3-0E7B34DBFABC}"/>
+              </a:ext>
+            </a:extLst>
+          </p:cNvPr>
+          <p:cNvSpPr/>
+          <p:nvPr/>
+        </p:nvSpPr>
+        <p:spPr>
+          <a:xfrm>
+            <a:off x="5310239" y="5924439"/>
+            <a:ext cx="406237" cy="122333"/>
+          </a:xfrm>
+          <a:prstGeom prst="rect">
+            <a:avLst/>
+          </a:prstGeom>
+          <a:solidFill>
+            <a:schemeClr val="bg1">
+              <a:lumMod val="85000"/>
+            </a:schemeClr>
+          </a:solidFill>
+        </p:spPr>
+        <p:style>
+          <a:lnRef idx="2">
+            <a:schemeClr val="dk1"/>
+          </a:lnRef>
+          <a:fillRef idx="1">
+            <a:schemeClr val="lt1"/>
+          </a:fillRef>
+          <a:effectRef idx="0">
+            <a:schemeClr val="dk1"/>
+          </a:effectRef>
+          <a:fontRef idx="minor">
+            <a:schemeClr val="dk1"/>
+          </a:fontRef>
+        </p:style>
+        <p:txBody>
+          <a:bodyPr rtlCol="0" anchor="ctr"/>
+          <a:lstStyle/>
+          <a:p>
+            <a:endParaRPr lang="de-DE" dirty="0"/>
+          </a:p>
+        </p:txBody>
+      </p:sp>
+      <p:sp>
+        <p:nvSpPr>
+          <p:cNvPr id="670" name="Rectangle 669">
+            <a:extLst>
+              <a:ext uri="{FF2B5EF4-FFF2-40B4-BE49-F238E27FC236}">
+                <a16:creationId xmlns:a16="http://schemas.microsoft.com/office/drawing/2014/main" id="{CCDDA10B-D1D1-467D-BEB7-8B44FD3D0DF5}"/>
+              </a:ext>
+            </a:extLst>
+          </p:cNvPr>
+          <p:cNvSpPr/>
+          <p:nvPr/>
+        </p:nvSpPr>
+        <p:spPr>
+          <a:xfrm>
+            <a:off x="5716476" y="5924439"/>
+            <a:ext cx="302186" cy="122333"/>
+          </a:xfrm>
+          <a:prstGeom prst="rect">
+            <a:avLst/>
+          </a:prstGeom>
+        </p:spPr>
+        <p:style>
+          <a:lnRef idx="2">
+            <a:schemeClr val="dk1"/>
+          </a:lnRef>
+          <a:fillRef idx="1">
+            <a:schemeClr val="lt1"/>
+          </a:fillRef>
+          <a:effectRef idx="0">
+            <a:schemeClr val="dk1"/>
+          </a:effectRef>
+          <a:fontRef idx="minor">
+            <a:schemeClr val="dk1"/>
+          </a:fontRef>
+        </p:style>
+        <p:txBody>
+          <a:bodyPr rtlCol="0" anchor="ctr"/>
+          <a:lstStyle/>
+          <a:p>
+            <a:pPr algn="r"/>
+            <a:endParaRPr lang="de-DE" sz="900" dirty="0"/>
+          </a:p>
+        </p:txBody>
+      </p:sp>
+      <p:sp>
+        <p:nvSpPr>
+          <p:cNvPr id="675" name="Rectangle 674">
+            <a:extLst>
+              <a:ext uri="{FF2B5EF4-FFF2-40B4-BE49-F238E27FC236}">
+                <a16:creationId xmlns:a16="http://schemas.microsoft.com/office/drawing/2014/main" id="{686B0004-1282-47AF-A8E9-26824FE7F63A}"/>
+              </a:ext>
+            </a:extLst>
+          </p:cNvPr>
+          <p:cNvSpPr/>
+          <p:nvPr/>
+        </p:nvSpPr>
+        <p:spPr>
+          <a:xfrm>
+            <a:off x="6528949" y="5924439"/>
+            <a:ext cx="246959" cy="122333"/>
+          </a:xfrm>
+          <a:prstGeom prst="rect">
+            <a:avLst/>
+          </a:prstGeom>
+        </p:spPr>
+        <p:style>
+          <a:lnRef idx="2">
+            <a:schemeClr val="dk1"/>
+          </a:lnRef>
+          <a:fillRef idx="1">
+            <a:schemeClr val="lt1"/>
+          </a:fillRef>
+          <a:effectRef idx="0">
+            <a:schemeClr val="dk1"/>
+          </a:effectRef>
+          <a:fontRef idx="minor">
+            <a:schemeClr val="dk1"/>
+          </a:fontRef>
+        </p:style>
+        <p:txBody>
+          <a:bodyPr rtlCol="0" anchor="ctr"/>
+          <a:lstStyle/>
+          <a:p>
+            <a:endParaRPr lang="de-DE" dirty="0"/>
+          </a:p>
+        </p:txBody>
+      </p:sp>
+      <p:sp>
+        <p:nvSpPr>
+          <p:cNvPr id="734" name="Rectangle 733">
+            <a:extLst>
+              <a:ext uri="{FF2B5EF4-FFF2-40B4-BE49-F238E27FC236}">
+                <a16:creationId xmlns:a16="http://schemas.microsoft.com/office/drawing/2014/main" id="{2C22A565-8CAD-4370-8956-0664F0217B50}"/>
+              </a:ext>
+            </a:extLst>
+          </p:cNvPr>
+          <p:cNvSpPr/>
+          <p:nvPr/>
+        </p:nvSpPr>
+        <p:spPr>
+          <a:xfrm>
+            <a:off x="5310239" y="6043881"/>
+            <a:ext cx="406237" cy="122333"/>
+          </a:xfrm>
+          <a:prstGeom prst="rect">
+            <a:avLst/>
+          </a:prstGeom>
+          <a:solidFill>
+            <a:schemeClr val="bg1">
+              <a:lumMod val="85000"/>
+            </a:schemeClr>
+          </a:solidFill>
+        </p:spPr>
+        <p:style>
+          <a:lnRef idx="2">
+            <a:schemeClr val="dk1"/>
+          </a:lnRef>
+          <a:fillRef idx="1">
+            <a:schemeClr val="lt1"/>
+          </a:fillRef>
+          <a:effectRef idx="0">
+            <a:schemeClr val="dk1"/>
+          </a:effectRef>
+          <a:fontRef idx="minor">
+            <a:schemeClr val="dk1"/>
+          </a:fontRef>
+        </p:style>
+        <p:txBody>
+          <a:bodyPr rtlCol="0" anchor="ctr"/>
+          <a:lstStyle/>
+          <a:p>
+            <a:endParaRPr lang="de-DE" dirty="0"/>
+          </a:p>
+        </p:txBody>
+      </p:sp>
+      <p:sp>
+        <p:nvSpPr>
+          <p:cNvPr id="735" name="Rectangle 734">
+            <a:extLst>
+              <a:ext uri="{FF2B5EF4-FFF2-40B4-BE49-F238E27FC236}">
+                <a16:creationId xmlns:a16="http://schemas.microsoft.com/office/drawing/2014/main" id="{A8599A6B-146B-405E-A4C9-711D028D3119}"/>
+              </a:ext>
+            </a:extLst>
+          </p:cNvPr>
+          <p:cNvSpPr/>
+          <p:nvPr/>
+        </p:nvSpPr>
+        <p:spPr>
+          <a:xfrm>
+            <a:off x="5716476" y="6043881"/>
+            <a:ext cx="302186" cy="122333"/>
+          </a:xfrm>
+          <a:prstGeom prst="rect">
+            <a:avLst/>
+          </a:prstGeom>
+        </p:spPr>
+        <p:style>
+          <a:lnRef idx="2">
+            <a:schemeClr val="dk1"/>
+          </a:lnRef>
+          <a:fillRef idx="1">
+            <a:schemeClr val="lt1"/>
+          </a:fillRef>
+          <a:effectRef idx="0">
+            <a:schemeClr val="dk1"/>
+          </a:effectRef>
+          <a:fontRef idx="minor">
+            <a:schemeClr val="dk1"/>
+          </a:fontRef>
+        </p:style>
+        <p:txBody>
+          <a:bodyPr rtlCol="0" anchor="ctr"/>
+          <a:lstStyle/>
+          <a:p>
+            <a:pPr algn="r"/>
+            <a:endParaRPr lang="de-DE" sz="900" dirty="0"/>
+          </a:p>
+        </p:txBody>
+      </p:sp>
+      <p:sp>
+        <p:nvSpPr>
+          <p:cNvPr id="736" name="Rectangle 735">
+            <a:extLst>
+              <a:ext uri="{FF2B5EF4-FFF2-40B4-BE49-F238E27FC236}">
+                <a16:creationId xmlns:a16="http://schemas.microsoft.com/office/drawing/2014/main" id="{8B4393AB-F5F7-4E29-9087-A36A6540D766}"/>
+              </a:ext>
+            </a:extLst>
+          </p:cNvPr>
+          <p:cNvSpPr/>
+          <p:nvPr/>
+        </p:nvSpPr>
+        <p:spPr>
+          <a:xfrm>
+            <a:off x="6528949" y="6043881"/>
+            <a:ext cx="246959" cy="122333"/>
+          </a:xfrm>
+          <a:prstGeom prst="rect">
+            <a:avLst/>
+          </a:prstGeom>
+        </p:spPr>
+        <p:style>
+          <a:lnRef idx="2">
+            <a:schemeClr val="dk1"/>
+          </a:lnRef>
+          <a:fillRef idx="1">
+            <a:schemeClr val="lt1"/>
+          </a:fillRef>
+          <a:effectRef idx="0">
+            <a:schemeClr val="dk1"/>
+          </a:effectRef>
+          <a:fontRef idx="minor">
+            <a:schemeClr val="dk1"/>
+          </a:fontRef>
+        </p:style>
+        <p:txBody>
+          <a:bodyPr rtlCol="0" anchor="ctr"/>
+          <a:lstStyle/>
+          <a:p>
+            <a:endParaRPr lang="de-DE" dirty="0"/>
+          </a:p>
+        </p:txBody>
+      </p:sp>
+      <p:sp>
+        <p:nvSpPr>
+          <p:cNvPr id="738" name="Rectangle 737">
+            <a:extLst>
+              <a:ext uri="{FF2B5EF4-FFF2-40B4-BE49-F238E27FC236}">
+                <a16:creationId xmlns:a16="http://schemas.microsoft.com/office/drawing/2014/main" id="{2630C731-F5C1-4BBF-8879-885AE1204B58}"/>
+              </a:ext>
+            </a:extLst>
+          </p:cNvPr>
+          <p:cNvSpPr/>
+          <p:nvPr/>
+        </p:nvSpPr>
+        <p:spPr>
+          <a:xfrm>
+            <a:off x="6017698" y="5440783"/>
+            <a:ext cx="302186" cy="122333"/>
+          </a:xfrm>
+          <a:prstGeom prst="rect">
+            <a:avLst/>
+          </a:prstGeom>
+        </p:spPr>
+        <p:style>
+          <a:lnRef idx="2">
+            <a:schemeClr val="dk1"/>
+          </a:lnRef>
+          <a:fillRef idx="1">
+            <a:schemeClr val="lt1"/>
+          </a:fillRef>
+          <a:effectRef idx="0">
+            <a:schemeClr val="dk1"/>
+          </a:effectRef>
+          <a:fontRef idx="minor">
+            <a:schemeClr val="dk1"/>
+          </a:fontRef>
+        </p:style>
+        <p:txBody>
+          <a:bodyPr rtlCol="0" anchor="ctr"/>
+          <a:lstStyle/>
+          <a:p>
+            <a:pPr algn="r"/>
+            <a:endParaRPr lang="de-DE" sz="900" dirty="0"/>
+          </a:p>
+        </p:txBody>
+      </p:sp>
+      <p:sp>
+        <p:nvSpPr>
+          <p:cNvPr id="739" name="Rectangle 738">
+            <a:extLst>
+              <a:ext uri="{FF2B5EF4-FFF2-40B4-BE49-F238E27FC236}">
+                <a16:creationId xmlns:a16="http://schemas.microsoft.com/office/drawing/2014/main" id="{B59C8982-302F-44B7-AC24-0B01F9CA8D7A}"/>
+              </a:ext>
+            </a:extLst>
+          </p:cNvPr>
+          <p:cNvSpPr/>
+          <p:nvPr/>
+        </p:nvSpPr>
+        <p:spPr>
+          <a:xfrm>
+            <a:off x="6017697" y="5324496"/>
+            <a:ext cx="302186" cy="116287"/>
+          </a:xfrm>
+          <a:prstGeom prst="rect">
+            <a:avLst/>
+          </a:prstGeom>
+          <a:solidFill>
+            <a:schemeClr val="bg1">
+              <a:lumMod val="85000"/>
+            </a:schemeClr>
+          </a:solidFill>
+        </p:spPr>
+        <p:style>
+          <a:lnRef idx="2">
+            <a:schemeClr val="dk1"/>
+          </a:lnRef>
+          <a:fillRef idx="1">
+            <a:schemeClr val="lt1"/>
+          </a:fillRef>
+          <a:effectRef idx="0">
+            <a:schemeClr val="dk1"/>
+          </a:effectRef>
+          <a:fontRef idx="minor">
+            <a:schemeClr val="dk1"/>
+          </a:fontRef>
+        </p:style>
+        <p:txBody>
+          <a:bodyPr rtlCol="0" anchor="ctr"/>
+          <a:lstStyle/>
+          <a:p>
+            <a:endParaRPr lang="de-DE" dirty="0"/>
+          </a:p>
+        </p:txBody>
+      </p:sp>
+      <p:sp>
+        <p:nvSpPr>
+          <p:cNvPr id="740" name="Rectangle 739">
+            <a:extLst>
+              <a:ext uri="{FF2B5EF4-FFF2-40B4-BE49-F238E27FC236}">
+                <a16:creationId xmlns:a16="http://schemas.microsoft.com/office/drawing/2014/main" id="{19B768A4-1D16-4AFE-B5B7-D52EE88E6EA3}"/>
+              </a:ext>
+            </a:extLst>
+          </p:cNvPr>
+          <p:cNvSpPr/>
+          <p:nvPr/>
+        </p:nvSpPr>
+        <p:spPr>
+          <a:xfrm>
+            <a:off x="6017698" y="5565933"/>
+            <a:ext cx="302186" cy="122333"/>
+          </a:xfrm>
+          <a:prstGeom prst="rect">
+            <a:avLst/>
+          </a:prstGeom>
+        </p:spPr>
+        <p:style>
+          <a:lnRef idx="2">
+            <a:schemeClr val="dk1"/>
+          </a:lnRef>
+          <a:fillRef idx="1">
+            <a:schemeClr val="lt1"/>
+          </a:fillRef>
+          <a:effectRef idx="0">
+            <a:schemeClr val="dk1"/>
+          </a:effectRef>
+          <a:fontRef idx="minor">
+            <a:schemeClr val="dk1"/>
+          </a:fontRef>
+        </p:style>
+        <p:txBody>
+          <a:bodyPr rtlCol="0" anchor="ctr"/>
+          <a:lstStyle/>
+          <a:p>
+            <a:pPr algn="r"/>
+            <a:endParaRPr lang="de-DE" sz="900" dirty="0"/>
+          </a:p>
+        </p:txBody>
+      </p:sp>
+      <p:sp>
+        <p:nvSpPr>
+          <p:cNvPr id="741" name="Rectangle 740">
+            <a:extLst>
+              <a:ext uri="{FF2B5EF4-FFF2-40B4-BE49-F238E27FC236}">
+                <a16:creationId xmlns:a16="http://schemas.microsoft.com/office/drawing/2014/main" id="{8501856F-3D60-44CB-B39D-8D2DF7218311}"/>
+              </a:ext>
+            </a:extLst>
+          </p:cNvPr>
+          <p:cNvSpPr/>
+          <p:nvPr/>
+        </p:nvSpPr>
+        <p:spPr>
+          <a:xfrm>
+            <a:off x="6017698" y="5686332"/>
+            <a:ext cx="302186" cy="122333"/>
+          </a:xfrm>
+          <a:prstGeom prst="rect">
+            <a:avLst/>
+          </a:prstGeom>
+        </p:spPr>
+        <p:style>
+          <a:lnRef idx="2">
+            <a:schemeClr val="dk1"/>
+          </a:lnRef>
+          <a:fillRef idx="1">
+            <a:schemeClr val="lt1"/>
+          </a:fillRef>
+          <a:effectRef idx="0">
+            <a:schemeClr val="dk1"/>
+          </a:effectRef>
+          <a:fontRef idx="minor">
+            <a:schemeClr val="dk1"/>
+          </a:fontRef>
+        </p:style>
+        <p:txBody>
+          <a:bodyPr rtlCol="0" anchor="ctr"/>
+          <a:lstStyle/>
+          <a:p>
+            <a:pPr algn="r"/>
+            <a:endParaRPr lang="de-DE" sz="900" dirty="0"/>
+          </a:p>
+        </p:txBody>
+      </p:sp>
+      <p:sp>
+        <p:nvSpPr>
+          <p:cNvPr id="742" name="Rectangle 741">
+            <a:extLst>
+              <a:ext uri="{FF2B5EF4-FFF2-40B4-BE49-F238E27FC236}">
+                <a16:creationId xmlns:a16="http://schemas.microsoft.com/office/drawing/2014/main" id="{DC4A8BF2-B9B8-4125-AA6C-8E3F6412B0A3}"/>
+              </a:ext>
+            </a:extLst>
+          </p:cNvPr>
+          <p:cNvSpPr/>
+          <p:nvPr/>
+        </p:nvSpPr>
+        <p:spPr>
+          <a:xfrm>
+            <a:off x="6017698" y="5805774"/>
+            <a:ext cx="302186" cy="122333"/>
+          </a:xfrm>
+          <a:prstGeom prst="rect">
+            <a:avLst/>
+          </a:prstGeom>
+        </p:spPr>
+        <p:style>
+          <a:lnRef idx="2">
+            <a:schemeClr val="dk1"/>
+          </a:lnRef>
+          <a:fillRef idx="1">
+            <a:schemeClr val="lt1"/>
+          </a:fillRef>
+          <a:effectRef idx="0">
+            <a:schemeClr val="dk1"/>
+          </a:effectRef>
+          <a:fontRef idx="minor">
+            <a:schemeClr val="dk1"/>
+          </a:fontRef>
+        </p:style>
+        <p:txBody>
+          <a:bodyPr rtlCol="0" anchor="ctr"/>
+          <a:lstStyle/>
+          <a:p>
+            <a:pPr algn="r"/>
+            <a:endParaRPr lang="de-DE" sz="900" dirty="0"/>
+          </a:p>
+        </p:txBody>
+      </p:sp>
+      <p:sp>
+        <p:nvSpPr>
+          <p:cNvPr id="743" name="Rectangle 742">
+            <a:extLst>
+              <a:ext uri="{FF2B5EF4-FFF2-40B4-BE49-F238E27FC236}">
+                <a16:creationId xmlns:a16="http://schemas.microsoft.com/office/drawing/2014/main" id="{2A843675-7A3D-41C4-931D-ADF4B1A9F941}"/>
+              </a:ext>
+            </a:extLst>
+          </p:cNvPr>
+          <p:cNvSpPr/>
+          <p:nvPr/>
+        </p:nvSpPr>
+        <p:spPr>
+          <a:xfrm>
+            <a:off x="6017697" y="5924439"/>
+            <a:ext cx="302186" cy="122333"/>
+          </a:xfrm>
+          <a:prstGeom prst="rect">
+            <a:avLst/>
+          </a:prstGeom>
+        </p:spPr>
+        <p:style>
+          <a:lnRef idx="2">
+            <a:schemeClr val="dk1"/>
+          </a:lnRef>
+          <a:fillRef idx="1">
+            <a:schemeClr val="lt1"/>
+          </a:fillRef>
+          <a:effectRef idx="0">
+            <a:schemeClr val="dk1"/>
+          </a:effectRef>
+          <a:fontRef idx="minor">
+            <a:schemeClr val="dk1"/>
+          </a:fontRef>
+        </p:style>
+        <p:txBody>
+          <a:bodyPr rtlCol="0" anchor="ctr"/>
+          <a:lstStyle/>
+          <a:p>
+            <a:pPr algn="r"/>
+            <a:endParaRPr lang="de-DE" sz="900" dirty="0"/>
+          </a:p>
+        </p:txBody>
+      </p:sp>
+      <p:sp>
+        <p:nvSpPr>
+          <p:cNvPr id="744" name="Rectangle 743">
+            <a:extLst>
+              <a:ext uri="{FF2B5EF4-FFF2-40B4-BE49-F238E27FC236}">
+                <a16:creationId xmlns:a16="http://schemas.microsoft.com/office/drawing/2014/main" id="{55CD8C85-7DCC-46D7-997F-86A510A8B6D5}"/>
+              </a:ext>
+            </a:extLst>
+          </p:cNvPr>
+          <p:cNvSpPr/>
+          <p:nvPr/>
+        </p:nvSpPr>
+        <p:spPr>
+          <a:xfrm>
+            <a:off x="6017697" y="6043881"/>
+            <a:ext cx="302186" cy="122333"/>
+          </a:xfrm>
+          <a:prstGeom prst="rect">
+            <a:avLst/>
+          </a:prstGeom>
+        </p:spPr>
+        <p:style>
+          <a:lnRef idx="2">
+            <a:schemeClr val="dk1"/>
+          </a:lnRef>
+          <a:fillRef idx="1">
+            <a:schemeClr val="lt1"/>
+          </a:fillRef>
+          <a:effectRef idx="0">
+            <a:schemeClr val="dk1"/>
+          </a:effectRef>
+          <a:fontRef idx="minor">
+            <a:schemeClr val="dk1"/>
+          </a:fontRef>
+        </p:style>
+        <p:txBody>
+          <a:bodyPr rtlCol="0" anchor="ctr"/>
+          <a:lstStyle/>
+          <a:p>
+            <a:pPr algn="r"/>
+            <a:endParaRPr lang="de-DE" sz="900" dirty="0"/>
+          </a:p>
+        </p:txBody>
+      </p:sp>
+      <p:sp>
+        <p:nvSpPr>
+          <p:cNvPr id="745" name="Rectangle 744">
+            <a:extLst>
+              <a:ext uri="{FF2B5EF4-FFF2-40B4-BE49-F238E27FC236}">
+                <a16:creationId xmlns:a16="http://schemas.microsoft.com/office/drawing/2014/main" id="{A2BBE4CA-5EA3-4F42-BD3A-9CD88C6F29D6}"/>
+              </a:ext>
+            </a:extLst>
+          </p:cNvPr>
+          <p:cNvSpPr/>
+          <p:nvPr/>
+        </p:nvSpPr>
+        <p:spPr>
+          <a:xfrm>
+            <a:off x="6317893" y="5440783"/>
+            <a:ext cx="302186" cy="122333"/>
+          </a:xfrm>
+          <a:prstGeom prst="rect">
+            <a:avLst/>
+          </a:prstGeom>
+        </p:spPr>
+        <p:style>
+          <a:lnRef idx="2">
+            <a:schemeClr val="dk1"/>
+          </a:lnRef>
+          <a:fillRef idx="1">
+            <a:schemeClr val="lt1"/>
+          </a:fillRef>
+          <a:effectRef idx="0">
+            <a:schemeClr val="dk1"/>
+          </a:effectRef>
+          <a:fontRef idx="minor">
+            <a:schemeClr val="dk1"/>
+          </a:fontRef>
+        </p:style>
+        <p:txBody>
+          <a:bodyPr rtlCol="0" anchor="ctr"/>
+          <a:lstStyle/>
+          <a:p>
+            <a:pPr algn="r"/>
+            <a:endParaRPr lang="de-DE" sz="900" dirty="0"/>
+          </a:p>
+        </p:txBody>
+      </p:sp>
+      <p:sp>
+        <p:nvSpPr>
+          <p:cNvPr id="746" name="Rectangle 745">
+            <a:extLst>
+              <a:ext uri="{FF2B5EF4-FFF2-40B4-BE49-F238E27FC236}">
+                <a16:creationId xmlns:a16="http://schemas.microsoft.com/office/drawing/2014/main" id="{AD653C88-F067-4B64-A8C9-12B52B38B4E4}"/>
+              </a:ext>
+            </a:extLst>
+          </p:cNvPr>
+          <p:cNvSpPr/>
+          <p:nvPr/>
+        </p:nvSpPr>
+        <p:spPr>
+          <a:xfrm>
+            <a:off x="6317892" y="5324496"/>
+            <a:ext cx="302186" cy="116287"/>
+          </a:xfrm>
+          <a:prstGeom prst="rect">
+            <a:avLst/>
+          </a:prstGeom>
+          <a:solidFill>
+            <a:schemeClr val="bg1">
+              <a:lumMod val="85000"/>
+            </a:schemeClr>
+          </a:solidFill>
+        </p:spPr>
+        <p:style>
+          <a:lnRef idx="2">
+            <a:schemeClr val="dk1"/>
+          </a:lnRef>
+          <a:fillRef idx="1">
+            <a:schemeClr val="lt1"/>
+          </a:fillRef>
+          <a:effectRef idx="0">
+            <a:schemeClr val="dk1"/>
+          </a:effectRef>
+          <a:fontRef idx="minor">
+            <a:schemeClr val="dk1"/>
+          </a:fontRef>
+        </p:style>
+        <p:txBody>
+          <a:bodyPr rtlCol="0" anchor="ctr"/>
+          <a:lstStyle/>
+          <a:p>
+            <a:endParaRPr lang="de-DE" dirty="0"/>
+          </a:p>
+        </p:txBody>
+      </p:sp>
+      <p:sp>
+        <p:nvSpPr>
+          <p:cNvPr id="749" name="Rectangle 748">
+            <a:extLst>
+              <a:ext uri="{FF2B5EF4-FFF2-40B4-BE49-F238E27FC236}">
+                <a16:creationId xmlns:a16="http://schemas.microsoft.com/office/drawing/2014/main" id="{53D367DB-50C8-449C-840D-DF50FE1B15EC}"/>
+              </a:ext>
+            </a:extLst>
+          </p:cNvPr>
+          <p:cNvSpPr/>
+          <p:nvPr/>
+        </p:nvSpPr>
+        <p:spPr>
+          <a:xfrm>
+            <a:off x="6317893" y="5565933"/>
+            <a:ext cx="302186" cy="122333"/>
+          </a:xfrm>
+          <a:prstGeom prst="rect">
+            <a:avLst/>
+          </a:prstGeom>
+        </p:spPr>
+        <p:style>
+          <a:lnRef idx="2">
+            <a:schemeClr val="dk1"/>
+          </a:lnRef>
+          <a:fillRef idx="1">
+            <a:schemeClr val="lt1"/>
+          </a:fillRef>
+          <a:effectRef idx="0">
+            <a:schemeClr val="dk1"/>
+          </a:effectRef>
+          <a:fontRef idx="minor">
+            <a:schemeClr val="dk1"/>
+          </a:fontRef>
+        </p:style>
+        <p:txBody>
+          <a:bodyPr rtlCol="0" anchor="ctr"/>
+          <a:lstStyle/>
+          <a:p>
+            <a:pPr algn="r"/>
+            <a:endParaRPr lang="de-DE" sz="900" dirty="0"/>
+          </a:p>
+        </p:txBody>
+      </p:sp>
+      <p:sp>
+        <p:nvSpPr>
+          <p:cNvPr id="751" name="Rectangle 750">
+            <a:extLst>
+              <a:ext uri="{FF2B5EF4-FFF2-40B4-BE49-F238E27FC236}">
+                <a16:creationId xmlns:a16="http://schemas.microsoft.com/office/drawing/2014/main" id="{8099C883-BB66-4310-9F8E-8427EA8C93C1}"/>
+              </a:ext>
+            </a:extLst>
+          </p:cNvPr>
+          <p:cNvSpPr/>
+          <p:nvPr/>
+        </p:nvSpPr>
+        <p:spPr>
+          <a:xfrm>
+            <a:off x="6317893" y="5686332"/>
+            <a:ext cx="302186" cy="122333"/>
+          </a:xfrm>
+          <a:prstGeom prst="rect">
+            <a:avLst/>
+          </a:prstGeom>
+        </p:spPr>
+        <p:style>
+          <a:lnRef idx="2">
+            <a:schemeClr val="dk1"/>
+          </a:lnRef>
+          <a:fillRef idx="1">
+            <a:schemeClr val="lt1"/>
+          </a:fillRef>
+          <a:effectRef idx="0">
+            <a:schemeClr val="dk1"/>
+          </a:effectRef>
+          <a:fontRef idx="minor">
+            <a:schemeClr val="dk1"/>
+          </a:fontRef>
+        </p:style>
+        <p:txBody>
+          <a:bodyPr rtlCol="0" anchor="ctr"/>
+          <a:lstStyle/>
+          <a:p>
+            <a:pPr algn="r"/>
+            <a:endParaRPr lang="de-DE" sz="900" dirty="0"/>
+          </a:p>
+        </p:txBody>
+      </p:sp>
+      <p:sp>
+        <p:nvSpPr>
+          <p:cNvPr id="758" name="Rectangle 757">
+            <a:extLst>
+              <a:ext uri="{FF2B5EF4-FFF2-40B4-BE49-F238E27FC236}">
+                <a16:creationId xmlns:a16="http://schemas.microsoft.com/office/drawing/2014/main" id="{87E296B0-F59F-4DAC-9AE7-637CF48D0C6C}"/>
+              </a:ext>
+            </a:extLst>
+          </p:cNvPr>
+          <p:cNvSpPr/>
+          <p:nvPr/>
+        </p:nvSpPr>
+        <p:spPr>
+          <a:xfrm>
+            <a:off x="6317893" y="5805774"/>
+            <a:ext cx="302186" cy="122333"/>
+          </a:xfrm>
+          <a:prstGeom prst="rect">
+            <a:avLst/>
+          </a:prstGeom>
+        </p:spPr>
+        <p:style>
+          <a:lnRef idx="2">
+            <a:schemeClr val="dk1"/>
+          </a:lnRef>
+          <a:fillRef idx="1">
+            <a:schemeClr val="lt1"/>
+          </a:fillRef>
+          <a:effectRef idx="0">
+            <a:schemeClr val="dk1"/>
+          </a:effectRef>
+          <a:fontRef idx="minor">
+            <a:schemeClr val="dk1"/>
+          </a:fontRef>
+        </p:style>
+        <p:txBody>
+          <a:bodyPr rtlCol="0" anchor="ctr"/>
+          <a:lstStyle/>
+          <a:p>
+            <a:pPr algn="r"/>
+            <a:endParaRPr lang="de-DE" sz="900" dirty="0"/>
+          </a:p>
+        </p:txBody>
+      </p:sp>
+      <p:sp>
+        <p:nvSpPr>
+          <p:cNvPr id="763" name="Rectangle 762">
+            <a:extLst>
+              <a:ext uri="{FF2B5EF4-FFF2-40B4-BE49-F238E27FC236}">
+                <a16:creationId xmlns:a16="http://schemas.microsoft.com/office/drawing/2014/main" id="{168C46EE-7FCE-45A9-AC9A-ACBE4129DDEC}"/>
+              </a:ext>
+            </a:extLst>
+          </p:cNvPr>
+          <p:cNvSpPr/>
+          <p:nvPr/>
+        </p:nvSpPr>
+        <p:spPr>
+          <a:xfrm>
+            <a:off x="6317892" y="5924439"/>
+            <a:ext cx="302186" cy="122333"/>
+          </a:xfrm>
+          <a:prstGeom prst="rect">
+            <a:avLst/>
+          </a:prstGeom>
+        </p:spPr>
+        <p:style>
+          <a:lnRef idx="2">
+            <a:schemeClr val="dk1"/>
+          </a:lnRef>
+          <a:fillRef idx="1">
+            <a:schemeClr val="lt1"/>
+          </a:fillRef>
+          <a:effectRef idx="0">
+            <a:schemeClr val="dk1"/>
+          </a:effectRef>
+          <a:fontRef idx="minor">
+            <a:schemeClr val="dk1"/>
+          </a:fontRef>
+        </p:style>
+        <p:txBody>
+          <a:bodyPr rtlCol="0" anchor="ctr"/>
+          <a:lstStyle/>
+          <a:p>
+            <a:pPr algn="r"/>
+            <a:endParaRPr lang="de-DE" sz="900" dirty="0"/>
+          </a:p>
+        </p:txBody>
+      </p:sp>
+      <p:sp>
+        <p:nvSpPr>
+          <p:cNvPr id="820" name="Rectangle 819">
+            <a:extLst>
+              <a:ext uri="{FF2B5EF4-FFF2-40B4-BE49-F238E27FC236}">
+                <a16:creationId xmlns:a16="http://schemas.microsoft.com/office/drawing/2014/main" id="{33640063-0756-4696-B8CE-6D397D6AD5BE}"/>
+              </a:ext>
+            </a:extLst>
+          </p:cNvPr>
+          <p:cNvSpPr/>
+          <p:nvPr/>
+        </p:nvSpPr>
+        <p:spPr>
+          <a:xfrm>
+            <a:off x="6317892" y="6043881"/>
+            <a:ext cx="302186" cy="122333"/>
+          </a:xfrm>
+          <a:prstGeom prst="rect">
+            <a:avLst/>
+          </a:prstGeom>
+        </p:spPr>
+        <p:style>
+          <a:lnRef idx="2">
+            <a:schemeClr val="dk1"/>
+          </a:lnRef>
+          <a:fillRef idx="1">
+            <a:schemeClr val="lt1"/>
+          </a:fillRef>
+          <a:effectRef idx="0">
+            <a:schemeClr val="dk1"/>
+          </a:effectRef>
+          <a:fontRef idx="minor">
+            <a:schemeClr val="dk1"/>
+          </a:fontRef>
+        </p:style>
+        <p:txBody>
+          <a:bodyPr rtlCol="0" anchor="ctr"/>
+          <a:lstStyle/>
+          <a:p>
+            <a:pPr algn="r"/>
+            <a:endParaRPr lang="de-DE" sz="900" dirty="0"/>
+          </a:p>
+        </p:txBody>
+      </p:sp>
+      <p:sp>
+        <p:nvSpPr>
+          <p:cNvPr id="860" name="Rectangle 859">
+            <a:extLst>
+              <a:ext uri="{FF2B5EF4-FFF2-40B4-BE49-F238E27FC236}">
+                <a16:creationId xmlns:a16="http://schemas.microsoft.com/office/drawing/2014/main" id="{5BA980E6-2659-43B3-B3CA-DECDD5115DB5}"/>
+              </a:ext>
+            </a:extLst>
+          </p:cNvPr>
+          <p:cNvSpPr/>
+          <p:nvPr/>
+        </p:nvSpPr>
+        <p:spPr>
+          <a:xfrm>
+            <a:off x="7131772" y="5081076"/>
+            <a:ext cx="1871906" cy="216034"/>
+          </a:xfrm>
+          <a:prstGeom prst="rect">
+            <a:avLst/>
+          </a:prstGeom>
+        </p:spPr>
+        <p:style>
+          <a:lnRef idx="2">
+            <a:schemeClr val="dk1"/>
+          </a:lnRef>
+          <a:fillRef idx="1">
+            <a:schemeClr val="lt1"/>
+          </a:fillRef>
+          <a:effectRef idx="0">
+            <a:schemeClr val="dk1"/>
+          </a:effectRef>
+          <a:fontRef idx="minor">
+            <a:schemeClr val="dk1"/>
+          </a:fontRef>
+        </p:style>
+        <p:txBody>
+          <a:bodyPr rtlCol="0" anchor="ctr"/>
+          <a:lstStyle/>
+          <a:p>
+            <a:endParaRPr lang="de-DE" dirty="0"/>
+          </a:p>
+        </p:txBody>
+      </p:sp>
+      <p:sp>
+        <p:nvSpPr>
+          <p:cNvPr id="862" name="Rectangle 861">
+            <a:extLst>
+              <a:ext uri="{FF2B5EF4-FFF2-40B4-BE49-F238E27FC236}">
+                <a16:creationId xmlns:a16="http://schemas.microsoft.com/office/drawing/2014/main" id="{6D899B3B-18DC-41D3-9B8B-A0A470069650}"/>
+              </a:ext>
+            </a:extLst>
+          </p:cNvPr>
+          <p:cNvSpPr/>
+          <p:nvPr/>
+        </p:nvSpPr>
+        <p:spPr>
+          <a:xfrm>
+            <a:off x="7057824" y="5021168"/>
+            <a:ext cx="2029770" cy="1215450"/>
+          </a:xfrm>
+          <a:prstGeom prst="rect">
+            <a:avLst/>
+          </a:prstGeom>
+          <a:noFill/>
+          <a:ln>
+            <a:prstDash val="dash"/>
+          </a:ln>
+        </p:spPr>
+        <p:style>
+          <a:lnRef idx="2">
+            <a:schemeClr val="accent1">
+              <a:shade val="50000"/>
+            </a:schemeClr>
+          </a:lnRef>
+          <a:fillRef idx="1">
+            <a:schemeClr val="accent1"/>
+          </a:fillRef>
+          <a:effectRef idx="0">
+            <a:schemeClr val="accent1"/>
+          </a:effectRef>
+          <a:fontRef idx="minor">
+            <a:schemeClr val="lt1"/>
+          </a:fontRef>
+        </p:style>
+        <p:txBody>
+          <a:bodyPr rtlCol="0" anchor="ctr"/>
+          <a:lstStyle/>
+          <a:p>
+            <a:pPr algn="ctr"/>
+            <a:endParaRPr lang="de-DE"/>
+          </a:p>
+        </p:txBody>
+      </p:sp>
+      <p:sp>
+        <p:nvSpPr>
+          <p:cNvPr id="863" name="Rectangle 862">
+            <a:extLst>
+              <a:ext uri="{FF2B5EF4-FFF2-40B4-BE49-F238E27FC236}">
+                <a16:creationId xmlns:a16="http://schemas.microsoft.com/office/drawing/2014/main" id="{7EF87AAC-5644-4930-A3D8-D5FB4C6D5888}"/>
+              </a:ext>
+            </a:extLst>
+          </p:cNvPr>
+          <p:cNvSpPr/>
+          <p:nvPr/>
+        </p:nvSpPr>
+        <p:spPr>
+          <a:xfrm>
+            <a:off x="8670630" y="5133058"/>
+            <a:ext cx="246961" cy="102100"/>
+          </a:xfrm>
+          <a:prstGeom prst="rect">
+            <a:avLst/>
+          </a:prstGeom>
+          <a:solidFill>
+            <a:schemeClr val="bg1">
+              <a:lumMod val="85000"/>
+            </a:schemeClr>
+          </a:solidFill>
+        </p:spPr>
+        <p:style>
+          <a:lnRef idx="2">
+            <a:schemeClr val="dk1"/>
+          </a:lnRef>
+          <a:fillRef idx="1">
+            <a:schemeClr val="lt1"/>
+          </a:fillRef>
+          <a:effectRef idx="0">
+            <a:schemeClr val="dk1"/>
+          </a:effectRef>
+          <a:fontRef idx="minor">
+            <a:schemeClr val="dk1"/>
+          </a:fontRef>
+        </p:style>
+        <p:txBody>
+          <a:bodyPr rtlCol="0" anchor="ctr"/>
+          <a:lstStyle/>
+          <a:p>
+            <a:pPr algn="ctr"/>
+            <a:endParaRPr lang="de-DE"/>
+          </a:p>
+        </p:txBody>
+      </p:sp>
+      <p:sp>
+        <p:nvSpPr>
+          <p:cNvPr id="864" name="Rectangle 863">
+            <a:extLst>
+              <a:ext uri="{FF2B5EF4-FFF2-40B4-BE49-F238E27FC236}">
+                <a16:creationId xmlns:a16="http://schemas.microsoft.com/office/drawing/2014/main" id="{BB224D35-FDB4-4CEE-8712-0F50BEA83EDB}"/>
+              </a:ext>
+            </a:extLst>
+          </p:cNvPr>
+          <p:cNvSpPr/>
+          <p:nvPr/>
+        </p:nvSpPr>
+        <p:spPr>
+          <a:xfrm>
+            <a:off x="7131771" y="5440783"/>
+            <a:ext cx="406237" cy="249217"/>
+          </a:xfrm>
+          <a:prstGeom prst="rect">
+            <a:avLst/>
+          </a:prstGeom>
+        </p:spPr>
+        <p:style>
+          <a:lnRef idx="2">
+            <a:schemeClr val="dk1"/>
+          </a:lnRef>
+          <a:fillRef idx="1">
+            <a:schemeClr val="lt1"/>
+          </a:fillRef>
+          <a:effectRef idx="0">
+            <a:schemeClr val="dk1"/>
+          </a:effectRef>
+          <a:fontRef idx="minor">
+            <a:schemeClr val="dk1"/>
+          </a:fontRef>
+        </p:style>
+        <p:txBody>
+          <a:bodyPr rtlCol="0" anchor="ctr"/>
+          <a:lstStyle/>
+          <a:p>
+            <a:endParaRPr lang="de-DE" dirty="0"/>
+          </a:p>
+        </p:txBody>
+      </p:sp>
+      <p:sp>
+        <p:nvSpPr>
+          <p:cNvPr id="865" name="Rectangle 864">
+            <a:extLst>
+              <a:ext uri="{FF2B5EF4-FFF2-40B4-BE49-F238E27FC236}">
+                <a16:creationId xmlns:a16="http://schemas.microsoft.com/office/drawing/2014/main" id="{402DA7B9-53B9-4DE8-B4F1-98ED9FC46D53}"/>
+              </a:ext>
+            </a:extLst>
+          </p:cNvPr>
+          <p:cNvSpPr/>
+          <p:nvPr/>
+        </p:nvSpPr>
+        <p:spPr>
+          <a:xfrm>
+            <a:off x="7538008" y="5440783"/>
+            <a:ext cx="406237" cy="122333"/>
+          </a:xfrm>
+          <a:prstGeom prst="rect">
+            <a:avLst/>
+          </a:prstGeom>
+          <a:solidFill>
+            <a:schemeClr val="bg1">
+              <a:lumMod val="85000"/>
+            </a:schemeClr>
+          </a:solidFill>
+        </p:spPr>
+        <p:style>
+          <a:lnRef idx="2">
+            <a:schemeClr val="dk1"/>
+          </a:lnRef>
+          <a:fillRef idx="1">
+            <a:schemeClr val="lt1"/>
+          </a:fillRef>
+          <a:effectRef idx="0">
+            <a:schemeClr val="dk1"/>
+          </a:effectRef>
+          <a:fontRef idx="minor">
+            <a:schemeClr val="dk1"/>
+          </a:fontRef>
+        </p:style>
+        <p:txBody>
+          <a:bodyPr rtlCol="0" anchor="ctr"/>
+          <a:lstStyle/>
+          <a:p>
+            <a:endParaRPr lang="de-DE" dirty="0"/>
+          </a:p>
+        </p:txBody>
+      </p:sp>
+      <p:sp>
+        <p:nvSpPr>
+          <p:cNvPr id="866" name="Rectangle 865">
+            <a:extLst>
+              <a:ext uri="{FF2B5EF4-FFF2-40B4-BE49-F238E27FC236}">
+                <a16:creationId xmlns:a16="http://schemas.microsoft.com/office/drawing/2014/main" id="{486C2104-546E-48D0-96DF-FBD4D821B326}"/>
+              </a:ext>
+            </a:extLst>
+          </p:cNvPr>
+          <p:cNvSpPr/>
+          <p:nvPr/>
+        </p:nvSpPr>
+        <p:spPr>
+          <a:xfrm>
+            <a:off x="7944245" y="5440783"/>
+            <a:ext cx="302186" cy="122333"/>
+          </a:xfrm>
+          <a:prstGeom prst="rect">
+            <a:avLst/>
+          </a:prstGeom>
+        </p:spPr>
+        <p:style>
+          <a:lnRef idx="2">
+            <a:schemeClr val="dk1"/>
+          </a:lnRef>
+          <a:fillRef idx="1">
+            <a:schemeClr val="lt1"/>
+          </a:fillRef>
+          <a:effectRef idx="0">
+            <a:schemeClr val="dk1"/>
+          </a:effectRef>
+          <a:fontRef idx="minor">
+            <a:schemeClr val="dk1"/>
+          </a:fontRef>
+        </p:style>
+        <p:txBody>
+          <a:bodyPr rtlCol="0" anchor="ctr"/>
+          <a:lstStyle/>
+          <a:p>
+            <a:pPr algn="r"/>
+            <a:endParaRPr lang="de-DE" sz="900" dirty="0"/>
+          </a:p>
+        </p:txBody>
+      </p:sp>
+      <p:sp>
+        <p:nvSpPr>
+          <p:cNvPr id="867" name="Rectangle 866">
+            <a:extLst>
+              <a:ext uri="{FF2B5EF4-FFF2-40B4-BE49-F238E27FC236}">
+                <a16:creationId xmlns:a16="http://schemas.microsoft.com/office/drawing/2014/main" id="{B5C2D850-427C-4DAB-AEED-CAE3B54D15B8}"/>
+              </a:ext>
+            </a:extLst>
+          </p:cNvPr>
+          <p:cNvSpPr/>
+          <p:nvPr/>
+        </p:nvSpPr>
+        <p:spPr>
+          <a:xfrm>
+            <a:off x="8846880" y="5440783"/>
+            <a:ext cx="156797" cy="122333"/>
+          </a:xfrm>
+          <a:prstGeom prst="rect">
+            <a:avLst/>
+          </a:prstGeom>
+          <a:solidFill>
+            <a:schemeClr val="bg1">
+              <a:lumMod val="85000"/>
+            </a:schemeClr>
+          </a:solidFill>
+        </p:spPr>
+        <p:style>
+          <a:lnRef idx="2">
+            <a:schemeClr val="dk1"/>
+          </a:lnRef>
+          <a:fillRef idx="1">
+            <a:schemeClr val="lt1"/>
+          </a:fillRef>
+          <a:effectRef idx="0">
+            <a:schemeClr val="dk1"/>
+          </a:effectRef>
+          <a:fontRef idx="minor">
+            <a:schemeClr val="dk1"/>
+          </a:fontRef>
+        </p:style>
+        <p:txBody>
+          <a:bodyPr rtlCol="0" anchor="ctr"/>
+          <a:lstStyle/>
+          <a:p>
+            <a:pPr algn="ctr"/>
+            <a:r>
+              <a:rPr lang="el-GR" sz="900" dirty="0"/>
+              <a:t>Σ</a:t>
+            </a:r>
+            <a:endParaRPr lang="de-DE" sz="900" dirty="0"/>
+          </a:p>
+        </p:txBody>
+      </p:sp>
+      <p:sp>
+        <p:nvSpPr>
+          <p:cNvPr id="868" name="Rectangle 867">
+            <a:extLst>
+              <a:ext uri="{FF2B5EF4-FFF2-40B4-BE49-F238E27FC236}">
+                <a16:creationId xmlns:a16="http://schemas.microsoft.com/office/drawing/2014/main" id="{7CA3265B-A150-4414-A093-41B8A3890435}"/>
+              </a:ext>
+            </a:extLst>
+          </p:cNvPr>
+          <p:cNvSpPr/>
+          <p:nvPr/>
+        </p:nvSpPr>
+        <p:spPr>
+          <a:xfrm>
+            <a:off x="7131771" y="5324496"/>
+            <a:ext cx="406237" cy="116287"/>
+          </a:xfrm>
+          <a:prstGeom prst="rect">
+            <a:avLst/>
+          </a:prstGeom>
+          <a:solidFill>
+            <a:schemeClr val="bg1">
+              <a:lumMod val="85000"/>
+            </a:schemeClr>
+          </a:solidFill>
+        </p:spPr>
+        <p:style>
+          <a:lnRef idx="2">
+            <a:schemeClr val="dk1"/>
+          </a:lnRef>
+          <a:fillRef idx="1">
+            <a:schemeClr val="lt1"/>
+          </a:fillRef>
+          <a:effectRef idx="0">
+            <a:schemeClr val="dk1"/>
+          </a:effectRef>
+          <a:fontRef idx="minor">
+            <a:schemeClr val="dk1"/>
+          </a:fontRef>
+        </p:style>
+        <p:txBody>
+          <a:bodyPr rtlCol="0" anchor="ctr"/>
+          <a:lstStyle/>
+          <a:p>
+            <a:endParaRPr lang="de-DE" dirty="0"/>
+          </a:p>
+        </p:txBody>
+      </p:sp>
+      <p:sp>
+        <p:nvSpPr>
+          <p:cNvPr id="869" name="Rectangle 868">
+            <a:extLst>
+              <a:ext uri="{FF2B5EF4-FFF2-40B4-BE49-F238E27FC236}">
+                <a16:creationId xmlns:a16="http://schemas.microsoft.com/office/drawing/2014/main" id="{EA1690AC-F5FB-41D0-9F93-0E1A9AD0ABCA}"/>
+              </a:ext>
+            </a:extLst>
+          </p:cNvPr>
+          <p:cNvSpPr/>
+          <p:nvPr/>
+        </p:nvSpPr>
+        <p:spPr>
+          <a:xfrm>
+            <a:off x="7538007" y="5324496"/>
+            <a:ext cx="406237" cy="116287"/>
+          </a:xfrm>
+          <a:prstGeom prst="rect">
+            <a:avLst/>
+          </a:prstGeom>
+          <a:solidFill>
+            <a:schemeClr val="bg1">
+              <a:lumMod val="85000"/>
+            </a:schemeClr>
+          </a:solidFill>
+        </p:spPr>
+        <p:style>
+          <a:lnRef idx="2">
+            <a:schemeClr val="dk1"/>
+          </a:lnRef>
+          <a:fillRef idx="1">
+            <a:schemeClr val="lt1"/>
+          </a:fillRef>
+          <a:effectRef idx="0">
+            <a:schemeClr val="dk1"/>
+          </a:effectRef>
+          <a:fontRef idx="minor">
+            <a:schemeClr val="dk1"/>
+          </a:fontRef>
+        </p:style>
+        <p:txBody>
+          <a:bodyPr rtlCol="0" anchor="ctr"/>
+          <a:lstStyle/>
+          <a:p>
+            <a:endParaRPr lang="de-DE" dirty="0"/>
+          </a:p>
+        </p:txBody>
+      </p:sp>
+      <p:sp>
+        <p:nvSpPr>
+          <p:cNvPr id="870" name="Rectangle 869">
+            <a:extLst>
+              <a:ext uri="{FF2B5EF4-FFF2-40B4-BE49-F238E27FC236}">
+                <a16:creationId xmlns:a16="http://schemas.microsoft.com/office/drawing/2014/main" id="{744C3BF9-7CB2-44CE-9736-655D8FF702D2}"/>
+              </a:ext>
+            </a:extLst>
+          </p:cNvPr>
+          <p:cNvSpPr/>
+          <p:nvPr/>
+        </p:nvSpPr>
+        <p:spPr>
+          <a:xfrm>
+            <a:off x="7944244" y="5324496"/>
+            <a:ext cx="302186" cy="116287"/>
+          </a:xfrm>
+          <a:prstGeom prst="rect">
+            <a:avLst/>
+          </a:prstGeom>
+          <a:solidFill>
+            <a:schemeClr val="bg1">
+              <a:lumMod val="85000"/>
+            </a:schemeClr>
+          </a:solidFill>
+        </p:spPr>
+        <p:style>
+          <a:lnRef idx="2">
+            <a:schemeClr val="dk1"/>
+          </a:lnRef>
+          <a:fillRef idx="1">
+            <a:schemeClr val="lt1"/>
+          </a:fillRef>
+          <a:effectRef idx="0">
+            <a:schemeClr val="dk1"/>
+          </a:effectRef>
+          <a:fontRef idx="minor">
+            <a:schemeClr val="dk1"/>
+          </a:fontRef>
+        </p:style>
+        <p:txBody>
+          <a:bodyPr rtlCol="0" anchor="ctr"/>
+          <a:lstStyle/>
+          <a:p>
+            <a:endParaRPr lang="de-DE" dirty="0"/>
+          </a:p>
+        </p:txBody>
+      </p:sp>
+      <p:sp>
+        <p:nvSpPr>
+          <p:cNvPr id="871" name="Rectangle 870">
+            <a:extLst>
+              <a:ext uri="{FF2B5EF4-FFF2-40B4-BE49-F238E27FC236}">
+                <a16:creationId xmlns:a16="http://schemas.microsoft.com/office/drawing/2014/main" id="{803CAEDB-76D9-427B-89F8-0CB257EBDA5D}"/>
+              </a:ext>
+            </a:extLst>
+          </p:cNvPr>
+          <p:cNvSpPr/>
+          <p:nvPr/>
+        </p:nvSpPr>
+        <p:spPr>
+          <a:xfrm>
+            <a:off x="8756716" y="5324497"/>
+            <a:ext cx="246962" cy="116286"/>
+          </a:xfrm>
+          <a:prstGeom prst="rect">
+            <a:avLst/>
+          </a:prstGeom>
+          <a:solidFill>
+            <a:schemeClr val="bg1">
+              <a:lumMod val="85000"/>
+            </a:schemeClr>
+          </a:solidFill>
+        </p:spPr>
+        <p:style>
+          <a:lnRef idx="2">
+            <a:schemeClr val="dk1"/>
+          </a:lnRef>
+          <a:fillRef idx="1">
+            <a:schemeClr val="lt1"/>
+          </a:fillRef>
+          <a:effectRef idx="0">
+            <a:schemeClr val="dk1"/>
+          </a:effectRef>
+          <a:fontRef idx="minor">
+            <a:schemeClr val="dk1"/>
+          </a:fontRef>
+        </p:style>
+        <p:txBody>
+          <a:bodyPr rtlCol="0" anchor="ctr"/>
+          <a:lstStyle/>
+          <a:p>
+            <a:endParaRPr lang="de-DE" dirty="0"/>
+          </a:p>
+        </p:txBody>
+      </p:sp>
+      <p:sp>
+        <p:nvSpPr>
+          <p:cNvPr id="872" name="Rectangle 871">
+            <a:extLst>
+              <a:ext uri="{FF2B5EF4-FFF2-40B4-BE49-F238E27FC236}">
+                <a16:creationId xmlns:a16="http://schemas.microsoft.com/office/drawing/2014/main" id="{632887AE-6671-47B7-AD67-F86A22793F2C}"/>
+              </a:ext>
+            </a:extLst>
+          </p:cNvPr>
+          <p:cNvSpPr/>
+          <p:nvPr/>
+        </p:nvSpPr>
+        <p:spPr>
+          <a:xfrm>
+            <a:off x="7538008" y="5565933"/>
+            <a:ext cx="406237" cy="122333"/>
+          </a:xfrm>
+          <a:prstGeom prst="rect">
+            <a:avLst/>
+          </a:prstGeom>
+          <a:solidFill>
+            <a:schemeClr val="bg1">
+              <a:lumMod val="85000"/>
+            </a:schemeClr>
+          </a:solidFill>
+        </p:spPr>
+        <p:style>
+          <a:lnRef idx="2">
+            <a:schemeClr val="dk1"/>
+          </a:lnRef>
+          <a:fillRef idx="1">
+            <a:schemeClr val="lt1"/>
+          </a:fillRef>
+          <a:effectRef idx="0">
+            <a:schemeClr val="dk1"/>
+          </a:effectRef>
+          <a:fontRef idx="minor">
+            <a:schemeClr val="dk1"/>
+          </a:fontRef>
+        </p:style>
+        <p:txBody>
+          <a:bodyPr rtlCol="0" anchor="ctr"/>
+          <a:lstStyle/>
+          <a:p>
+            <a:endParaRPr lang="de-DE" dirty="0"/>
+          </a:p>
+        </p:txBody>
+      </p:sp>
+      <p:sp>
+        <p:nvSpPr>
+          <p:cNvPr id="873" name="Rectangle 872">
+            <a:extLst>
+              <a:ext uri="{FF2B5EF4-FFF2-40B4-BE49-F238E27FC236}">
+                <a16:creationId xmlns:a16="http://schemas.microsoft.com/office/drawing/2014/main" id="{74490DAE-DF9D-4D6D-9E46-4D627C1B876E}"/>
+              </a:ext>
+            </a:extLst>
+          </p:cNvPr>
+          <p:cNvSpPr/>
+          <p:nvPr/>
+        </p:nvSpPr>
+        <p:spPr>
+          <a:xfrm>
+            <a:off x="7944245" y="5565933"/>
+            <a:ext cx="302186" cy="122333"/>
+          </a:xfrm>
+          <a:prstGeom prst="rect">
+            <a:avLst/>
+          </a:prstGeom>
+        </p:spPr>
+        <p:style>
+          <a:lnRef idx="2">
+            <a:schemeClr val="dk1"/>
+          </a:lnRef>
+          <a:fillRef idx="1">
+            <a:schemeClr val="lt1"/>
+          </a:fillRef>
+          <a:effectRef idx="0">
+            <a:schemeClr val="dk1"/>
+          </a:effectRef>
+          <a:fontRef idx="minor">
+            <a:schemeClr val="dk1"/>
+          </a:fontRef>
+        </p:style>
+        <p:txBody>
+          <a:bodyPr rtlCol="0" anchor="ctr"/>
+          <a:lstStyle/>
+          <a:p>
+            <a:pPr algn="r"/>
+            <a:endParaRPr lang="de-DE" sz="900" dirty="0"/>
+          </a:p>
+        </p:txBody>
+      </p:sp>
+      <p:sp>
+        <p:nvSpPr>
+          <p:cNvPr id="874" name="Rectangle 873">
+            <a:extLst>
+              <a:ext uri="{FF2B5EF4-FFF2-40B4-BE49-F238E27FC236}">
+                <a16:creationId xmlns:a16="http://schemas.microsoft.com/office/drawing/2014/main" id="{41629949-F180-4FC5-BD13-D145306FB77A}"/>
+              </a:ext>
+            </a:extLst>
+          </p:cNvPr>
+          <p:cNvSpPr/>
+          <p:nvPr/>
+        </p:nvSpPr>
+        <p:spPr>
+          <a:xfrm>
+            <a:off x="8846880" y="5565933"/>
+            <a:ext cx="156797" cy="122333"/>
+          </a:xfrm>
+          <a:prstGeom prst="rect">
+            <a:avLst/>
+          </a:prstGeom>
+          <a:solidFill>
+            <a:schemeClr val="bg1">
+              <a:lumMod val="85000"/>
+            </a:schemeClr>
+          </a:solidFill>
+        </p:spPr>
+        <p:style>
+          <a:lnRef idx="2">
+            <a:schemeClr val="dk1"/>
+          </a:lnRef>
+          <a:fillRef idx="1">
+            <a:schemeClr val="lt1"/>
+          </a:fillRef>
+          <a:effectRef idx="0">
+            <a:schemeClr val="dk1"/>
+          </a:effectRef>
+          <a:fontRef idx="minor">
+            <a:schemeClr val="dk1"/>
+          </a:fontRef>
+        </p:style>
+        <p:txBody>
+          <a:bodyPr rtlCol="0" anchor="ctr"/>
+          <a:lstStyle/>
+          <a:p>
+            <a:pPr algn="ctr"/>
+            <a:r>
+              <a:rPr lang="el-GR" sz="900"/>
+              <a:t>Σ</a:t>
+            </a:r>
+            <a:endParaRPr lang="de-DE" sz="900" dirty="0"/>
+          </a:p>
+        </p:txBody>
+      </p:sp>
+      <p:sp>
+        <p:nvSpPr>
+          <p:cNvPr id="875" name="Rectangle 874">
+            <a:extLst>
+              <a:ext uri="{FF2B5EF4-FFF2-40B4-BE49-F238E27FC236}">
+                <a16:creationId xmlns:a16="http://schemas.microsoft.com/office/drawing/2014/main" id="{DFC82BBB-484E-4FC7-9D1E-1C08519AB895}"/>
+              </a:ext>
+            </a:extLst>
+          </p:cNvPr>
+          <p:cNvSpPr/>
+          <p:nvPr/>
+        </p:nvSpPr>
+        <p:spPr>
+          <a:xfrm>
+            <a:off x="7131771" y="5686332"/>
+            <a:ext cx="406237" cy="250392"/>
+          </a:xfrm>
+          <a:prstGeom prst="rect">
+            <a:avLst/>
+          </a:prstGeom>
+        </p:spPr>
+        <p:style>
+          <a:lnRef idx="2">
+            <a:schemeClr val="dk1"/>
+          </a:lnRef>
+          <a:fillRef idx="1">
+            <a:schemeClr val="lt1"/>
+          </a:fillRef>
+          <a:effectRef idx="0">
+            <a:schemeClr val="dk1"/>
+          </a:effectRef>
+          <a:fontRef idx="minor">
+            <a:schemeClr val="dk1"/>
+          </a:fontRef>
+        </p:style>
+        <p:txBody>
+          <a:bodyPr rtlCol="0" anchor="ctr"/>
+          <a:lstStyle/>
+          <a:p>
+            <a:endParaRPr lang="de-DE" dirty="0"/>
+          </a:p>
+        </p:txBody>
+      </p:sp>
+      <p:sp>
+        <p:nvSpPr>
+          <p:cNvPr id="876" name="Rectangle 875">
+            <a:extLst>
+              <a:ext uri="{FF2B5EF4-FFF2-40B4-BE49-F238E27FC236}">
+                <a16:creationId xmlns:a16="http://schemas.microsoft.com/office/drawing/2014/main" id="{7F4B218E-4792-45F5-91A9-0BAD72093701}"/>
+              </a:ext>
+            </a:extLst>
+          </p:cNvPr>
+          <p:cNvSpPr/>
+          <p:nvPr/>
+        </p:nvSpPr>
+        <p:spPr>
+          <a:xfrm>
+            <a:off x="7538008" y="5686332"/>
+            <a:ext cx="406237" cy="122333"/>
+          </a:xfrm>
+          <a:prstGeom prst="rect">
+            <a:avLst/>
+          </a:prstGeom>
+          <a:solidFill>
+            <a:schemeClr val="bg1">
+              <a:lumMod val="85000"/>
+            </a:schemeClr>
+          </a:solidFill>
+        </p:spPr>
+        <p:style>
+          <a:lnRef idx="2">
+            <a:schemeClr val="dk1"/>
+          </a:lnRef>
+          <a:fillRef idx="1">
+            <a:schemeClr val="lt1"/>
+          </a:fillRef>
+          <a:effectRef idx="0">
+            <a:schemeClr val="dk1"/>
+          </a:effectRef>
+          <a:fontRef idx="minor">
+            <a:schemeClr val="dk1"/>
+          </a:fontRef>
+        </p:style>
+        <p:txBody>
+          <a:bodyPr rtlCol="0" anchor="ctr"/>
+          <a:lstStyle/>
+          <a:p>
+            <a:endParaRPr lang="de-DE" dirty="0"/>
+          </a:p>
+        </p:txBody>
+      </p:sp>
+      <p:sp>
+        <p:nvSpPr>
+          <p:cNvPr id="877" name="Rectangle 876">
+            <a:extLst>
+              <a:ext uri="{FF2B5EF4-FFF2-40B4-BE49-F238E27FC236}">
+                <a16:creationId xmlns:a16="http://schemas.microsoft.com/office/drawing/2014/main" id="{B4EAC900-3381-4D0D-9EDE-FA0DB16AD633}"/>
+              </a:ext>
+            </a:extLst>
+          </p:cNvPr>
+          <p:cNvSpPr/>
+          <p:nvPr/>
+        </p:nvSpPr>
+        <p:spPr>
+          <a:xfrm>
+            <a:off x="7944245" y="5686332"/>
+            <a:ext cx="302186" cy="122333"/>
+          </a:xfrm>
+          <a:prstGeom prst="rect">
+            <a:avLst/>
+          </a:prstGeom>
+        </p:spPr>
+        <p:style>
+          <a:lnRef idx="2">
+            <a:schemeClr val="dk1"/>
+          </a:lnRef>
+          <a:fillRef idx="1">
+            <a:schemeClr val="lt1"/>
+          </a:fillRef>
+          <a:effectRef idx="0">
+            <a:schemeClr val="dk1"/>
+          </a:effectRef>
+          <a:fontRef idx="minor">
+            <a:schemeClr val="dk1"/>
+          </a:fontRef>
+        </p:style>
+        <p:txBody>
+          <a:bodyPr rtlCol="0" anchor="ctr"/>
+          <a:lstStyle/>
+          <a:p>
+            <a:pPr algn="r"/>
+            <a:endParaRPr lang="de-DE" sz="900" dirty="0"/>
+          </a:p>
+        </p:txBody>
+      </p:sp>
+      <p:sp>
+        <p:nvSpPr>
+          <p:cNvPr id="878" name="Rectangle 877">
+            <a:extLst>
+              <a:ext uri="{FF2B5EF4-FFF2-40B4-BE49-F238E27FC236}">
+                <a16:creationId xmlns:a16="http://schemas.microsoft.com/office/drawing/2014/main" id="{7B84D6D8-1975-4971-BF36-4A37D223FF92}"/>
+              </a:ext>
+            </a:extLst>
+          </p:cNvPr>
+          <p:cNvSpPr/>
+          <p:nvPr/>
+        </p:nvSpPr>
+        <p:spPr>
+          <a:xfrm>
+            <a:off x="8846880" y="5686332"/>
+            <a:ext cx="156797" cy="122333"/>
+          </a:xfrm>
+          <a:prstGeom prst="rect">
+            <a:avLst/>
+          </a:prstGeom>
+          <a:solidFill>
+            <a:schemeClr val="bg1">
+              <a:lumMod val="85000"/>
+            </a:schemeClr>
+          </a:solidFill>
+        </p:spPr>
+        <p:style>
+          <a:lnRef idx="2">
+            <a:schemeClr val="dk1"/>
+          </a:lnRef>
+          <a:fillRef idx="1">
+            <a:schemeClr val="lt1"/>
+          </a:fillRef>
+          <a:effectRef idx="0">
+            <a:schemeClr val="dk1"/>
+          </a:effectRef>
+          <a:fontRef idx="minor">
+            <a:schemeClr val="dk1"/>
+          </a:fontRef>
+        </p:style>
+        <p:txBody>
+          <a:bodyPr rtlCol="0" anchor="ctr"/>
+          <a:lstStyle/>
+          <a:p>
+            <a:pPr algn="ctr"/>
+            <a:r>
+              <a:rPr lang="el-GR" sz="900"/>
+              <a:t>Σ</a:t>
+            </a:r>
+            <a:endParaRPr lang="de-DE" sz="900" dirty="0"/>
+          </a:p>
+        </p:txBody>
+      </p:sp>
+      <p:sp>
+        <p:nvSpPr>
+          <p:cNvPr id="879" name="Rectangle 878">
+            <a:extLst>
+              <a:ext uri="{FF2B5EF4-FFF2-40B4-BE49-F238E27FC236}">
+                <a16:creationId xmlns:a16="http://schemas.microsoft.com/office/drawing/2014/main" id="{B1189FB1-A384-46B1-A4A4-2F9149B41CEB}"/>
+              </a:ext>
+            </a:extLst>
+          </p:cNvPr>
+          <p:cNvSpPr/>
+          <p:nvPr/>
+        </p:nvSpPr>
+        <p:spPr>
+          <a:xfrm>
+            <a:off x="7538008" y="5805774"/>
+            <a:ext cx="406237" cy="122333"/>
+          </a:xfrm>
+          <a:prstGeom prst="rect">
+            <a:avLst/>
+          </a:prstGeom>
+          <a:solidFill>
+            <a:schemeClr val="bg1">
+              <a:lumMod val="85000"/>
+            </a:schemeClr>
+          </a:solidFill>
+        </p:spPr>
+        <p:style>
+          <a:lnRef idx="2">
+            <a:schemeClr val="dk1"/>
+          </a:lnRef>
+          <a:fillRef idx="1">
+            <a:schemeClr val="lt1"/>
+          </a:fillRef>
+          <a:effectRef idx="0">
+            <a:schemeClr val="dk1"/>
+          </a:effectRef>
+          <a:fontRef idx="minor">
+            <a:schemeClr val="dk1"/>
+          </a:fontRef>
+        </p:style>
+        <p:txBody>
+          <a:bodyPr rtlCol="0" anchor="ctr"/>
+          <a:lstStyle/>
+          <a:p>
+            <a:endParaRPr lang="de-DE" dirty="0"/>
+          </a:p>
+        </p:txBody>
+      </p:sp>
+      <p:sp>
+        <p:nvSpPr>
+          <p:cNvPr id="880" name="Rectangle 879">
+            <a:extLst>
+              <a:ext uri="{FF2B5EF4-FFF2-40B4-BE49-F238E27FC236}">
+                <a16:creationId xmlns:a16="http://schemas.microsoft.com/office/drawing/2014/main" id="{7B2B62A2-6584-4736-AB6F-40E2F4022DA1}"/>
+              </a:ext>
+            </a:extLst>
+          </p:cNvPr>
+          <p:cNvSpPr/>
+          <p:nvPr/>
+        </p:nvSpPr>
+        <p:spPr>
+          <a:xfrm>
+            <a:off x="7944245" y="5805774"/>
+            <a:ext cx="302186" cy="122333"/>
+          </a:xfrm>
+          <a:prstGeom prst="rect">
+            <a:avLst/>
+          </a:prstGeom>
+        </p:spPr>
+        <p:style>
+          <a:lnRef idx="2">
+            <a:schemeClr val="dk1"/>
+          </a:lnRef>
+          <a:fillRef idx="1">
+            <a:schemeClr val="lt1"/>
+          </a:fillRef>
+          <a:effectRef idx="0">
+            <a:schemeClr val="dk1"/>
+          </a:effectRef>
+          <a:fontRef idx="minor">
+            <a:schemeClr val="dk1"/>
+          </a:fontRef>
+        </p:style>
+        <p:txBody>
+          <a:bodyPr rtlCol="0" anchor="ctr"/>
+          <a:lstStyle/>
+          <a:p>
+            <a:pPr algn="r"/>
+            <a:endParaRPr lang="de-DE" sz="900" dirty="0"/>
+          </a:p>
+        </p:txBody>
+      </p:sp>
+      <p:sp>
+        <p:nvSpPr>
+          <p:cNvPr id="881" name="Rectangle 880">
+            <a:extLst>
+              <a:ext uri="{FF2B5EF4-FFF2-40B4-BE49-F238E27FC236}">
+                <a16:creationId xmlns:a16="http://schemas.microsoft.com/office/drawing/2014/main" id="{7EC45381-122E-456F-A2E9-1C46556D8574}"/>
+              </a:ext>
+            </a:extLst>
+          </p:cNvPr>
+          <p:cNvSpPr/>
+          <p:nvPr/>
+        </p:nvSpPr>
+        <p:spPr>
+          <a:xfrm>
+            <a:off x="8846880" y="5805774"/>
+            <a:ext cx="156797" cy="122333"/>
+          </a:xfrm>
+          <a:prstGeom prst="rect">
+            <a:avLst/>
+          </a:prstGeom>
+          <a:solidFill>
+            <a:schemeClr val="bg1">
+              <a:lumMod val="85000"/>
+            </a:schemeClr>
+          </a:solidFill>
+        </p:spPr>
+        <p:style>
+          <a:lnRef idx="2">
+            <a:schemeClr val="dk1"/>
+          </a:lnRef>
+          <a:fillRef idx="1">
+            <a:schemeClr val="lt1"/>
+          </a:fillRef>
+          <a:effectRef idx="0">
+            <a:schemeClr val="dk1"/>
+          </a:effectRef>
+          <a:fontRef idx="minor">
+            <a:schemeClr val="dk1"/>
+          </a:fontRef>
+        </p:style>
+        <p:txBody>
+          <a:bodyPr rtlCol="0" anchor="ctr"/>
+          <a:lstStyle/>
+          <a:p>
+            <a:pPr algn="ctr"/>
+            <a:r>
+              <a:rPr lang="el-GR" sz="900"/>
+              <a:t>Σ</a:t>
+            </a:r>
+            <a:endParaRPr lang="de-DE" sz="900" dirty="0"/>
+          </a:p>
+        </p:txBody>
+      </p:sp>
+      <p:sp>
+        <p:nvSpPr>
+          <p:cNvPr id="882" name="Rectangle 881">
+            <a:extLst>
+              <a:ext uri="{FF2B5EF4-FFF2-40B4-BE49-F238E27FC236}">
+                <a16:creationId xmlns:a16="http://schemas.microsoft.com/office/drawing/2014/main" id="{931E9459-9662-4AC4-92C6-E0658DE4EC05}"/>
+              </a:ext>
+            </a:extLst>
+          </p:cNvPr>
+          <p:cNvSpPr/>
+          <p:nvPr/>
+        </p:nvSpPr>
+        <p:spPr>
+          <a:xfrm>
+            <a:off x="7131770" y="5924438"/>
+            <a:ext cx="406237" cy="241775"/>
+          </a:xfrm>
+          <a:prstGeom prst="rect">
+            <a:avLst/>
+          </a:prstGeom>
+        </p:spPr>
+        <p:style>
+          <a:lnRef idx="2">
+            <a:schemeClr val="dk1"/>
+          </a:lnRef>
+          <a:fillRef idx="1">
+            <a:schemeClr val="lt1"/>
+          </a:fillRef>
+          <a:effectRef idx="0">
+            <a:schemeClr val="dk1"/>
+          </a:effectRef>
+          <a:fontRef idx="minor">
+            <a:schemeClr val="dk1"/>
+          </a:fontRef>
+        </p:style>
+        <p:txBody>
+          <a:bodyPr rtlCol="0" anchor="ctr"/>
+          <a:lstStyle/>
+          <a:p>
+            <a:endParaRPr lang="de-DE" dirty="0"/>
+          </a:p>
+        </p:txBody>
+      </p:sp>
+      <p:sp>
+        <p:nvSpPr>
+          <p:cNvPr id="883" name="Rectangle 882">
+            <a:extLst>
+              <a:ext uri="{FF2B5EF4-FFF2-40B4-BE49-F238E27FC236}">
+                <a16:creationId xmlns:a16="http://schemas.microsoft.com/office/drawing/2014/main" id="{165D22D3-AB16-47C8-8B4E-30443BDBF014}"/>
+              </a:ext>
+            </a:extLst>
+          </p:cNvPr>
+          <p:cNvSpPr/>
+          <p:nvPr/>
+        </p:nvSpPr>
+        <p:spPr>
+          <a:xfrm>
+            <a:off x="7538007" y="5924439"/>
+            <a:ext cx="406237" cy="122333"/>
+          </a:xfrm>
+          <a:prstGeom prst="rect">
+            <a:avLst/>
+          </a:prstGeom>
+          <a:solidFill>
+            <a:schemeClr val="bg1">
+              <a:lumMod val="85000"/>
+            </a:schemeClr>
+          </a:solidFill>
+        </p:spPr>
+        <p:style>
+          <a:lnRef idx="2">
+            <a:schemeClr val="dk1"/>
+          </a:lnRef>
+          <a:fillRef idx="1">
+            <a:schemeClr val="lt1"/>
+          </a:fillRef>
+          <a:effectRef idx="0">
+            <a:schemeClr val="dk1"/>
+          </a:effectRef>
+          <a:fontRef idx="minor">
+            <a:schemeClr val="dk1"/>
+          </a:fontRef>
+        </p:style>
+        <p:txBody>
+          <a:bodyPr rtlCol="0" anchor="ctr"/>
+          <a:lstStyle/>
+          <a:p>
+            <a:endParaRPr lang="de-DE" dirty="0"/>
+          </a:p>
+        </p:txBody>
+      </p:sp>
+      <p:sp>
+        <p:nvSpPr>
+          <p:cNvPr id="884" name="Rectangle 883">
+            <a:extLst>
+              <a:ext uri="{FF2B5EF4-FFF2-40B4-BE49-F238E27FC236}">
+                <a16:creationId xmlns:a16="http://schemas.microsoft.com/office/drawing/2014/main" id="{5DE72D5B-5530-466E-BA71-21D7E65C6B3F}"/>
+              </a:ext>
+            </a:extLst>
+          </p:cNvPr>
+          <p:cNvSpPr/>
+          <p:nvPr/>
+        </p:nvSpPr>
+        <p:spPr>
+          <a:xfrm>
+            <a:off x="7944244" y="5924439"/>
+            <a:ext cx="302186" cy="122333"/>
+          </a:xfrm>
+          <a:prstGeom prst="rect">
+            <a:avLst/>
+          </a:prstGeom>
+        </p:spPr>
+        <p:style>
+          <a:lnRef idx="2">
+            <a:schemeClr val="dk1"/>
+          </a:lnRef>
+          <a:fillRef idx="1">
+            <a:schemeClr val="lt1"/>
+          </a:fillRef>
+          <a:effectRef idx="0">
+            <a:schemeClr val="dk1"/>
+          </a:effectRef>
+          <a:fontRef idx="minor">
+            <a:schemeClr val="dk1"/>
+          </a:fontRef>
+        </p:style>
+        <p:txBody>
+          <a:bodyPr rtlCol="0" anchor="ctr"/>
+          <a:lstStyle/>
+          <a:p>
+            <a:pPr algn="r"/>
+            <a:endParaRPr lang="de-DE" sz="900" dirty="0"/>
+          </a:p>
+        </p:txBody>
+      </p:sp>
+      <p:sp>
+        <p:nvSpPr>
+          <p:cNvPr id="885" name="Rectangle 884">
+            <a:extLst>
+              <a:ext uri="{FF2B5EF4-FFF2-40B4-BE49-F238E27FC236}">
+                <a16:creationId xmlns:a16="http://schemas.microsoft.com/office/drawing/2014/main" id="{6F91E461-DD06-47EA-BCF4-1C36186A3EFE}"/>
+              </a:ext>
+            </a:extLst>
+          </p:cNvPr>
+          <p:cNvSpPr/>
+          <p:nvPr/>
+        </p:nvSpPr>
+        <p:spPr>
+          <a:xfrm>
+            <a:off x="8846879" y="5924439"/>
+            <a:ext cx="156797" cy="122333"/>
+          </a:xfrm>
+          <a:prstGeom prst="rect">
+            <a:avLst/>
+          </a:prstGeom>
+          <a:solidFill>
+            <a:schemeClr val="bg1">
+              <a:lumMod val="85000"/>
+            </a:schemeClr>
+          </a:solidFill>
+        </p:spPr>
+        <p:style>
+          <a:lnRef idx="2">
+            <a:schemeClr val="dk1"/>
+          </a:lnRef>
+          <a:fillRef idx="1">
+            <a:schemeClr val="lt1"/>
+          </a:fillRef>
+          <a:effectRef idx="0">
+            <a:schemeClr val="dk1"/>
+          </a:effectRef>
+          <a:fontRef idx="minor">
+            <a:schemeClr val="dk1"/>
+          </a:fontRef>
+        </p:style>
+        <p:txBody>
+          <a:bodyPr rtlCol="0" anchor="ctr"/>
+          <a:lstStyle/>
+          <a:p>
+            <a:pPr algn="ctr"/>
+            <a:r>
+              <a:rPr lang="el-GR" sz="900"/>
+              <a:t>Σ</a:t>
+            </a:r>
+            <a:endParaRPr lang="de-DE" sz="900" dirty="0"/>
+          </a:p>
+        </p:txBody>
+      </p:sp>
+      <p:sp>
+        <p:nvSpPr>
+          <p:cNvPr id="886" name="Rectangle 885">
+            <a:extLst>
+              <a:ext uri="{FF2B5EF4-FFF2-40B4-BE49-F238E27FC236}">
+                <a16:creationId xmlns:a16="http://schemas.microsoft.com/office/drawing/2014/main" id="{3DD30AFE-4F44-4852-A670-334E60011934}"/>
+              </a:ext>
+            </a:extLst>
+          </p:cNvPr>
+          <p:cNvSpPr/>
+          <p:nvPr/>
+        </p:nvSpPr>
+        <p:spPr>
+          <a:xfrm>
+            <a:off x="7538007" y="6043881"/>
+            <a:ext cx="406237" cy="122333"/>
+          </a:xfrm>
+          <a:prstGeom prst="rect">
+            <a:avLst/>
+          </a:prstGeom>
+          <a:solidFill>
+            <a:schemeClr val="bg1">
+              <a:lumMod val="85000"/>
+            </a:schemeClr>
+          </a:solidFill>
+        </p:spPr>
+        <p:style>
+          <a:lnRef idx="2">
+            <a:schemeClr val="dk1"/>
+          </a:lnRef>
+          <a:fillRef idx="1">
+            <a:schemeClr val="lt1"/>
+          </a:fillRef>
+          <a:effectRef idx="0">
+            <a:schemeClr val="dk1"/>
+          </a:effectRef>
+          <a:fontRef idx="minor">
+            <a:schemeClr val="dk1"/>
+          </a:fontRef>
+        </p:style>
+        <p:txBody>
+          <a:bodyPr rtlCol="0" anchor="ctr"/>
+          <a:lstStyle/>
+          <a:p>
+            <a:endParaRPr lang="de-DE" dirty="0"/>
+          </a:p>
+        </p:txBody>
+      </p:sp>
+      <p:sp>
+        <p:nvSpPr>
+          <p:cNvPr id="887" name="Rectangle 886">
+            <a:extLst>
+              <a:ext uri="{FF2B5EF4-FFF2-40B4-BE49-F238E27FC236}">
+                <a16:creationId xmlns:a16="http://schemas.microsoft.com/office/drawing/2014/main" id="{91471622-7EFF-4F7F-962A-CA55D092297E}"/>
+              </a:ext>
+            </a:extLst>
+          </p:cNvPr>
+          <p:cNvSpPr/>
+          <p:nvPr/>
+        </p:nvSpPr>
+        <p:spPr>
+          <a:xfrm>
+            <a:off x="7944244" y="6043881"/>
+            <a:ext cx="302186" cy="122333"/>
+          </a:xfrm>
+          <a:prstGeom prst="rect">
+            <a:avLst/>
+          </a:prstGeom>
+        </p:spPr>
+        <p:style>
+          <a:lnRef idx="2">
+            <a:schemeClr val="dk1"/>
+          </a:lnRef>
+          <a:fillRef idx="1">
+            <a:schemeClr val="lt1"/>
+          </a:fillRef>
+          <a:effectRef idx="0">
+            <a:schemeClr val="dk1"/>
+          </a:effectRef>
+          <a:fontRef idx="minor">
+            <a:schemeClr val="dk1"/>
+          </a:fontRef>
+        </p:style>
+        <p:txBody>
+          <a:bodyPr rtlCol="0" anchor="ctr"/>
+          <a:lstStyle/>
+          <a:p>
+            <a:pPr algn="r"/>
+            <a:endParaRPr lang="de-DE" sz="900" dirty="0"/>
+          </a:p>
+        </p:txBody>
+      </p:sp>
+      <p:sp>
+        <p:nvSpPr>
+          <p:cNvPr id="888" name="Rectangle 887">
+            <a:extLst>
+              <a:ext uri="{FF2B5EF4-FFF2-40B4-BE49-F238E27FC236}">
+                <a16:creationId xmlns:a16="http://schemas.microsoft.com/office/drawing/2014/main" id="{C0FB5414-A06B-47E4-98D5-225D133C4DEF}"/>
+              </a:ext>
+            </a:extLst>
+          </p:cNvPr>
+          <p:cNvSpPr/>
+          <p:nvPr/>
+        </p:nvSpPr>
+        <p:spPr>
+          <a:xfrm>
+            <a:off x="8846879" y="6043881"/>
+            <a:ext cx="156797" cy="122333"/>
+          </a:xfrm>
+          <a:prstGeom prst="rect">
+            <a:avLst/>
+          </a:prstGeom>
+          <a:solidFill>
+            <a:schemeClr val="bg1">
+              <a:lumMod val="85000"/>
+            </a:schemeClr>
+          </a:solidFill>
+        </p:spPr>
+        <p:style>
+          <a:lnRef idx="2">
+            <a:schemeClr val="dk1"/>
+          </a:lnRef>
+          <a:fillRef idx="1">
+            <a:schemeClr val="lt1"/>
+          </a:fillRef>
+          <a:effectRef idx="0">
+            <a:schemeClr val="dk1"/>
+          </a:effectRef>
+          <a:fontRef idx="minor">
+            <a:schemeClr val="dk1"/>
+          </a:fontRef>
+        </p:style>
+        <p:txBody>
+          <a:bodyPr rtlCol="0" anchor="ctr"/>
+          <a:lstStyle/>
+          <a:p>
+            <a:pPr algn="ctr"/>
+            <a:r>
+              <a:rPr lang="el-GR" sz="900"/>
+              <a:t>Σ</a:t>
+            </a:r>
+            <a:endParaRPr lang="de-DE" sz="900" dirty="0"/>
+          </a:p>
+        </p:txBody>
+      </p:sp>
+      <p:sp>
+        <p:nvSpPr>
+          <p:cNvPr id="889" name="Rectangle 888">
+            <a:extLst>
+              <a:ext uri="{FF2B5EF4-FFF2-40B4-BE49-F238E27FC236}">
+                <a16:creationId xmlns:a16="http://schemas.microsoft.com/office/drawing/2014/main" id="{D28412A3-EED0-4B52-9170-F8DA1ED78276}"/>
+              </a:ext>
+            </a:extLst>
+          </p:cNvPr>
+          <p:cNvSpPr/>
+          <p:nvPr/>
+        </p:nvSpPr>
+        <p:spPr>
+          <a:xfrm>
+            <a:off x="8245466" y="5440783"/>
+            <a:ext cx="302186" cy="122333"/>
+          </a:xfrm>
+          <a:prstGeom prst="rect">
+            <a:avLst/>
+          </a:prstGeom>
+        </p:spPr>
+        <p:style>
+          <a:lnRef idx="2">
+            <a:schemeClr val="dk1"/>
+          </a:lnRef>
+          <a:fillRef idx="1">
+            <a:schemeClr val="lt1"/>
+          </a:fillRef>
+          <a:effectRef idx="0">
+            <a:schemeClr val="dk1"/>
+          </a:effectRef>
+          <a:fontRef idx="minor">
+            <a:schemeClr val="dk1"/>
+          </a:fontRef>
+        </p:style>
+        <p:txBody>
+          <a:bodyPr rtlCol="0" anchor="ctr"/>
+          <a:lstStyle/>
+          <a:p>
+            <a:pPr algn="r"/>
+            <a:endParaRPr lang="de-DE" sz="900" dirty="0"/>
+          </a:p>
+        </p:txBody>
+      </p:sp>
+      <p:sp>
+        <p:nvSpPr>
+          <p:cNvPr id="890" name="Rectangle 889">
+            <a:extLst>
+              <a:ext uri="{FF2B5EF4-FFF2-40B4-BE49-F238E27FC236}">
+                <a16:creationId xmlns:a16="http://schemas.microsoft.com/office/drawing/2014/main" id="{6D84420B-B8E0-4F3B-8C96-53EC1305B8E9}"/>
+              </a:ext>
+            </a:extLst>
+          </p:cNvPr>
+          <p:cNvSpPr/>
+          <p:nvPr/>
+        </p:nvSpPr>
+        <p:spPr>
+          <a:xfrm>
+            <a:off x="8245465" y="5324496"/>
+            <a:ext cx="302186" cy="116287"/>
+          </a:xfrm>
+          <a:prstGeom prst="rect">
+            <a:avLst/>
+          </a:prstGeom>
+          <a:solidFill>
+            <a:schemeClr val="bg1">
+              <a:lumMod val="85000"/>
+            </a:schemeClr>
+          </a:solidFill>
+        </p:spPr>
+        <p:style>
+          <a:lnRef idx="2">
+            <a:schemeClr val="dk1"/>
+          </a:lnRef>
+          <a:fillRef idx="1">
+            <a:schemeClr val="lt1"/>
+          </a:fillRef>
+          <a:effectRef idx="0">
+            <a:schemeClr val="dk1"/>
+          </a:effectRef>
+          <a:fontRef idx="minor">
+            <a:schemeClr val="dk1"/>
+          </a:fontRef>
+        </p:style>
+        <p:txBody>
+          <a:bodyPr rtlCol="0" anchor="ctr"/>
+          <a:lstStyle/>
+          <a:p>
+            <a:endParaRPr lang="de-DE" dirty="0"/>
+          </a:p>
+        </p:txBody>
+      </p:sp>
+      <p:sp>
+        <p:nvSpPr>
+          <p:cNvPr id="891" name="Rectangle 890">
+            <a:extLst>
+              <a:ext uri="{FF2B5EF4-FFF2-40B4-BE49-F238E27FC236}">
+                <a16:creationId xmlns:a16="http://schemas.microsoft.com/office/drawing/2014/main" id="{C81C54B6-C62E-41FC-A49C-2AE611C791B7}"/>
+              </a:ext>
+            </a:extLst>
+          </p:cNvPr>
+          <p:cNvSpPr/>
+          <p:nvPr/>
+        </p:nvSpPr>
+        <p:spPr>
+          <a:xfrm>
+            <a:off x="8245466" y="5565933"/>
+            <a:ext cx="302186" cy="122333"/>
+          </a:xfrm>
+          <a:prstGeom prst="rect">
+            <a:avLst/>
+          </a:prstGeom>
+        </p:spPr>
+        <p:style>
+          <a:lnRef idx="2">
+            <a:schemeClr val="dk1"/>
+          </a:lnRef>
+          <a:fillRef idx="1">
+            <a:schemeClr val="lt1"/>
+          </a:fillRef>
+          <a:effectRef idx="0">
+            <a:schemeClr val="dk1"/>
+          </a:effectRef>
+          <a:fontRef idx="minor">
+            <a:schemeClr val="dk1"/>
+          </a:fontRef>
+        </p:style>
+        <p:txBody>
+          <a:bodyPr rtlCol="0" anchor="ctr"/>
+          <a:lstStyle/>
+          <a:p>
+            <a:pPr algn="r"/>
+            <a:endParaRPr lang="de-DE" sz="900" dirty="0"/>
+          </a:p>
+        </p:txBody>
+      </p:sp>
+      <p:sp>
+        <p:nvSpPr>
+          <p:cNvPr id="892" name="Rectangle 891">
+            <a:extLst>
+              <a:ext uri="{FF2B5EF4-FFF2-40B4-BE49-F238E27FC236}">
+                <a16:creationId xmlns:a16="http://schemas.microsoft.com/office/drawing/2014/main" id="{1D048780-0A50-4530-96B9-387880A1268C}"/>
+              </a:ext>
+            </a:extLst>
+          </p:cNvPr>
+          <p:cNvSpPr/>
+          <p:nvPr/>
+        </p:nvSpPr>
+        <p:spPr>
+          <a:xfrm>
+            <a:off x="8245466" y="5686332"/>
+            <a:ext cx="302186" cy="122333"/>
+          </a:xfrm>
+          <a:prstGeom prst="rect">
+            <a:avLst/>
+          </a:prstGeom>
+        </p:spPr>
+        <p:style>
+          <a:lnRef idx="2">
+            <a:schemeClr val="dk1"/>
+          </a:lnRef>
+          <a:fillRef idx="1">
+            <a:schemeClr val="lt1"/>
+          </a:fillRef>
+          <a:effectRef idx="0">
+            <a:schemeClr val="dk1"/>
+          </a:effectRef>
+          <a:fontRef idx="minor">
+            <a:schemeClr val="dk1"/>
+          </a:fontRef>
+        </p:style>
+        <p:txBody>
+          <a:bodyPr rtlCol="0" anchor="ctr"/>
+          <a:lstStyle/>
+          <a:p>
+            <a:pPr algn="r"/>
+            <a:endParaRPr lang="de-DE" sz="900" dirty="0"/>
+          </a:p>
+        </p:txBody>
+      </p:sp>
+      <p:sp>
+        <p:nvSpPr>
+          <p:cNvPr id="893" name="Rectangle 892">
+            <a:extLst>
+              <a:ext uri="{FF2B5EF4-FFF2-40B4-BE49-F238E27FC236}">
+                <a16:creationId xmlns:a16="http://schemas.microsoft.com/office/drawing/2014/main" id="{B9B6052C-3865-4CB2-8701-5150EA49804C}"/>
+              </a:ext>
+            </a:extLst>
+          </p:cNvPr>
+          <p:cNvSpPr/>
+          <p:nvPr/>
+        </p:nvSpPr>
+        <p:spPr>
+          <a:xfrm>
+            <a:off x="8245466" y="5805774"/>
+            <a:ext cx="302186" cy="122333"/>
+          </a:xfrm>
+          <a:prstGeom prst="rect">
+            <a:avLst/>
+          </a:prstGeom>
+        </p:spPr>
+        <p:style>
+          <a:lnRef idx="2">
+            <a:schemeClr val="dk1"/>
+          </a:lnRef>
+          <a:fillRef idx="1">
+            <a:schemeClr val="lt1"/>
+          </a:fillRef>
+          <a:effectRef idx="0">
+            <a:schemeClr val="dk1"/>
+          </a:effectRef>
+          <a:fontRef idx="minor">
+            <a:schemeClr val="dk1"/>
+          </a:fontRef>
+        </p:style>
+        <p:txBody>
+          <a:bodyPr rtlCol="0" anchor="ctr"/>
+          <a:lstStyle/>
+          <a:p>
+            <a:pPr algn="r"/>
+            <a:endParaRPr lang="de-DE" sz="900" dirty="0"/>
+          </a:p>
+        </p:txBody>
+      </p:sp>
+      <p:sp>
+        <p:nvSpPr>
+          <p:cNvPr id="894" name="Rectangle 893">
+            <a:extLst>
+              <a:ext uri="{FF2B5EF4-FFF2-40B4-BE49-F238E27FC236}">
+                <a16:creationId xmlns:a16="http://schemas.microsoft.com/office/drawing/2014/main" id="{8B46F5B0-707F-4218-8CDC-A13F4A9EA26F}"/>
+              </a:ext>
+            </a:extLst>
+          </p:cNvPr>
+          <p:cNvSpPr/>
+          <p:nvPr/>
+        </p:nvSpPr>
+        <p:spPr>
+          <a:xfrm>
+            <a:off x="8245465" y="5924439"/>
+            <a:ext cx="302186" cy="122333"/>
+          </a:xfrm>
+          <a:prstGeom prst="rect">
+            <a:avLst/>
+          </a:prstGeom>
+        </p:spPr>
+        <p:style>
+          <a:lnRef idx="2">
+            <a:schemeClr val="dk1"/>
+          </a:lnRef>
+          <a:fillRef idx="1">
+            <a:schemeClr val="lt1"/>
+          </a:fillRef>
+          <a:effectRef idx="0">
+            <a:schemeClr val="dk1"/>
+          </a:effectRef>
+          <a:fontRef idx="minor">
+            <a:schemeClr val="dk1"/>
+          </a:fontRef>
+        </p:style>
+        <p:txBody>
+          <a:bodyPr rtlCol="0" anchor="ctr"/>
+          <a:lstStyle/>
+          <a:p>
+            <a:pPr algn="r"/>
+            <a:endParaRPr lang="de-DE" sz="900" dirty="0"/>
+          </a:p>
+        </p:txBody>
+      </p:sp>
+      <p:sp>
+        <p:nvSpPr>
+          <p:cNvPr id="895" name="Rectangle 894">
+            <a:extLst>
+              <a:ext uri="{FF2B5EF4-FFF2-40B4-BE49-F238E27FC236}">
+                <a16:creationId xmlns:a16="http://schemas.microsoft.com/office/drawing/2014/main" id="{97FE5E77-F886-4775-82E2-86C167F65FC7}"/>
+              </a:ext>
+            </a:extLst>
+          </p:cNvPr>
+          <p:cNvSpPr/>
+          <p:nvPr/>
+        </p:nvSpPr>
+        <p:spPr>
+          <a:xfrm>
+            <a:off x="8245465" y="6043881"/>
+            <a:ext cx="302186" cy="122333"/>
+          </a:xfrm>
+          <a:prstGeom prst="rect">
+            <a:avLst/>
+          </a:prstGeom>
+        </p:spPr>
+        <p:style>
+          <a:lnRef idx="2">
+            <a:schemeClr val="dk1"/>
+          </a:lnRef>
+          <a:fillRef idx="1">
+            <a:schemeClr val="lt1"/>
+          </a:fillRef>
+          <a:effectRef idx="0">
+            <a:schemeClr val="dk1"/>
+          </a:effectRef>
+          <a:fontRef idx="minor">
+            <a:schemeClr val="dk1"/>
+          </a:fontRef>
+        </p:style>
+        <p:txBody>
+          <a:bodyPr rtlCol="0" anchor="ctr"/>
+          <a:lstStyle/>
+          <a:p>
+            <a:pPr algn="r"/>
+            <a:endParaRPr lang="de-DE" sz="900" dirty="0"/>
+          </a:p>
+        </p:txBody>
+      </p:sp>
+      <p:sp>
+        <p:nvSpPr>
+          <p:cNvPr id="896" name="Rectangle 895">
+            <a:extLst>
+              <a:ext uri="{FF2B5EF4-FFF2-40B4-BE49-F238E27FC236}">
+                <a16:creationId xmlns:a16="http://schemas.microsoft.com/office/drawing/2014/main" id="{655084BE-449E-4B84-ACF8-6C6CF5F7746C}"/>
+              </a:ext>
+            </a:extLst>
+          </p:cNvPr>
+          <p:cNvSpPr/>
+          <p:nvPr/>
+        </p:nvSpPr>
+        <p:spPr>
+          <a:xfrm>
+            <a:off x="8545661" y="5440783"/>
+            <a:ext cx="302186" cy="122333"/>
+          </a:xfrm>
+          <a:prstGeom prst="rect">
+            <a:avLst/>
+          </a:prstGeom>
+        </p:spPr>
+        <p:style>
+          <a:lnRef idx="2">
+            <a:schemeClr val="dk1"/>
+          </a:lnRef>
+          <a:fillRef idx="1">
+            <a:schemeClr val="lt1"/>
+          </a:fillRef>
+          <a:effectRef idx="0">
+            <a:schemeClr val="dk1"/>
+          </a:effectRef>
+          <a:fontRef idx="minor">
+            <a:schemeClr val="dk1"/>
+          </a:fontRef>
+        </p:style>
+        <p:txBody>
+          <a:bodyPr rtlCol="0" anchor="ctr"/>
+          <a:lstStyle/>
+          <a:p>
+            <a:pPr algn="r"/>
+            <a:endParaRPr lang="de-DE" sz="900" dirty="0"/>
+          </a:p>
+        </p:txBody>
+      </p:sp>
+      <p:sp>
+        <p:nvSpPr>
+          <p:cNvPr id="897" name="Rectangle 896">
+            <a:extLst>
+              <a:ext uri="{FF2B5EF4-FFF2-40B4-BE49-F238E27FC236}">
+                <a16:creationId xmlns:a16="http://schemas.microsoft.com/office/drawing/2014/main" id="{74F65EFE-D94F-4A21-B27D-4814F777420A}"/>
+              </a:ext>
+            </a:extLst>
+          </p:cNvPr>
+          <p:cNvSpPr/>
+          <p:nvPr/>
+        </p:nvSpPr>
+        <p:spPr>
+          <a:xfrm>
+            <a:off x="8545660" y="5324496"/>
+            <a:ext cx="302186" cy="116287"/>
+          </a:xfrm>
+          <a:prstGeom prst="rect">
+            <a:avLst/>
+          </a:prstGeom>
+          <a:solidFill>
+            <a:schemeClr val="bg1">
+              <a:lumMod val="85000"/>
+            </a:schemeClr>
+          </a:solidFill>
+        </p:spPr>
+        <p:style>
+          <a:lnRef idx="2">
+            <a:schemeClr val="dk1"/>
+          </a:lnRef>
+          <a:fillRef idx="1">
+            <a:schemeClr val="lt1"/>
+          </a:fillRef>
+          <a:effectRef idx="0">
+            <a:schemeClr val="dk1"/>
+          </a:effectRef>
+          <a:fontRef idx="minor">
+            <a:schemeClr val="dk1"/>
+          </a:fontRef>
+        </p:style>
+        <p:txBody>
+          <a:bodyPr rtlCol="0" anchor="ctr"/>
+          <a:lstStyle/>
+          <a:p>
+            <a:endParaRPr lang="de-DE" dirty="0"/>
+          </a:p>
+        </p:txBody>
+      </p:sp>
+      <p:sp>
+        <p:nvSpPr>
+          <p:cNvPr id="898" name="Rectangle 897">
+            <a:extLst>
+              <a:ext uri="{FF2B5EF4-FFF2-40B4-BE49-F238E27FC236}">
+                <a16:creationId xmlns:a16="http://schemas.microsoft.com/office/drawing/2014/main" id="{E99A08AC-A908-4A84-A6C2-5544F9D5589E}"/>
+              </a:ext>
+            </a:extLst>
+          </p:cNvPr>
+          <p:cNvSpPr/>
+          <p:nvPr/>
+        </p:nvSpPr>
+        <p:spPr>
+          <a:xfrm>
+            <a:off x="8545661" y="5565933"/>
+            <a:ext cx="302186" cy="122333"/>
+          </a:xfrm>
+          <a:prstGeom prst="rect">
+            <a:avLst/>
+          </a:prstGeom>
+        </p:spPr>
+        <p:style>
+          <a:lnRef idx="2">
+            <a:schemeClr val="dk1"/>
+          </a:lnRef>
+          <a:fillRef idx="1">
+            <a:schemeClr val="lt1"/>
+          </a:fillRef>
+          <a:effectRef idx="0">
+            <a:schemeClr val="dk1"/>
+          </a:effectRef>
+          <a:fontRef idx="minor">
+            <a:schemeClr val="dk1"/>
+          </a:fontRef>
+        </p:style>
+        <p:txBody>
+          <a:bodyPr rtlCol="0" anchor="ctr"/>
+          <a:lstStyle/>
+          <a:p>
+            <a:pPr algn="r"/>
+            <a:endParaRPr lang="de-DE" sz="900" dirty="0"/>
+          </a:p>
+        </p:txBody>
+      </p:sp>
+      <p:sp>
+        <p:nvSpPr>
+          <p:cNvPr id="899" name="Rectangle 898">
+            <a:extLst>
+              <a:ext uri="{FF2B5EF4-FFF2-40B4-BE49-F238E27FC236}">
+                <a16:creationId xmlns:a16="http://schemas.microsoft.com/office/drawing/2014/main" id="{B78B4413-B0C9-4DB3-AE63-FA9FD314FF9D}"/>
+              </a:ext>
+            </a:extLst>
+          </p:cNvPr>
+          <p:cNvSpPr/>
+          <p:nvPr/>
+        </p:nvSpPr>
+        <p:spPr>
+          <a:xfrm>
+            <a:off x="8545661" y="5686332"/>
+            <a:ext cx="302186" cy="122333"/>
+          </a:xfrm>
+          <a:prstGeom prst="rect">
+            <a:avLst/>
+          </a:prstGeom>
+        </p:spPr>
+        <p:style>
+          <a:lnRef idx="2">
+            <a:schemeClr val="dk1"/>
+          </a:lnRef>
+          <a:fillRef idx="1">
+            <a:schemeClr val="lt1"/>
+          </a:fillRef>
+          <a:effectRef idx="0">
+            <a:schemeClr val="dk1"/>
+          </a:effectRef>
+          <a:fontRef idx="minor">
+            <a:schemeClr val="dk1"/>
+          </a:fontRef>
+        </p:style>
+        <p:txBody>
+          <a:bodyPr rtlCol="0" anchor="ctr"/>
+          <a:lstStyle/>
+          <a:p>
+            <a:pPr algn="r"/>
+            <a:endParaRPr lang="de-DE" sz="900" dirty="0"/>
+          </a:p>
+        </p:txBody>
+      </p:sp>
+      <p:sp>
+        <p:nvSpPr>
+          <p:cNvPr id="900" name="Rectangle 899">
+            <a:extLst>
+              <a:ext uri="{FF2B5EF4-FFF2-40B4-BE49-F238E27FC236}">
+                <a16:creationId xmlns:a16="http://schemas.microsoft.com/office/drawing/2014/main" id="{91788909-850C-4F11-8915-E384B7BA688F}"/>
+              </a:ext>
+            </a:extLst>
+          </p:cNvPr>
+          <p:cNvSpPr/>
+          <p:nvPr/>
+        </p:nvSpPr>
+        <p:spPr>
+          <a:xfrm>
+            <a:off x="8545661" y="5805774"/>
+            <a:ext cx="302186" cy="122333"/>
+          </a:xfrm>
+          <a:prstGeom prst="rect">
+            <a:avLst/>
+          </a:prstGeom>
+        </p:spPr>
+        <p:style>
+          <a:lnRef idx="2">
+            <a:schemeClr val="dk1"/>
+          </a:lnRef>
+          <a:fillRef idx="1">
+            <a:schemeClr val="lt1"/>
+          </a:fillRef>
+          <a:effectRef idx="0">
+            <a:schemeClr val="dk1"/>
+          </a:effectRef>
+          <a:fontRef idx="minor">
+            <a:schemeClr val="dk1"/>
+          </a:fontRef>
+        </p:style>
+        <p:txBody>
+          <a:bodyPr rtlCol="0" anchor="ctr"/>
+          <a:lstStyle/>
+          <a:p>
+            <a:pPr algn="r"/>
+            <a:endParaRPr lang="de-DE" sz="900" dirty="0"/>
+          </a:p>
+        </p:txBody>
+      </p:sp>
+      <p:sp>
+        <p:nvSpPr>
+          <p:cNvPr id="901" name="Rectangle 900">
+            <a:extLst>
+              <a:ext uri="{FF2B5EF4-FFF2-40B4-BE49-F238E27FC236}">
+                <a16:creationId xmlns:a16="http://schemas.microsoft.com/office/drawing/2014/main" id="{90405EF1-515F-4E7C-98F4-5CF8AF584462}"/>
+              </a:ext>
+            </a:extLst>
+          </p:cNvPr>
+          <p:cNvSpPr/>
+          <p:nvPr/>
+        </p:nvSpPr>
+        <p:spPr>
+          <a:xfrm>
+            <a:off x="8545660" y="5924439"/>
+            <a:ext cx="302186" cy="122333"/>
+          </a:xfrm>
+          <a:prstGeom prst="rect">
+            <a:avLst/>
+          </a:prstGeom>
+        </p:spPr>
+        <p:style>
+          <a:lnRef idx="2">
+            <a:schemeClr val="dk1"/>
+          </a:lnRef>
+          <a:fillRef idx="1">
+            <a:schemeClr val="lt1"/>
+          </a:fillRef>
+          <a:effectRef idx="0">
+            <a:schemeClr val="dk1"/>
+          </a:effectRef>
+          <a:fontRef idx="minor">
+            <a:schemeClr val="dk1"/>
+          </a:fontRef>
+        </p:style>
+        <p:txBody>
+          <a:bodyPr rtlCol="0" anchor="ctr"/>
+          <a:lstStyle/>
+          <a:p>
+            <a:pPr algn="r"/>
+            <a:endParaRPr lang="de-DE" sz="900" dirty="0"/>
+          </a:p>
+        </p:txBody>
+      </p:sp>
+      <p:sp>
+        <p:nvSpPr>
+          <p:cNvPr id="902" name="Rectangle 901">
+            <a:extLst>
+              <a:ext uri="{FF2B5EF4-FFF2-40B4-BE49-F238E27FC236}">
+                <a16:creationId xmlns:a16="http://schemas.microsoft.com/office/drawing/2014/main" id="{6C1B8B8B-F46A-46BD-99B6-2AD5982FEBB9}"/>
+              </a:ext>
+            </a:extLst>
+          </p:cNvPr>
+          <p:cNvSpPr/>
+          <p:nvPr/>
+        </p:nvSpPr>
+        <p:spPr>
+          <a:xfrm>
+            <a:off x="8545660" y="6043881"/>
+            <a:ext cx="302186" cy="122333"/>
+          </a:xfrm>
+          <a:prstGeom prst="rect">
+            <a:avLst/>
+          </a:prstGeom>
+        </p:spPr>
+        <p:style>
+          <a:lnRef idx="2">
+            <a:schemeClr val="dk1"/>
+          </a:lnRef>
+          <a:fillRef idx="1">
+            <a:schemeClr val="lt1"/>
+          </a:fillRef>
+          <a:effectRef idx="0">
+            <a:schemeClr val="dk1"/>
+          </a:effectRef>
+          <a:fontRef idx="minor">
+            <a:schemeClr val="dk1"/>
+          </a:fontRef>
+        </p:style>
+        <p:txBody>
+          <a:bodyPr rtlCol="0" anchor="ctr"/>
+          <a:lstStyle/>
+          <a:p>
+            <a:pPr algn="r"/>
+            <a:endParaRPr lang="de-DE" sz="900" dirty="0"/>
+          </a:p>
+        </p:txBody>
+      </p:sp>
     </p:spTree>
     <p:extLst>
       <p:ext uri="{BB962C8B-B14F-4D97-AF65-F5344CB8AC3E}">
@@ -52126,6 +55980,105 @@
             <a:r>
               <a:rPr lang="de-DE" sz="700" b="1" dirty="0"/>
               <a:t>-</a:t>
+            </a:r>
+          </a:p>
+        </p:txBody>
+      </p:sp>
+      <p:sp>
+        <p:nvSpPr>
+          <p:cNvPr id="10" name="Rectangle 9">
+            <a:extLst>
+              <a:ext uri="{FF2B5EF4-FFF2-40B4-BE49-F238E27FC236}">
+                <a16:creationId xmlns:a16="http://schemas.microsoft.com/office/drawing/2014/main" id="{77065A3F-8411-4172-B54F-26D5434F5D87}"/>
+              </a:ext>
+            </a:extLst>
+          </p:cNvPr>
+          <p:cNvSpPr/>
+          <p:nvPr/>
+        </p:nvSpPr>
+        <p:spPr>
+          <a:xfrm>
+            <a:off x="622166" y="2054744"/>
+            <a:ext cx="2029770" cy="1215450"/>
+          </a:xfrm>
+          <a:prstGeom prst="rect">
+            <a:avLst/>
+          </a:prstGeom>
+          <a:noFill/>
+          <a:ln>
+            <a:prstDash val="dash"/>
+          </a:ln>
+        </p:spPr>
+        <p:style>
+          <a:lnRef idx="2">
+            <a:schemeClr val="accent1">
+              <a:shade val="50000"/>
+            </a:schemeClr>
+          </a:lnRef>
+          <a:fillRef idx="1">
+            <a:schemeClr val="accent1"/>
+          </a:fillRef>
+          <a:effectRef idx="0">
+            <a:schemeClr val="accent1"/>
+          </a:effectRef>
+          <a:fontRef idx="minor">
+            <a:schemeClr val="lt1"/>
+          </a:fontRef>
+        </p:style>
+        <p:txBody>
+          <a:bodyPr rtlCol="0" anchor="ctr"/>
+          <a:lstStyle/>
+          <a:p>
+            <a:pPr algn="ctr"/>
+            <a:endParaRPr lang="de-DE"/>
+          </a:p>
+        </p:txBody>
+      </p:sp>
+      <p:sp>
+        <p:nvSpPr>
+          <p:cNvPr id="11" name="Rectangle 10">
+            <a:extLst>
+              <a:ext uri="{FF2B5EF4-FFF2-40B4-BE49-F238E27FC236}">
+                <a16:creationId xmlns:a16="http://schemas.microsoft.com/office/drawing/2014/main" id="{CA588DFC-ABDB-489C-8054-1EEBD424A7B5}"/>
+              </a:ext>
+            </a:extLst>
+          </p:cNvPr>
+          <p:cNvSpPr/>
+          <p:nvPr/>
+        </p:nvSpPr>
+        <p:spPr>
+          <a:xfrm>
+            <a:off x="935278" y="2227028"/>
+            <a:ext cx="1403546" cy="870882"/>
+          </a:xfrm>
+          <a:prstGeom prst="rect">
+            <a:avLst/>
+          </a:prstGeom>
+        </p:spPr>
+        <p:style>
+          <a:lnRef idx="2">
+            <a:schemeClr val="dk1"/>
+          </a:lnRef>
+          <a:fillRef idx="1">
+            <a:schemeClr val="lt1"/>
+          </a:fillRef>
+          <a:effectRef idx="0">
+            <a:schemeClr val="dk1"/>
+          </a:effectRef>
+          <a:fontRef idx="minor">
+            <a:schemeClr val="dk1"/>
+          </a:fontRef>
+        </p:style>
+        <p:txBody>
+          <a:bodyPr rtlCol="0" anchor="ctr"/>
+          <a:lstStyle/>
+          <a:p>
+            <a:pPr algn="ctr"/>
+            <a:r>
+              <a:rPr lang="de-DE" sz="4400" dirty="0">
+                <a:latin typeface="FontAwesome" pitchFamily="50" charset="0"/>
+              </a:rPr>
+              <a:t></a:t>
             </a:r>
           </a:p>
         </p:txBody>

</xml_diff>